<commit_message>
Updated diagram, added presentation data
Added my part to the demo presentation, including a new database diagram with the finalized fields.
</commit_message>
<xml_diff>
--- a/Inventory Management System demo draft.pptx
+++ b/Inventory Management System demo draft.pptx
@@ -9,10 +9,11 @@
     <p:sldId id="258" r:id="rId3"/>
     <p:sldId id="257" r:id="rId4"/>
     <p:sldId id="259" r:id="rId5"/>
-    <p:sldId id="260" r:id="rId6"/>
-    <p:sldId id="261" r:id="rId7"/>
-    <p:sldId id="262" r:id="rId8"/>
-    <p:sldId id="263" r:id="rId9"/>
+    <p:sldId id="264" r:id="rId6"/>
+    <p:sldId id="260" r:id="rId7"/>
+    <p:sldId id="261" r:id="rId8"/>
+    <p:sldId id="262" r:id="rId9"/>
+    <p:sldId id="263" r:id="rId10"/>
   </p:sldIdLst>
   <p:sldSz cx="12192000" cy="6858000"/>
   <p:notesSz cx="6858000" cy="9144000"/>
@@ -113,7 +114,7 @@
   </p:defaultTextStyle>
   <p:extLst>
     <p:ext uri="{EFAFB233-063F-42B5-8137-9DF3F51BA10A}">
-      <p15:sldGuideLst xmlns:p15="http://schemas.microsoft.com/office/powerpoint/2012/main"/>
+      <p15:sldGuideLst xmlns:p15="http://schemas.microsoft.com/office/powerpoint/2012/main" xmlns=""/>
     </p:ext>
   </p:extLst>
 </p:presentation>
@@ -172,8 +173,8 @@
           </a:prstGeom>
           <a:noFill/>
           <a:extLst>
-            <a:ext uri="{909E8E84-426E-40dd-AFC4-6F175D3DCCD1}">
-              <a14:hiddenFill xmlns="" xmlns:a14="http://schemas.microsoft.com/office/drawing/2010/main">
+            <a:ext uri="{909E8E84-426E-40DD-AFC4-6F175D3DCCD1}">
+              <a14:hiddenFill xmlns:a14="http://schemas.microsoft.com/office/drawing/2010/main">
                 <a:solidFill>
                   <a:srgbClr val="FFFFFF"/>
                 </a:solidFill>
@@ -232,8 +233,8 @@
               <a:noFill/>
             </a:ln>
             <a:extLst>
-              <a:ext uri="{91240B29-F687-4f45-9708-019B960494DF}">
-                <a14:hiddenLine xmlns="" xmlns:a14="http://schemas.microsoft.com/office/drawing/2010/main" w="9525">
+              <a:ext uri="{91240B29-F687-4F45-9708-019B960494DF}">
+                <a14:hiddenLine xmlns:a14="http://schemas.microsoft.com/office/drawing/2010/main" w="9525">
                   <a:solidFill>
                     <a:srgbClr val="000000"/>
                   </a:solidFill>
@@ -322,8 +323,8 @@
               <a:noFill/>
             </a:ln>
             <a:extLst>
-              <a:ext uri="{91240B29-F687-4f45-9708-019B960494DF}">
-                <a14:hiddenLine xmlns="" xmlns:a14="http://schemas.microsoft.com/office/drawing/2010/main" w="9525">
+              <a:ext uri="{91240B29-F687-4F45-9708-019B960494DF}">
+                <a14:hiddenLine xmlns:a14="http://schemas.microsoft.com/office/drawing/2010/main" w="9525">
                   <a:solidFill>
                     <a:srgbClr val="000000"/>
                   </a:solidFill>
@@ -412,8 +413,8 @@
               <a:noFill/>
             </a:ln>
             <a:extLst>
-              <a:ext uri="{91240B29-F687-4f45-9708-019B960494DF}">
-                <a14:hiddenLine xmlns="" xmlns:a14="http://schemas.microsoft.com/office/drawing/2010/main" w="9525">
+              <a:ext uri="{91240B29-F687-4F45-9708-019B960494DF}">
+                <a14:hiddenLine xmlns:a14="http://schemas.microsoft.com/office/drawing/2010/main" w="9525">
                   <a:solidFill>
                     <a:srgbClr val="000000"/>
                   </a:solidFill>
@@ -446,8 +447,8 @@
               <a:noFill/>
             </a:ln>
             <a:extLst>
-              <a:ext uri="{91240B29-F687-4f45-9708-019B960494DF}">
-                <a14:hiddenLine xmlns="" xmlns:a14="http://schemas.microsoft.com/office/drawing/2010/main" w="9525">
+              <a:ext uri="{91240B29-F687-4F45-9708-019B960494DF}">
+                <a14:hiddenLine xmlns:a14="http://schemas.microsoft.com/office/drawing/2010/main" w="9525">
                   <a:solidFill>
                     <a:srgbClr val="000000"/>
                   </a:solidFill>
@@ -536,8 +537,8 @@
               <a:noFill/>
             </a:ln>
             <a:extLst>
-              <a:ext uri="{91240B29-F687-4f45-9708-019B960494DF}">
-                <a14:hiddenLine xmlns="" xmlns:a14="http://schemas.microsoft.com/office/drawing/2010/main" w="9525">
+              <a:ext uri="{91240B29-F687-4F45-9708-019B960494DF}">
+                <a14:hiddenLine xmlns:a14="http://schemas.microsoft.com/office/drawing/2010/main" w="9525">
                   <a:solidFill>
                     <a:srgbClr val="000000"/>
                   </a:solidFill>
@@ -598,8 +599,8 @@
               <a:noFill/>
             </a:ln>
             <a:extLst>
-              <a:ext uri="{91240B29-F687-4f45-9708-019B960494DF}">
-                <a14:hiddenLine xmlns="" xmlns:a14="http://schemas.microsoft.com/office/drawing/2010/main" w="9525">
+              <a:ext uri="{91240B29-F687-4F45-9708-019B960494DF}">
+                <a14:hiddenLine xmlns:a14="http://schemas.microsoft.com/office/drawing/2010/main" w="9525">
                   <a:solidFill>
                     <a:srgbClr val="000000"/>
                   </a:solidFill>
@@ -660,8 +661,8 @@
               <a:noFill/>
             </a:ln>
             <a:extLst>
-              <a:ext uri="{91240B29-F687-4f45-9708-019B960494DF}">
-                <a14:hiddenLine xmlns="" xmlns:a14="http://schemas.microsoft.com/office/drawing/2010/main" w="9525">
+              <a:ext uri="{91240B29-F687-4F45-9708-019B960494DF}">
+                <a14:hiddenLine xmlns:a14="http://schemas.microsoft.com/office/drawing/2010/main" w="9525">
                   <a:solidFill>
                     <a:srgbClr val="000000"/>
                   </a:solidFill>
@@ -750,8 +751,8 @@
               <a:noFill/>
             </a:ln>
             <a:extLst>
-              <a:ext uri="{91240B29-F687-4f45-9708-019B960494DF}">
-                <a14:hiddenLine xmlns="" xmlns:a14="http://schemas.microsoft.com/office/drawing/2010/main" w="9525">
+              <a:ext uri="{91240B29-F687-4F45-9708-019B960494DF}">
+                <a14:hiddenLine xmlns:a14="http://schemas.microsoft.com/office/drawing/2010/main" w="9525">
                   <a:solidFill>
                     <a:srgbClr val="000000"/>
                   </a:solidFill>
@@ -812,8 +813,8 @@
               <a:noFill/>
             </a:ln>
             <a:extLst>
-              <a:ext uri="{91240B29-F687-4f45-9708-019B960494DF}">
-                <a14:hiddenLine xmlns="" xmlns:a14="http://schemas.microsoft.com/office/drawing/2010/main" w="9525">
+              <a:ext uri="{91240B29-F687-4F45-9708-019B960494DF}">
+                <a14:hiddenLine xmlns:a14="http://schemas.microsoft.com/office/drawing/2010/main" w="9525">
                   <a:solidFill>
                     <a:srgbClr val="000000"/>
                   </a:solidFill>
@@ -874,8 +875,8 @@
               <a:noFill/>
             </a:ln>
             <a:extLst>
-              <a:ext uri="{91240B29-F687-4f45-9708-019B960494DF}">
-                <a14:hiddenLine xmlns="" xmlns:a14="http://schemas.microsoft.com/office/drawing/2010/main" w="9525">
+              <a:ext uri="{91240B29-F687-4F45-9708-019B960494DF}">
+                <a14:hiddenLine xmlns:a14="http://schemas.microsoft.com/office/drawing/2010/main" w="9525">
                   <a:solidFill>
                     <a:srgbClr val="000000"/>
                   </a:solidFill>
@@ -964,8 +965,8 @@
               <a:noFill/>
             </a:ln>
             <a:extLst>
-              <a:ext uri="{91240B29-F687-4f45-9708-019B960494DF}">
-                <a14:hiddenLine xmlns="" xmlns:a14="http://schemas.microsoft.com/office/drawing/2010/main" w="9525">
+              <a:ext uri="{91240B29-F687-4F45-9708-019B960494DF}">
+                <a14:hiddenLine xmlns:a14="http://schemas.microsoft.com/office/drawing/2010/main" w="9525">
                   <a:solidFill>
                     <a:srgbClr val="000000"/>
                   </a:solidFill>
@@ -1054,8 +1055,8 @@
               <a:noFill/>
             </a:ln>
             <a:extLst>
-              <a:ext uri="{91240B29-F687-4f45-9708-019B960494DF}">
-                <a14:hiddenLine xmlns="" xmlns:a14="http://schemas.microsoft.com/office/drawing/2010/main" w="9525">
+              <a:ext uri="{91240B29-F687-4F45-9708-019B960494DF}">
+                <a14:hiddenLine xmlns:a14="http://schemas.microsoft.com/office/drawing/2010/main" w="9525">
                   <a:solidFill>
                     <a:srgbClr val="000000"/>
                   </a:solidFill>
@@ -1116,8 +1117,8 @@
               <a:noFill/>
             </a:ln>
             <a:extLst>
-              <a:ext uri="{91240B29-F687-4f45-9708-019B960494DF}">
-                <a14:hiddenLine xmlns="" xmlns:a14="http://schemas.microsoft.com/office/drawing/2010/main" w="9525">
+              <a:ext uri="{91240B29-F687-4F45-9708-019B960494DF}">
+                <a14:hiddenLine xmlns:a14="http://schemas.microsoft.com/office/drawing/2010/main" w="9525">
                   <a:solidFill>
                     <a:srgbClr val="000000"/>
                   </a:solidFill>
@@ -1226,8 +1227,8 @@
               <a:noFill/>
             </a:ln>
             <a:extLst>
-              <a:ext uri="{91240B29-F687-4f45-9708-019B960494DF}">
-                <a14:hiddenLine xmlns="" xmlns:a14="http://schemas.microsoft.com/office/drawing/2010/main" w="9525">
+              <a:ext uri="{91240B29-F687-4F45-9708-019B960494DF}">
+                <a14:hiddenLine xmlns:a14="http://schemas.microsoft.com/office/drawing/2010/main" w="9525">
                   <a:solidFill>
                     <a:srgbClr val="000000"/>
                   </a:solidFill>
@@ -1288,8 +1289,8 @@
               <a:noFill/>
             </a:ln>
             <a:extLst>
-              <a:ext uri="{91240B29-F687-4f45-9708-019B960494DF}">
-                <a14:hiddenLine xmlns="" xmlns:a14="http://schemas.microsoft.com/office/drawing/2010/main" w="9525">
+              <a:ext uri="{91240B29-F687-4F45-9708-019B960494DF}">
+                <a14:hiddenLine xmlns:a14="http://schemas.microsoft.com/office/drawing/2010/main" w="9525">
                   <a:solidFill>
                     <a:srgbClr val="000000"/>
                   </a:solidFill>
@@ -1378,8 +1379,8 @@
               <a:noFill/>
             </a:ln>
             <a:extLst>
-              <a:ext uri="{91240B29-F687-4f45-9708-019B960494DF}">
-                <a14:hiddenLine xmlns="" xmlns:a14="http://schemas.microsoft.com/office/drawing/2010/main" w="9525">
+              <a:ext uri="{91240B29-F687-4F45-9708-019B960494DF}">
+                <a14:hiddenLine xmlns:a14="http://schemas.microsoft.com/office/drawing/2010/main" w="9525">
                   <a:solidFill>
                     <a:srgbClr val="000000"/>
                   </a:solidFill>
@@ -1468,8 +1469,8 @@
               <a:noFill/>
             </a:ln>
             <a:extLst>
-              <a:ext uri="{91240B29-F687-4f45-9708-019B960494DF}">
-                <a14:hiddenLine xmlns="" xmlns:a14="http://schemas.microsoft.com/office/drawing/2010/main" w="9525">
+              <a:ext uri="{91240B29-F687-4F45-9708-019B960494DF}">
+                <a14:hiddenLine xmlns:a14="http://schemas.microsoft.com/office/drawing/2010/main" w="9525">
                   <a:solidFill>
                     <a:srgbClr val="000000"/>
                   </a:solidFill>
@@ -1530,8 +1531,8 @@
               <a:noFill/>
             </a:ln>
             <a:extLst>
-              <a:ext uri="{91240B29-F687-4f45-9708-019B960494DF}">
-                <a14:hiddenLine xmlns="" xmlns:a14="http://schemas.microsoft.com/office/drawing/2010/main" w="9525">
+              <a:ext uri="{91240B29-F687-4F45-9708-019B960494DF}">
+                <a14:hiddenLine xmlns:a14="http://schemas.microsoft.com/office/drawing/2010/main" w="9525">
                   <a:solidFill>
                     <a:srgbClr val="000000"/>
                   </a:solidFill>
@@ -1620,8 +1621,8 @@
               <a:noFill/>
             </a:ln>
             <a:extLst>
-              <a:ext uri="{91240B29-F687-4f45-9708-019B960494DF}">
-                <a14:hiddenLine xmlns="" xmlns:a14="http://schemas.microsoft.com/office/drawing/2010/main" w="9525">
+              <a:ext uri="{91240B29-F687-4F45-9708-019B960494DF}">
+                <a14:hiddenLine xmlns:a14="http://schemas.microsoft.com/office/drawing/2010/main" w="9525">
                   <a:solidFill>
                     <a:srgbClr val="000000"/>
                   </a:solidFill>
@@ -1710,8 +1711,8 @@
               <a:noFill/>
             </a:ln>
             <a:extLst>
-              <a:ext uri="{91240B29-F687-4f45-9708-019B960494DF}">
-                <a14:hiddenLine xmlns="" xmlns:a14="http://schemas.microsoft.com/office/drawing/2010/main" w="9525">
+              <a:ext uri="{91240B29-F687-4F45-9708-019B960494DF}">
+                <a14:hiddenLine xmlns:a14="http://schemas.microsoft.com/office/drawing/2010/main" w="9525">
                   <a:solidFill>
                     <a:srgbClr val="000000"/>
                   </a:solidFill>
@@ -1766,8 +1767,8 @@
               <a:noFill/>
             </a:ln>
             <a:extLst>
-              <a:ext uri="{91240B29-F687-4f45-9708-019B960494DF}">
-                <a14:hiddenLine xmlns="" xmlns:a14="http://schemas.microsoft.com/office/drawing/2010/main" w="9525">
+              <a:ext uri="{91240B29-F687-4F45-9708-019B960494DF}">
+                <a14:hiddenLine xmlns:a14="http://schemas.microsoft.com/office/drawing/2010/main" w="9525">
                   <a:solidFill>
                     <a:srgbClr val="000000"/>
                   </a:solidFill>
@@ -1856,8 +1857,8 @@
               <a:noFill/>
             </a:ln>
             <a:extLst>
-              <a:ext uri="{91240B29-F687-4f45-9708-019B960494DF}">
-                <a14:hiddenLine xmlns="" xmlns:a14="http://schemas.microsoft.com/office/drawing/2010/main" w="9525">
+              <a:ext uri="{91240B29-F687-4F45-9708-019B960494DF}">
+                <a14:hiddenLine xmlns:a14="http://schemas.microsoft.com/office/drawing/2010/main" w="9525">
                   <a:solidFill>
                     <a:srgbClr val="000000"/>
                   </a:solidFill>
@@ -1912,8 +1913,8 @@
               <a:noFill/>
             </a:ln>
             <a:extLst>
-              <a:ext uri="{91240B29-F687-4f45-9708-019B960494DF}">
-                <a14:hiddenLine xmlns="" xmlns:a14="http://schemas.microsoft.com/office/drawing/2010/main" w="9525">
+              <a:ext uri="{91240B29-F687-4F45-9708-019B960494DF}">
+                <a14:hiddenLine xmlns:a14="http://schemas.microsoft.com/office/drawing/2010/main" w="9525">
                   <a:solidFill>
                     <a:srgbClr val="000000"/>
                   </a:solidFill>
@@ -2002,8 +2003,8 @@
               <a:noFill/>
             </a:ln>
             <a:extLst>
-              <a:ext uri="{91240B29-F687-4f45-9708-019B960494DF}">
-                <a14:hiddenLine xmlns="" xmlns:a14="http://schemas.microsoft.com/office/drawing/2010/main" w="9525">
+              <a:ext uri="{91240B29-F687-4F45-9708-019B960494DF}">
+                <a14:hiddenLine xmlns:a14="http://schemas.microsoft.com/office/drawing/2010/main" w="9525">
                   <a:solidFill>
                     <a:srgbClr val="000000"/>
                   </a:solidFill>
@@ -2070,8 +2071,8 @@
               <a:noFill/>
             </a:ln>
             <a:extLst>
-              <a:ext uri="{91240B29-F687-4f45-9708-019B960494DF}">
-                <a14:hiddenLine xmlns="" xmlns:a14="http://schemas.microsoft.com/office/drawing/2010/main" w="9525">
+              <a:ext uri="{91240B29-F687-4F45-9708-019B960494DF}">
+                <a14:hiddenLine xmlns:a14="http://schemas.microsoft.com/office/drawing/2010/main" w="9525">
                   <a:solidFill>
                     <a:srgbClr val="000000"/>
                   </a:solidFill>
@@ -2160,8 +2161,8 @@
               <a:noFill/>
             </a:ln>
             <a:extLst>
-              <a:ext uri="{91240B29-F687-4f45-9708-019B960494DF}">
-                <a14:hiddenLine xmlns="" xmlns:a14="http://schemas.microsoft.com/office/drawing/2010/main" w="9525">
+              <a:ext uri="{91240B29-F687-4F45-9708-019B960494DF}">
+                <a14:hiddenLine xmlns:a14="http://schemas.microsoft.com/office/drawing/2010/main" w="9525">
                   <a:solidFill>
                     <a:srgbClr val="000000"/>
                   </a:solidFill>
@@ -2228,8 +2229,8 @@
               <a:noFill/>
             </a:ln>
             <a:extLst>
-              <a:ext uri="{91240B29-F687-4f45-9708-019B960494DF}">
-                <a14:hiddenLine xmlns="" xmlns:a14="http://schemas.microsoft.com/office/drawing/2010/main" w="9525">
+              <a:ext uri="{91240B29-F687-4F45-9708-019B960494DF}">
+                <a14:hiddenLine xmlns:a14="http://schemas.microsoft.com/office/drawing/2010/main" w="9525">
                   <a:solidFill>
                     <a:srgbClr val="000000"/>
                   </a:solidFill>
@@ -2318,8 +2319,8 @@
               <a:noFill/>
             </a:ln>
             <a:extLst>
-              <a:ext uri="{91240B29-F687-4f45-9708-019B960494DF}">
-                <a14:hiddenLine xmlns="" xmlns:a14="http://schemas.microsoft.com/office/drawing/2010/main" w="9525">
+              <a:ext uri="{91240B29-F687-4F45-9708-019B960494DF}">
+                <a14:hiddenLine xmlns:a14="http://schemas.microsoft.com/office/drawing/2010/main" w="9525">
                   <a:solidFill>
                     <a:srgbClr val="000000"/>
                   </a:solidFill>
@@ -2352,8 +2353,8 @@
               <a:noFill/>
             </a:ln>
             <a:extLst>
-              <a:ext uri="{91240B29-F687-4f45-9708-019B960494DF}">
-                <a14:hiddenLine xmlns="" xmlns:a14="http://schemas.microsoft.com/office/drawing/2010/main" w="9525">
+              <a:ext uri="{91240B29-F687-4F45-9708-019B960494DF}">
+                <a14:hiddenLine xmlns:a14="http://schemas.microsoft.com/office/drawing/2010/main" w="9525">
                   <a:solidFill>
                     <a:srgbClr val="000000"/>
                   </a:solidFill>
@@ -2442,8 +2443,8 @@
               <a:noFill/>
             </a:ln>
             <a:extLst>
-              <a:ext uri="{91240B29-F687-4f45-9708-019B960494DF}">
-                <a14:hiddenLine xmlns="" xmlns:a14="http://schemas.microsoft.com/office/drawing/2010/main" w="9525">
+              <a:ext uri="{91240B29-F687-4F45-9708-019B960494DF}">
+                <a14:hiddenLine xmlns:a14="http://schemas.microsoft.com/office/drawing/2010/main" w="9525">
                   <a:solidFill>
                     <a:srgbClr val="000000"/>
                   </a:solidFill>
@@ -2504,8 +2505,8 @@
               <a:noFill/>
             </a:ln>
             <a:extLst>
-              <a:ext uri="{91240B29-F687-4f45-9708-019B960494DF}">
-                <a14:hiddenLine xmlns="" xmlns:a14="http://schemas.microsoft.com/office/drawing/2010/main" w="9525">
+              <a:ext uri="{91240B29-F687-4F45-9708-019B960494DF}">
+                <a14:hiddenLine xmlns:a14="http://schemas.microsoft.com/office/drawing/2010/main" w="9525">
                   <a:solidFill>
                     <a:srgbClr val="000000"/>
                   </a:solidFill>
@@ -2566,8 +2567,8 @@
               <a:noFill/>
             </a:ln>
             <a:extLst>
-              <a:ext uri="{91240B29-F687-4f45-9708-019B960494DF}">
-                <a14:hiddenLine xmlns="" xmlns:a14="http://schemas.microsoft.com/office/drawing/2010/main" w="9525">
+              <a:ext uri="{91240B29-F687-4F45-9708-019B960494DF}">
+                <a14:hiddenLine xmlns:a14="http://schemas.microsoft.com/office/drawing/2010/main" w="9525">
                   <a:solidFill>
                     <a:srgbClr val="000000"/>
                   </a:solidFill>
@@ -2656,8 +2657,8 @@
               <a:noFill/>
             </a:ln>
             <a:extLst>
-              <a:ext uri="{91240B29-F687-4f45-9708-019B960494DF}">
-                <a14:hiddenLine xmlns="" xmlns:a14="http://schemas.microsoft.com/office/drawing/2010/main" w="9525">
+              <a:ext uri="{91240B29-F687-4F45-9708-019B960494DF}">
+                <a14:hiddenLine xmlns:a14="http://schemas.microsoft.com/office/drawing/2010/main" w="9525">
                   <a:solidFill>
                     <a:srgbClr val="000000"/>
                   </a:solidFill>
@@ -2724,8 +2725,8 @@
               <a:noFill/>
             </a:ln>
             <a:extLst>
-              <a:ext uri="{91240B29-F687-4f45-9708-019B960494DF}">
-                <a14:hiddenLine xmlns="" xmlns:a14="http://schemas.microsoft.com/office/drawing/2010/main" w="9525">
+              <a:ext uri="{91240B29-F687-4F45-9708-019B960494DF}">
+                <a14:hiddenLine xmlns:a14="http://schemas.microsoft.com/office/drawing/2010/main" w="9525">
                   <a:solidFill>
                     <a:srgbClr val="000000"/>
                   </a:solidFill>
@@ -2786,8 +2787,8 @@
               <a:noFill/>
             </a:ln>
             <a:extLst>
-              <a:ext uri="{91240B29-F687-4f45-9708-019B960494DF}">
-                <a14:hiddenLine xmlns="" xmlns:a14="http://schemas.microsoft.com/office/drawing/2010/main" w="9525">
+              <a:ext uri="{91240B29-F687-4F45-9708-019B960494DF}">
+                <a14:hiddenLine xmlns:a14="http://schemas.microsoft.com/office/drawing/2010/main" w="9525">
                   <a:solidFill>
                     <a:srgbClr val="000000"/>
                   </a:solidFill>
@@ -2876,8 +2877,8 @@
               <a:noFill/>
             </a:ln>
             <a:extLst>
-              <a:ext uri="{91240B29-F687-4f45-9708-019B960494DF}">
-                <a14:hiddenLine xmlns="" xmlns:a14="http://schemas.microsoft.com/office/drawing/2010/main" w="9525">
+              <a:ext uri="{91240B29-F687-4F45-9708-019B960494DF}">
+                <a14:hiddenLine xmlns:a14="http://schemas.microsoft.com/office/drawing/2010/main" w="9525">
                   <a:solidFill>
                     <a:srgbClr val="000000"/>
                   </a:solidFill>
@@ -2938,8 +2939,8 @@
               <a:noFill/>
             </a:ln>
             <a:extLst>
-              <a:ext uri="{91240B29-F687-4f45-9708-019B960494DF}">
-                <a14:hiddenLine xmlns="" xmlns:a14="http://schemas.microsoft.com/office/drawing/2010/main" w="9525">
+              <a:ext uri="{91240B29-F687-4F45-9708-019B960494DF}">
+                <a14:hiddenLine xmlns:a14="http://schemas.microsoft.com/office/drawing/2010/main" w="9525">
                   <a:solidFill>
                     <a:srgbClr val="000000"/>
                   </a:solidFill>
@@ -3028,8 +3029,8 @@
               <a:noFill/>
             </a:ln>
             <a:extLst>
-              <a:ext uri="{91240B29-F687-4f45-9708-019B960494DF}">
-                <a14:hiddenLine xmlns="" xmlns:a14="http://schemas.microsoft.com/office/drawing/2010/main" w="9525">
+              <a:ext uri="{91240B29-F687-4F45-9708-019B960494DF}">
+                <a14:hiddenLine xmlns:a14="http://schemas.microsoft.com/office/drawing/2010/main" w="9525">
                   <a:solidFill>
                     <a:srgbClr val="000000"/>
                   </a:solidFill>
@@ -3090,8 +3091,8 @@
               <a:noFill/>
             </a:ln>
             <a:extLst>
-              <a:ext uri="{91240B29-F687-4f45-9708-019B960494DF}">
-                <a14:hiddenLine xmlns="" xmlns:a14="http://schemas.microsoft.com/office/drawing/2010/main" w="9525">
+              <a:ext uri="{91240B29-F687-4F45-9708-019B960494DF}">
+                <a14:hiddenLine xmlns:a14="http://schemas.microsoft.com/office/drawing/2010/main" w="9525">
                   <a:solidFill>
                     <a:srgbClr val="000000"/>
                   </a:solidFill>
@@ -3180,8 +3181,8 @@
               <a:noFill/>
             </a:ln>
             <a:extLst>
-              <a:ext uri="{91240B29-F687-4f45-9708-019B960494DF}">
-                <a14:hiddenLine xmlns="" xmlns:a14="http://schemas.microsoft.com/office/drawing/2010/main" w="9525">
+              <a:ext uri="{91240B29-F687-4F45-9708-019B960494DF}">
+                <a14:hiddenLine xmlns:a14="http://schemas.microsoft.com/office/drawing/2010/main" w="9525">
                   <a:solidFill>
                     <a:srgbClr val="000000"/>
                   </a:solidFill>
@@ -3214,8 +3215,8 @@
               <a:noFill/>
             </a:ln>
             <a:extLst>
-              <a:ext uri="{91240B29-F687-4f45-9708-019B960494DF}">
-                <a14:hiddenLine xmlns="" xmlns:a14="http://schemas.microsoft.com/office/drawing/2010/main" w="9525">
+              <a:ext uri="{91240B29-F687-4F45-9708-019B960494DF}">
+                <a14:hiddenLine xmlns:a14="http://schemas.microsoft.com/office/drawing/2010/main" w="9525">
                   <a:solidFill>
                     <a:srgbClr val="000000"/>
                   </a:solidFill>
@@ -3279,8 +3280,8 @@
               <a:noFill/>
             </a:ln>
             <a:extLst>
-              <a:ext uri="{91240B29-F687-4f45-9708-019B960494DF}">
-                <a14:hiddenLine xmlns="" xmlns:a14="http://schemas.microsoft.com/office/drawing/2010/main" w="9525">
+              <a:ext uri="{91240B29-F687-4F45-9708-019B960494DF}">
+                <a14:hiddenLine xmlns:a14="http://schemas.microsoft.com/office/drawing/2010/main" w="9525">
                   <a:solidFill>
                     <a:srgbClr val="000000"/>
                   </a:solidFill>
@@ -3369,8 +3370,8 @@
               <a:noFill/>
             </a:ln>
             <a:extLst>
-              <a:ext uri="{91240B29-F687-4f45-9708-019B960494DF}">
-                <a14:hiddenLine xmlns="" xmlns:a14="http://schemas.microsoft.com/office/drawing/2010/main" w="9525">
+              <a:ext uri="{91240B29-F687-4F45-9708-019B960494DF}">
+                <a14:hiddenLine xmlns:a14="http://schemas.microsoft.com/office/drawing/2010/main" w="9525">
                   <a:solidFill>
                     <a:srgbClr val="000000"/>
                   </a:solidFill>
@@ -3431,8 +3432,8 @@
               <a:noFill/>
             </a:ln>
             <a:extLst>
-              <a:ext uri="{91240B29-F687-4f45-9708-019B960494DF}">
-                <a14:hiddenLine xmlns="" xmlns:a14="http://schemas.microsoft.com/office/drawing/2010/main" w="9525">
+              <a:ext uri="{91240B29-F687-4F45-9708-019B960494DF}">
+                <a14:hiddenLine xmlns:a14="http://schemas.microsoft.com/office/drawing/2010/main" w="9525">
                   <a:solidFill>
                     <a:srgbClr val="000000"/>
                   </a:solidFill>
@@ -3521,8 +3522,8 @@
               <a:noFill/>
             </a:ln>
             <a:extLst>
-              <a:ext uri="{91240B29-F687-4f45-9708-019B960494DF}">
-                <a14:hiddenLine xmlns="" xmlns:a14="http://schemas.microsoft.com/office/drawing/2010/main" w="9525">
+              <a:ext uri="{91240B29-F687-4F45-9708-019B960494DF}">
+                <a14:hiddenLine xmlns:a14="http://schemas.microsoft.com/office/drawing/2010/main" w="9525">
                   <a:solidFill>
                     <a:srgbClr val="000000"/>
                   </a:solidFill>
@@ -3611,8 +3612,8 @@
               <a:noFill/>
             </a:ln>
             <a:extLst>
-              <a:ext uri="{91240B29-F687-4f45-9708-019B960494DF}">
-                <a14:hiddenLine xmlns="" xmlns:a14="http://schemas.microsoft.com/office/drawing/2010/main" w="9525">
+              <a:ext uri="{91240B29-F687-4F45-9708-019B960494DF}">
+                <a14:hiddenLine xmlns:a14="http://schemas.microsoft.com/office/drawing/2010/main" w="9525">
                   <a:solidFill>
                     <a:srgbClr val="000000"/>
                   </a:solidFill>
@@ -3676,8 +3677,8 @@
               <a:noFill/>
             </a:ln>
             <a:extLst>
-              <a:ext uri="{91240B29-F687-4f45-9708-019B960494DF}">
-                <a14:hiddenLine xmlns="" xmlns:a14="http://schemas.microsoft.com/office/drawing/2010/main" w="9525">
+              <a:ext uri="{91240B29-F687-4F45-9708-019B960494DF}">
+                <a14:hiddenLine xmlns:a14="http://schemas.microsoft.com/office/drawing/2010/main" w="9525">
                   <a:solidFill>
                     <a:srgbClr val="000000"/>
                   </a:solidFill>
@@ -3738,8 +3739,8 @@
               <a:noFill/>
             </a:ln>
             <a:extLst>
-              <a:ext uri="{91240B29-F687-4f45-9708-019B960494DF}">
-                <a14:hiddenLine xmlns="" xmlns:a14="http://schemas.microsoft.com/office/drawing/2010/main" w="9525">
+              <a:ext uri="{91240B29-F687-4F45-9708-019B960494DF}">
+                <a14:hiddenLine xmlns:a14="http://schemas.microsoft.com/office/drawing/2010/main" w="9525">
                   <a:solidFill>
                     <a:srgbClr val="000000"/>
                   </a:solidFill>
@@ -3828,8 +3829,8 @@
               <a:noFill/>
             </a:ln>
             <a:extLst>
-              <a:ext uri="{91240B29-F687-4f45-9708-019B960494DF}">
-                <a14:hiddenLine xmlns="" xmlns:a14="http://schemas.microsoft.com/office/drawing/2010/main" w="9525">
+              <a:ext uri="{91240B29-F687-4F45-9708-019B960494DF}">
+                <a14:hiddenLine xmlns:a14="http://schemas.microsoft.com/office/drawing/2010/main" w="9525">
                   <a:solidFill>
                     <a:srgbClr val="000000"/>
                   </a:solidFill>
@@ -3918,8 +3919,8 @@
               <a:noFill/>
             </a:ln>
             <a:extLst>
-              <a:ext uri="{91240B29-F687-4f45-9708-019B960494DF}">
-                <a14:hiddenLine xmlns="" xmlns:a14="http://schemas.microsoft.com/office/drawing/2010/main" w="9525">
+              <a:ext uri="{91240B29-F687-4F45-9708-019B960494DF}">
+                <a14:hiddenLine xmlns:a14="http://schemas.microsoft.com/office/drawing/2010/main" w="9525">
                   <a:solidFill>
                     <a:srgbClr val="000000"/>
                   </a:solidFill>
@@ -3980,8 +3981,8 @@
               <a:noFill/>
             </a:ln>
             <a:extLst>
-              <a:ext uri="{91240B29-F687-4f45-9708-019B960494DF}">
-                <a14:hiddenLine xmlns="" xmlns:a14="http://schemas.microsoft.com/office/drawing/2010/main" w="9525">
+              <a:ext uri="{91240B29-F687-4F45-9708-019B960494DF}">
+                <a14:hiddenLine xmlns:a14="http://schemas.microsoft.com/office/drawing/2010/main" w="9525">
                   <a:solidFill>
                     <a:srgbClr val="000000"/>
                   </a:solidFill>
@@ -4100,8 +4101,8 @@
               <a:noFill/>
             </a:ln>
             <a:extLst>
-              <a:ext uri="{91240B29-F687-4f45-9708-019B960494DF}">
-                <a14:hiddenLine xmlns="" xmlns:a14="http://schemas.microsoft.com/office/drawing/2010/main" w="9525">
+              <a:ext uri="{91240B29-F687-4F45-9708-019B960494DF}">
+                <a14:hiddenLine xmlns:a14="http://schemas.microsoft.com/office/drawing/2010/main" w="9525">
                   <a:solidFill>
                     <a:srgbClr val="000000"/>
                   </a:solidFill>
@@ -4168,8 +4169,8 @@
               <a:noFill/>
             </a:ln>
             <a:extLst>
-              <a:ext uri="{91240B29-F687-4f45-9708-019B960494DF}">
-                <a14:hiddenLine xmlns="" xmlns:a14="http://schemas.microsoft.com/office/drawing/2010/main" w="9525">
+              <a:ext uri="{91240B29-F687-4F45-9708-019B960494DF}">
+                <a14:hiddenLine xmlns:a14="http://schemas.microsoft.com/office/drawing/2010/main" w="9525">
                   <a:solidFill>
                     <a:srgbClr val="000000"/>
                   </a:solidFill>
@@ -4258,8 +4259,8 @@
               <a:noFill/>
             </a:ln>
             <a:extLst>
-              <a:ext uri="{91240B29-F687-4f45-9708-019B960494DF}">
-                <a14:hiddenLine xmlns="" xmlns:a14="http://schemas.microsoft.com/office/drawing/2010/main" w="9525">
+              <a:ext uri="{91240B29-F687-4F45-9708-019B960494DF}">
+                <a14:hiddenLine xmlns:a14="http://schemas.microsoft.com/office/drawing/2010/main" w="9525">
                   <a:solidFill>
                     <a:srgbClr val="000000"/>
                   </a:solidFill>
@@ -8980,8 +8981,8 @@
           </a:prstGeom>
           <a:noFill/>
           <a:extLst>
-            <a:ext uri="{909E8E84-426E-40dd-AFC4-6F175D3DCCD1}">
-              <a14:hiddenFill xmlns="" xmlns:a14="http://schemas.microsoft.com/office/drawing/2010/main">
+            <a:ext uri="{909E8E84-426E-40DD-AFC4-6F175D3DCCD1}">
+              <a14:hiddenFill xmlns:a14="http://schemas.microsoft.com/office/drawing/2010/main">
                 <a:solidFill>
                   <a:srgbClr val="FFFFFF"/>
                 </a:solidFill>
@@ -9054,8 +9055,8 @@
                 <a:noFill/>
               </a:ln>
               <a:extLst>
-                <a:ext uri="{91240B29-F687-4f45-9708-019B960494DF}">
-                  <a14:hiddenLine xmlns="" xmlns:a14="http://schemas.microsoft.com/office/drawing/2010/main" w="9525">
+                <a:ext uri="{91240B29-F687-4F45-9708-019B960494DF}">
+                  <a14:hiddenLine xmlns:a14="http://schemas.microsoft.com/office/drawing/2010/main" w="9525">
                     <a:solidFill>
                       <a:srgbClr val="000000"/>
                     </a:solidFill>
@@ -9144,8 +9145,8 @@
                 <a:noFill/>
               </a:ln>
               <a:extLst>
-                <a:ext uri="{91240B29-F687-4f45-9708-019B960494DF}">
-                  <a14:hiddenLine xmlns="" xmlns:a14="http://schemas.microsoft.com/office/drawing/2010/main" w="9525">
+                <a:ext uri="{91240B29-F687-4F45-9708-019B960494DF}">
+                  <a14:hiddenLine xmlns:a14="http://schemas.microsoft.com/office/drawing/2010/main" w="9525">
                     <a:solidFill>
                       <a:srgbClr val="000000"/>
                     </a:solidFill>
@@ -9234,8 +9235,8 @@
                 <a:noFill/>
               </a:ln>
               <a:extLst>
-                <a:ext uri="{91240B29-F687-4f45-9708-019B960494DF}">
-                  <a14:hiddenLine xmlns="" xmlns:a14="http://schemas.microsoft.com/office/drawing/2010/main" w="9525">
+                <a:ext uri="{91240B29-F687-4F45-9708-019B960494DF}">
+                  <a14:hiddenLine xmlns:a14="http://schemas.microsoft.com/office/drawing/2010/main" w="9525">
                     <a:solidFill>
                       <a:srgbClr val="000000"/>
                     </a:solidFill>
@@ -9296,8 +9297,8 @@
                 <a:noFill/>
               </a:ln>
               <a:extLst>
-                <a:ext uri="{91240B29-F687-4f45-9708-019B960494DF}">
-                  <a14:hiddenLine xmlns="" xmlns:a14="http://schemas.microsoft.com/office/drawing/2010/main" w="9525">
+                <a:ext uri="{91240B29-F687-4F45-9708-019B960494DF}">
+                  <a14:hiddenLine xmlns:a14="http://schemas.microsoft.com/office/drawing/2010/main" w="9525">
                     <a:solidFill>
                       <a:srgbClr val="000000"/>
                     </a:solidFill>
@@ -9386,8 +9387,8 @@
                 <a:noFill/>
               </a:ln>
               <a:extLst>
-                <a:ext uri="{91240B29-F687-4f45-9708-019B960494DF}">
-                  <a14:hiddenLine xmlns="" xmlns:a14="http://schemas.microsoft.com/office/drawing/2010/main" w="9525">
+                <a:ext uri="{91240B29-F687-4F45-9708-019B960494DF}">
+                  <a14:hiddenLine xmlns:a14="http://schemas.microsoft.com/office/drawing/2010/main" w="9525">
                     <a:solidFill>
                       <a:srgbClr val="000000"/>
                     </a:solidFill>
@@ -9448,8 +9449,8 @@
                 <a:noFill/>
               </a:ln>
               <a:extLst>
-                <a:ext uri="{91240B29-F687-4f45-9708-019B960494DF}">
-                  <a14:hiddenLine xmlns="" xmlns:a14="http://schemas.microsoft.com/office/drawing/2010/main" w="9525">
+                <a:ext uri="{91240B29-F687-4F45-9708-019B960494DF}">
+                  <a14:hiddenLine xmlns:a14="http://schemas.microsoft.com/office/drawing/2010/main" w="9525">
                     <a:solidFill>
                       <a:srgbClr val="000000"/>
                     </a:solidFill>
@@ -9510,8 +9511,8 @@
                 <a:noFill/>
               </a:ln>
               <a:extLst>
-                <a:ext uri="{91240B29-F687-4f45-9708-019B960494DF}">
-                  <a14:hiddenLine xmlns="" xmlns:a14="http://schemas.microsoft.com/office/drawing/2010/main" w="9525">
+                <a:ext uri="{91240B29-F687-4F45-9708-019B960494DF}">
+                  <a14:hiddenLine xmlns:a14="http://schemas.microsoft.com/office/drawing/2010/main" w="9525">
                     <a:solidFill>
                       <a:srgbClr val="000000"/>
                     </a:solidFill>
@@ -9600,8 +9601,8 @@
                 <a:noFill/>
               </a:ln>
               <a:extLst>
-                <a:ext uri="{91240B29-F687-4f45-9708-019B960494DF}">
-                  <a14:hiddenLine xmlns="" xmlns:a14="http://schemas.microsoft.com/office/drawing/2010/main" w="9525">
+                <a:ext uri="{91240B29-F687-4F45-9708-019B960494DF}">
+                  <a14:hiddenLine xmlns:a14="http://schemas.microsoft.com/office/drawing/2010/main" w="9525">
                     <a:solidFill>
                       <a:srgbClr val="000000"/>
                     </a:solidFill>
@@ -9690,8 +9691,8 @@
                 <a:noFill/>
               </a:ln>
               <a:extLst>
-                <a:ext uri="{91240B29-F687-4f45-9708-019B960494DF}">
-                  <a14:hiddenLine xmlns="" xmlns:a14="http://schemas.microsoft.com/office/drawing/2010/main" w="9525">
+                <a:ext uri="{91240B29-F687-4F45-9708-019B960494DF}">
+                  <a14:hiddenLine xmlns:a14="http://schemas.microsoft.com/office/drawing/2010/main" w="9525">
                     <a:solidFill>
                       <a:srgbClr val="000000"/>
                     </a:solidFill>
@@ -9752,8 +9753,8 @@
                 <a:noFill/>
               </a:ln>
               <a:extLst>
-                <a:ext uri="{91240B29-F687-4f45-9708-019B960494DF}">
-                  <a14:hiddenLine xmlns="" xmlns:a14="http://schemas.microsoft.com/office/drawing/2010/main" w="9525">
+                <a:ext uri="{91240B29-F687-4F45-9708-019B960494DF}">
+                  <a14:hiddenLine xmlns:a14="http://schemas.microsoft.com/office/drawing/2010/main" w="9525">
                     <a:solidFill>
                       <a:srgbClr val="000000"/>
                     </a:solidFill>
@@ -9862,8 +9863,8 @@
                 <a:noFill/>
               </a:ln>
               <a:extLst>
-                <a:ext uri="{91240B29-F687-4f45-9708-019B960494DF}">
-                  <a14:hiddenLine xmlns="" xmlns:a14="http://schemas.microsoft.com/office/drawing/2010/main" w="9525">
+                <a:ext uri="{91240B29-F687-4F45-9708-019B960494DF}">
+                  <a14:hiddenLine xmlns:a14="http://schemas.microsoft.com/office/drawing/2010/main" w="9525">
                     <a:solidFill>
                       <a:srgbClr val="000000"/>
                     </a:solidFill>
@@ -9946,8 +9947,8 @@
                 <a:noFill/>
               </a:ln>
               <a:extLst>
-                <a:ext uri="{91240B29-F687-4f45-9708-019B960494DF}">
-                  <a14:hiddenLine xmlns="" xmlns:a14="http://schemas.microsoft.com/office/drawing/2010/main" w="9525">
+                <a:ext uri="{91240B29-F687-4F45-9708-019B960494DF}">
+                  <a14:hiddenLine xmlns:a14="http://schemas.microsoft.com/office/drawing/2010/main" w="9525">
                     <a:solidFill>
                       <a:srgbClr val="000000"/>
                     </a:solidFill>
@@ -10008,8 +10009,8 @@
                 <a:noFill/>
               </a:ln>
               <a:extLst>
-                <a:ext uri="{91240B29-F687-4f45-9708-019B960494DF}">
-                  <a14:hiddenLine xmlns="" xmlns:a14="http://schemas.microsoft.com/office/drawing/2010/main" w="9525">
+                <a:ext uri="{91240B29-F687-4F45-9708-019B960494DF}">
+                  <a14:hiddenLine xmlns:a14="http://schemas.microsoft.com/office/drawing/2010/main" w="9525">
                     <a:solidFill>
                       <a:srgbClr val="000000"/>
                     </a:solidFill>
@@ -10070,8 +10071,8 @@
                 <a:noFill/>
               </a:ln>
               <a:extLst>
-                <a:ext uri="{91240B29-F687-4f45-9708-019B960494DF}">
-                  <a14:hiddenLine xmlns="" xmlns:a14="http://schemas.microsoft.com/office/drawing/2010/main" w="9525">
+                <a:ext uri="{91240B29-F687-4F45-9708-019B960494DF}">
+                  <a14:hiddenLine xmlns:a14="http://schemas.microsoft.com/office/drawing/2010/main" w="9525">
                     <a:solidFill>
                       <a:srgbClr val="000000"/>
                     </a:solidFill>
@@ -10160,8 +10161,8 @@
                 <a:noFill/>
               </a:ln>
               <a:extLst>
-                <a:ext uri="{91240B29-F687-4f45-9708-019B960494DF}">
-                  <a14:hiddenLine xmlns="" xmlns:a14="http://schemas.microsoft.com/office/drawing/2010/main" w="9525">
+                <a:ext uri="{91240B29-F687-4F45-9708-019B960494DF}">
+                  <a14:hiddenLine xmlns:a14="http://schemas.microsoft.com/office/drawing/2010/main" w="9525">
                     <a:solidFill>
                       <a:srgbClr val="000000"/>
                     </a:solidFill>
@@ -10194,8 +10195,8 @@
                 <a:noFill/>
               </a:ln>
               <a:extLst>
-                <a:ext uri="{91240B29-F687-4f45-9708-019B960494DF}">
-                  <a14:hiddenLine xmlns="" xmlns:a14="http://schemas.microsoft.com/office/drawing/2010/main" w="9525">
+                <a:ext uri="{91240B29-F687-4F45-9708-019B960494DF}">
+                  <a14:hiddenLine xmlns:a14="http://schemas.microsoft.com/office/drawing/2010/main" w="9525">
                     <a:solidFill>
                       <a:srgbClr val="000000"/>
                     </a:solidFill>
@@ -10259,8 +10260,8 @@
                 <a:noFill/>
               </a:ln>
               <a:extLst>
-                <a:ext uri="{91240B29-F687-4f45-9708-019B960494DF}">
-                  <a14:hiddenLine xmlns="" xmlns:a14="http://schemas.microsoft.com/office/drawing/2010/main" w="9525">
+                <a:ext uri="{91240B29-F687-4F45-9708-019B960494DF}">
+                  <a14:hiddenLine xmlns:a14="http://schemas.microsoft.com/office/drawing/2010/main" w="9525">
                     <a:solidFill>
                       <a:srgbClr val="000000"/>
                     </a:solidFill>
@@ -10349,8 +10350,8 @@
                 <a:noFill/>
               </a:ln>
               <a:extLst>
-                <a:ext uri="{91240B29-F687-4f45-9708-019B960494DF}">
-                  <a14:hiddenLine xmlns="" xmlns:a14="http://schemas.microsoft.com/office/drawing/2010/main" w="9525">
+                <a:ext uri="{91240B29-F687-4F45-9708-019B960494DF}">
+                  <a14:hiddenLine xmlns:a14="http://schemas.microsoft.com/office/drawing/2010/main" w="9525">
                     <a:solidFill>
                       <a:srgbClr val="000000"/>
                     </a:solidFill>
@@ -10411,8 +10412,8 @@
                 <a:noFill/>
               </a:ln>
               <a:extLst>
-                <a:ext uri="{91240B29-F687-4f45-9708-019B960494DF}">
-                  <a14:hiddenLine xmlns="" xmlns:a14="http://schemas.microsoft.com/office/drawing/2010/main" w="9525">
+                <a:ext uri="{91240B29-F687-4F45-9708-019B960494DF}">
+                  <a14:hiddenLine xmlns:a14="http://schemas.microsoft.com/office/drawing/2010/main" w="9525">
                     <a:solidFill>
                       <a:srgbClr val="000000"/>
                     </a:solidFill>
@@ -10501,8 +10502,8 @@
                 <a:noFill/>
               </a:ln>
               <a:extLst>
-                <a:ext uri="{91240B29-F687-4f45-9708-019B960494DF}">
-                  <a14:hiddenLine xmlns="" xmlns:a14="http://schemas.microsoft.com/office/drawing/2010/main" w="9525">
+                <a:ext uri="{91240B29-F687-4F45-9708-019B960494DF}">
+                  <a14:hiddenLine xmlns:a14="http://schemas.microsoft.com/office/drawing/2010/main" w="9525">
                     <a:solidFill>
                       <a:srgbClr val="000000"/>
                     </a:solidFill>
@@ -10566,8 +10567,8 @@
                 <a:noFill/>
               </a:ln>
               <a:extLst>
-                <a:ext uri="{91240B29-F687-4f45-9708-019B960494DF}">
-                  <a14:hiddenLine xmlns="" xmlns:a14="http://schemas.microsoft.com/office/drawing/2010/main" w="9525">
+                <a:ext uri="{91240B29-F687-4F45-9708-019B960494DF}">
+                  <a14:hiddenLine xmlns:a14="http://schemas.microsoft.com/office/drawing/2010/main" w="9525">
                     <a:solidFill>
                       <a:srgbClr val="000000"/>
                     </a:solidFill>
@@ -10628,8 +10629,8 @@
                 <a:noFill/>
               </a:ln>
               <a:extLst>
-                <a:ext uri="{91240B29-F687-4f45-9708-019B960494DF}">
-                  <a14:hiddenLine xmlns="" xmlns:a14="http://schemas.microsoft.com/office/drawing/2010/main" w="9525">
+                <a:ext uri="{91240B29-F687-4F45-9708-019B960494DF}">
+                  <a14:hiddenLine xmlns:a14="http://schemas.microsoft.com/office/drawing/2010/main" w="9525">
                     <a:solidFill>
                       <a:srgbClr val="000000"/>
                     </a:solidFill>
@@ -10718,8 +10719,8 @@
                 <a:noFill/>
               </a:ln>
               <a:extLst>
-                <a:ext uri="{91240B29-F687-4f45-9708-019B960494DF}">
-                  <a14:hiddenLine xmlns="" xmlns:a14="http://schemas.microsoft.com/office/drawing/2010/main" w="9525">
+                <a:ext uri="{91240B29-F687-4F45-9708-019B960494DF}">
+                  <a14:hiddenLine xmlns:a14="http://schemas.microsoft.com/office/drawing/2010/main" w="9525">
                     <a:solidFill>
                       <a:srgbClr val="000000"/>
                     </a:solidFill>
@@ -10808,8 +10809,8 @@
                 <a:noFill/>
               </a:ln>
               <a:extLst>
-                <a:ext uri="{91240B29-F687-4f45-9708-019B960494DF}">
-                  <a14:hiddenLine xmlns="" xmlns:a14="http://schemas.microsoft.com/office/drawing/2010/main" w="9525">
+                <a:ext uri="{91240B29-F687-4F45-9708-019B960494DF}">
+                  <a14:hiddenLine xmlns:a14="http://schemas.microsoft.com/office/drawing/2010/main" w="9525">
                     <a:solidFill>
                       <a:srgbClr val="000000"/>
                     </a:solidFill>
@@ -10873,8 +10874,8 @@
                 <a:noFill/>
               </a:ln>
               <a:extLst>
-                <a:ext uri="{91240B29-F687-4f45-9708-019B960494DF}">
-                  <a14:hiddenLine xmlns="" xmlns:a14="http://schemas.microsoft.com/office/drawing/2010/main" w="9525">
+                <a:ext uri="{91240B29-F687-4F45-9708-019B960494DF}">
+                  <a14:hiddenLine xmlns:a14="http://schemas.microsoft.com/office/drawing/2010/main" w="9525">
                     <a:solidFill>
                       <a:srgbClr val="000000"/>
                     </a:solidFill>
@@ -10993,8 +10994,8 @@
                 <a:noFill/>
               </a:ln>
               <a:extLst>
-                <a:ext uri="{91240B29-F687-4f45-9708-019B960494DF}">
-                  <a14:hiddenLine xmlns="" xmlns:a14="http://schemas.microsoft.com/office/drawing/2010/main" w="9525">
+                <a:ext uri="{91240B29-F687-4F45-9708-019B960494DF}">
+                  <a14:hiddenLine xmlns:a14="http://schemas.microsoft.com/office/drawing/2010/main" w="9525">
                     <a:solidFill>
                       <a:srgbClr val="000000"/>
                     </a:solidFill>
@@ -11091,8 +11092,8 @@
                 <a:noFill/>
               </a:ln>
               <a:extLst>
-                <a:ext uri="{91240B29-F687-4f45-9708-019B960494DF}">
-                  <a14:hiddenLine xmlns="" xmlns:a14="http://schemas.microsoft.com/office/drawing/2010/main" w="9525">
+                <a:ext uri="{91240B29-F687-4F45-9708-019B960494DF}">
+                  <a14:hiddenLine xmlns:a14="http://schemas.microsoft.com/office/drawing/2010/main" w="9525">
                     <a:solidFill>
                       <a:srgbClr val="000000"/>
                     </a:solidFill>
@@ -11206,8 +11207,8 @@
                 <a:noFill/>
               </a:ln>
               <a:extLst>
-                <a:ext uri="{91240B29-F687-4f45-9708-019B960494DF}">
-                  <a14:hiddenLine xmlns="" xmlns:a14="http://schemas.microsoft.com/office/drawing/2010/main" w="9525">
+                <a:ext uri="{91240B29-F687-4F45-9708-019B960494DF}">
+                  <a14:hiddenLine xmlns:a14="http://schemas.microsoft.com/office/drawing/2010/main" w="9525">
                     <a:solidFill>
                       <a:srgbClr val="000000"/>
                     </a:solidFill>
@@ -11296,8 +11297,8 @@
                 <a:noFill/>
               </a:ln>
               <a:extLst>
-                <a:ext uri="{91240B29-F687-4f45-9708-019B960494DF}">
-                  <a14:hiddenLine xmlns="" xmlns:a14="http://schemas.microsoft.com/office/drawing/2010/main" w="9525">
+                <a:ext uri="{91240B29-F687-4F45-9708-019B960494DF}">
+                  <a14:hiddenLine xmlns:a14="http://schemas.microsoft.com/office/drawing/2010/main" w="9525">
                     <a:solidFill>
                       <a:srgbClr val="000000"/>
                     </a:solidFill>
@@ -11361,8 +11362,8 @@
                 <a:noFill/>
               </a:ln>
               <a:extLst>
-                <a:ext uri="{91240B29-F687-4f45-9708-019B960494DF}">
-                  <a14:hiddenLine xmlns="" xmlns:a14="http://schemas.microsoft.com/office/drawing/2010/main" w="9525">
+                <a:ext uri="{91240B29-F687-4F45-9708-019B960494DF}">
+                  <a14:hiddenLine xmlns:a14="http://schemas.microsoft.com/office/drawing/2010/main" w="9525">
                     <a:solidFill>
                       <a:srgbClr val="000000"/>
                     </a:solidFill>
@@ -11451,8 +11452,8 @@
                 <a:noFill/>
               </a:ln>
               <a:extLst>
-                <a:ext uri="{91240B29-F687-4f45-9708-019B960494DF}">
-                  <a14:hiddenLine xmlns="" xmlns:a14="http://schemas.microsoft.com/office/drawing/2010/main" w="9525">
+                <a:ext uri="{91240B29-F687-4F45-9708-019B960494DF}">
+                  <a14:hiddenLine xmlns:a14="http://schemas.microsoft.com/office/drawing/2010/main" w="9525">
                     <a:solidFill>
                       <a:srgbClr val="000000"/>
                     </a:solidFill>
@@ -11519,8 +11520,8 @@
                 <a:noFill/>
               </a:ln>
               <a:extLst>
-                <a:ext uri="{91240B29-F687-4f45-9708-019B960494DF}">
-                  <a14:hiddenLine xmlns="" xmlns:a14="http://schemas.microsoft.com/office/drawing/2010/main" w="9525">
+                <a:ext uri="{91240B29-F687-4F45-9708-019B960494DF}">
+                  <a14:hiddenLine xmlns:a14="http://schemas.microsoft.com/office/drawing/2010/main" w="9525">
                     <a:solidFill>
                       <a:srgbClr val="000000"/>
                     </a:solidFill>
@@ -11609,8 +11610,8 @@
                 <a:noFill/>
               </a:ln>
               <a:extLst>
-                <a:ext uri="{91240B29-F687-4f45-9708-019B960494DF}">
-                  <a14:hiddenLine xmlns="" xmlns:a14="http://schemas.microsoft.com/office/drawing/2010/main" w="9525">
+                <a:ext uri="{91240B29-F687-4F45-9708-019B960494DF}">
+                  <a14:hiddenLine xmlns:a14="http://schemas.microsoft.com/office/drawing/2010/main" w="9525">
                     <a:solidFill>
                       <a:srgbClr val="000000"/>
                     </a:solidFill>
@@ -11677,8 +11678,8 @@
                 <a:noFill/>
               </a:ln>
               <a:extLst>
-                <a:ext uri="{91240B29-F687-4f45-9708-019B960494DF}">
-                  <a14:hiddenLine xmlns="" xmlns:a14="http://schemas.microsoft.com/office/drawing/2010/main" w="9525">
+                <a:ext uri="{91240B29-F687-4F45-9708-019B960494DF}">
+                  <a14:hiddenLine xmlns:a14="http://schemas.microsoft.com/office/drawing/2010/main" w="9525">
                     <a:solidFill>
                       <a:srgbClr val="000000"/>
                     </a:solidFill>
@@ -11767,8 +11768,8 @@
                 <a:noFill/>
               </a:ln>
               <a:extLst>
-                <a:ext uri="{91240B29-F687-4f45-9708-019B960494DF}">
-                  <a14:hiddenLine xmlns="" xmlns:a14="http://schemas.microsoft.com/office/drawing/2010/main" w="9525">
+                <a:ext uri="{91240B29-F687-4F45-9708-019B960494DF}">
+                  <a14:hiddenLine xmlns:a14="http://schemas.microsoft.com/office/drawing/2010/main" w="9525">
                     <a:solidFill>
                       <a:srgbClr val="000000"/>
                     </a:solidFill>
@@ -11801,8 +11802,8 @@
                 <a:noFill/>
               </a:ln>
               <a:extLst>
-                <a:ext uri="{91240B29-F687-4f45-9708-019B960494DF}">
-                  <a14:hiddenLine xmlns="" xmlns:a14="http://schemas.microsoft.com/office/drawing/2010/main" w="9525">
+                <a:ext uri="{91240B29-F687-4F45-9708-019B960494DF}">
+                  <a14:hiddenLine xmlns:a14="http://schemas.microsoft.com/office/drawing/2010/main" w="9525">
                     <a:solidFill>
                       <a:srgbClr val="000000"/>
                     </a:solidFill>
@@ -12364,7 +12365,7 @@
           <p:cNvPr id="2" name="Title 1">
             <a:extLst>
               <a:ext uri="{FF2B5EF4-FFF2-40B4-BE49-F238E27FC236}">
-                <a16:creationId xmlns:a16="http://schemas.microsoft.com/office/drawing/2014/main" id="{DAA157F9-F5F6-4D67-8FAC-3454FB31C10A}"/>
+                <a16:creationId xmlns:a16="http://schemas.microsoft.com/office/drawing/2014/main" xmlns="" id="{DAA157F9-F5F6-4D67-8FAC-3454FB31C10A}"/>
               </a:ext>
             </a:extLst>
           </p:cNvPr>
@@ -12399,7 +12400,7 @@
           <p:cNvPr id="3" name="Subtitle 2">
             <a:extLst>
               <a:ext uri="{FF2B5EF4-FFF2-40B4-BE49-F238E27FC236}">
-                <a16:creationId xmlns:a16="http://schemas.microsoft.com/office/drawing/2014/main" id="{AE57FBE7-F266-49C2-B6DE-6A5BF48393D2}"/>
+                <a16:creationId xmlns:a16="http://schemas.microsoft.com/office/drawing/2014/main" xmlns="" id="{AE57FBE7-F266-49C2-B6DE-6A5BF48393D2}"/>
               </a:ext>
             </a:extLst>
           </p:cNvPr>
@@ -12480,7 +12481,7 @@
           <p:cNvPr id="2" name="Title 1">
             <a:extLst>
               <a:ext uri="{FF2B5EF4-FFF2-40B4-BE49-F238E27FC236}">
-                <a16:creationId xmlns:a16="http://schemas.microsoft.com/office/drawing/2014/main" id="{FECF486F-E493-4806-B7AC-4C1D4CD9285B}"/>
+                <a16:creationId xmlns:a16="http://schemas.microsoft.com/office/drawing/2014/main" xmlns="" id="{FECF486F-E493-4806-B7AC-4C1D4CD9285B}"/>
               </a:ext>
             </a:extLst>
           </p:cNvPr>
@@ -12508,7 +12509,7 @@
           <p:cNvPr id="3" name="Content Placeholder 2">
             <a:extLst>
               <a:ext uri="{FF2B5EF4-FFF2-40B4-BE49-F238E27FC236}">
-                <a16:creationId xmlns:a16="http://schemas.microsoft.com/office/drawing/2014/main" id="{B5438673-2AD2-43EB-AE26-30AB304673CA}"/>
+                <a16:creationId xmlns:a16="http://schemas.microsoft.com/office/drawing/2014/main" xmlns="" id="{B5438673-2AD2-43EB-AE26-30AB304673CA}"/>
               </a:ext>
             </a:extLst>
           </p:cNvPr>
@@ -12600,7 +12601,7 @@
           <p:cNvPr id="2" name="Title 1">
             <a:extLst>
               <a:ext uri="{FF2B5EF4-FFF2-40B4-BE49-F238E27FC236}">
-                <a16:creationId xmlns:a16="http://schemas.microsoft.com/office/drawing/2014/main" id="{A9E243B0-34C1-4CE9-82E0-2BFA91EBA8CA}"/>
+                <a16:creationId xmlns:a16="http://schemas.microsoft.com/office/drawing/2014/main" xmlns="" id="{A9E243B0-34C1-4CE9-82E0-2BFA91EBA8CA}"/>
               </a:ext>
             </a:extLst>
           </p:cNvPr>
@@ -12628,7 +12629,7 @@
           <p:cNvPr id="3" name="Content Placeholder 2">
             <a:extLst>
               <a:ext uri="{FF2B5EF4-FFF2-40B4-BE49-F238E27FC236}">
-                <a16:creationId xmlns:a16="http://schemas.microsoft.com/office/drawing/2014/main" id="{B69D3425-04D1-418D-B45F-AA29626AC3BC}"/>
+                <a16:creationId xmlns:a16="http://schemas.microsoft.com/office/drawing/2014/main" xmlns="" id="{B69D3425-04D1-418D-B45F-AA29626AC3BC}"/>
               </a:ext>
             </a:extLst>
           </p:cNvPr>
@@ -12707,7 +12708,7 @@
           <p:cNvPr id="2" name="Title 1">
             <a:extLst>
               <a:ext uri="{FF2B5EF4-FFF2-40B4-BE49-F238E27FC236}">
-                <a16:creationId xmlns:a16="http://schemas.microsoft.com/office/drawing/2014/main" id="{789EE3C3-E50C-418D-8C19-3075E2EF491F}"/>
+                <a16:creationId xmlns:a16="http://schemas.microsoft.com/office/drawing/2014/main" xmlns="" id="{789EE3C3-E50C-418D-8C19-3075E2EF491F}"/>
               </a:ext>
             </a:extLst>
           </p:cNvPr>
@@ -12735,7 +12736,7 @@
           <p:cNvPr id="3" name="Content Placeholder 2">
             <a:extLst>
               <a:ext uri="{FF2B5EF4-FFF2-40B4-BE49-F238E27FC236}">
-                <a16:creationId xmlns:a16="http://schemas.microsoft.com/office/drawing/2014/main" id="{C07B4B5E-B9E9-41C1-9DE7-77FBC1F26A81}"/>
+                <a16:creationId xmlns:a16="http://schemas.microsoft.com/office/drawing/2014/main" xmlns="" id="{C07B4B5E-B9E9-41C1-9DE7-77FBC1F26A81}"/>
               </a:ext>
             </a:extLst>
           </p:cNvPr>
@@ -12746,27 +12747,60 @@
             <p:ph idx="1"/>
           </p:nvPr>
         </p:nvSpPr>
-        <p:spPr/>
+        <p:spPr>
+          <a:xfrm>
+            <a:off x="1124267" y="1980882"/>
+            <a:ext cx="9905999" cy="4122738"/>
+          </a:xfrm>
+        </p:spPr>
         <p:txBody>
-          <a:bodyPr/>
+          <a:bodyPr>
+            <a:normAutofit/>
+          </a:bodyPr>
           <a:lstStyle/>
           <a:p>
             <a:r>
+              <a:rPr lang="en-US" dirty="0" smtClean="0"/>
+              <a:t>Microsoft SQL Server is still the current plan for database software</a:t>
+            </a:r>
+          </a:p>
+          <a:p>
+            <a:r>
+              <a:rPr lang="en-US" dirty="0" smtClean="0"/>
+              <a:t>We </a:t>
+            </a:r>
+            <a:r>
               <a:rPr lang="en-US" dirty="0"/>
-              <a:t>We know where we will host it: we have permission to host it on the departments servers.</a:t>
-            </a:r>
+              <a:t>know where we will host it: we have permission to host it on the </a:t>
+            </a:r>
+            <a:r>
+              <a:rPr lang="en-US" dirty="0" smtClean="0"/>
+              <a:t>department’s servers.</a:t>
+            </a:r>
+          </a:p>
+          <a:p>
+            <a:r>
+              <a:rPr lang="en-US" dirty="0" smtClean="0"/>
+              <a:t>Waiting on confirmation from the department before we are able to have access</a:t>
+            </a:r>
+            <a:endParaRPr lang="en-US" dirty="0"/>
           </a:p>
           <a:p>
             <a:r>
               <a:rPr lang="en-US" dirty="0"/>
-              <a:t>We have all of our data fields mapped out</a:t>
-            </a:r>
-          </a:p>
-          <a:p>
-            <a:r>
-              <a:rPr lang="en-US" dirty="0"/>
-              <a:t> </a:t>
-            </a:r>
+              <a:t>We have all of our data fields mapped </a:t>
+            </a:r>
+            <a:r>
+              <a:rPr lang="en-US" dirty="0" smtClean="0"/>
+              <a:t>out</a:t>
+            </a:r>
+          </a:p>
+          <a:p>
+            <a:r>
+              <a:rPr lang="en-US" dirty="0" smtClean="0"/>
+              <a:t>A test database will be used to store and test data until we are able to gain server access</a:t>
+            </a:r>
+            <a:endParaRPr lang="en-US" dirty="0"/>
           </a:p>
         </p:txBody>
       </p:sp>
@@ -12802,13 +12836,7 @@
       </p:grpSpPr>
       <p:sp>
         <p:nvSpPr>
-          <p:cNvPr id="2" name="Title 1">
-            <a:extLst>
-              <a:ext uri="{FF2B5EF4-FFF2-40B4-BE49-F238E27FC236}">
-                <a16:creationId xmlns:a16="http://schemas.microsoft.com/office/drawing/2014/main" id="{5F69643D-C1F6-4408-B6D4-BAE8A2104414}"/>
-              </a:ext>
-            </a:extLst>
-          </p:cNvPr>
+          <p:cNvPr id="2" name="Title 1"/>
           <p:cNvSpPr>
             <a:spLocks noGrp="1"/>
           </p:cNvSpPr>
@@ -12822,64 +12850,58 @@
           <a:lstStyle/>
           <a:p>
             <a:r>
-              <a:rPr lang="en-US" dirty="0"/>
-              <a:t>Progress on barcode scanning </a:t>
-            </a:r>
+              <a:rPr lang="en-US" dirty="0" smtClean="0"/>
+              <a:t>Database Diagram</a:t>
+            </a:r>
+            <a:endParaRPr lang="en-US" dirty="0"/>
           </a:p>
         </p:txBody>
       </p:sp>
-      <p:sp>
-        <p:nvSpPr>
-          <p:cNvPr id="3" name="Content Placeholder 2">
+      <p:pic>
+        <p:nvPicPr>
+          <p:cNvPr id="1028" name="Picture 4" descr="E:\Documents\GitHub\InventoryManagement491\DatabaseDiagram.JPG"/>
+          <p:cNvPicPr>
+            <a:picLocks noChangeAspect="1" noChangeArrowheads="1"/>
+          </p:cNvPicPr>
+          <p:nvPr/>
+        </p:nvPicPr>
+        <p:blipFill>
+          <a:blip r:embed="rId2">
             <a:extLst>
-              <a:ext uri="{FF2B5EF4-FFF2-40B4-BE49-F238E27FC236}">
-                <a16:creationId xmlns:a16="http://schemas.microsoft.com/office/drawing/2014/main" id="{A6A66C1B-6094-4905-8262-B2B744AC8427}"/>
+              <a:ext uri="{28A0092B-C50C-407E-A947-70E740481C1C}">
+                <a14:useLocalDpi xmlns:a14="http://schemas.microsoft.com/office/drawing/2010/main" val="0"/>
               </a:ext>
             </a:extLst>
-          </p:cNvPr>
-          <p:cNvSpPr>
-            <a:spLocks noGrp="1"/>
-          </p:cNvSpPr>
-          <p:nvPr>
-            <p:ph idx="1"/>
-          </p:nvPr>
-        </p:nvSpPr>
-        <p:spPr/>
-        <p:txBody>
-          <a:bodyPr/>
-          <a:lstStyle/>
-          <a:p>
-            <a:r>
-              <a:rPr lang="en-US" dirty="0"/>
-              <a:t>The original plane was to use google vision to scan our barcodes, this was a dead end</a:t>
-            </a:r>
-          </a:p>
-          <a:p>
-            <a:r>
-              <a:rPr lang="en-US" dirty="0"/>
-              <a:t>Plan B is the </a:t>
-            </a:r>
-            <a:r>
-              <a:rPr lang="en-US" dirty="0" err="1"/>
-              <a:t>XZing.Net.Moblie</a:t>
-            </a:r>
-            <a:r>
-              <a:rPr lang="en-US" dirty="0"/>
-              <a:t> (Zebra crossing) library </a:t>
-            </a:r>
-          </a:p>
-          <a:p>
-            <a:r>
-              <a:rPr lang="en-US" dirty="0"/>
-              <a:t>Do to an unfamiliarity with the library, C# and Visual Studio we are currently in the experimentation faze of getting this component working and integrated in to the main application UI.</a:t>
-            </a:r>
-          </a:p>
-        </p:txBody>
-      </p:sp>
+          </a:blip>
+          <a:srcRect/>
+          <a:stretch>
+            <a:fillRect/>
+          </a:stretch>
+        </p:blipFill>
+        <p:spPr bwMode="auto">
+          <a:xfrm>
+            <a:off x="2355215" y="1873885"/>
+            <a:ext cx="7315200" cy="3819525"/>
+          </a:xfrm>
+          <a:prstGeom prst="rect">
+            <a:avLst/>
+          </a:prstGeom>
+          <a:noFill/>
+          <a:extLst>
+            <a:ext uri="{909E8E84-426E-40DD-AFC4-6F175D3DCCD1}">
+              <a14:hiddenFill xmlns:a14="http://schemas.microsoft.com/office/drawing/2010/main">
+                <a:solidFill>
+                  <a:srgbClr val="FFFFFF"/>
+                </a:solidFill>
+              </a14:hiddenFill>
+            </a:ext>
+          </a:extLst>
+        </p:spPr>
+      </p:pic>
     </p:spTree>
     <p:extLst>
       <p:ext uri="{BB962C8B-B14F-4D97-AF65-F5344CB8AC3E}">
-        <p14:creationId xmlns:p14="http://schemas.microsoft.com/office/powerpoint/2010/main" val="355725746"/>
+        <p14:creationId xmlns:p14="http://schemas.microsoft.com/office/powerpoint/2010/main" val="2944037379"/>
       </p:ext>
     </p:extLst>
   </p:cSld>
@@ -12911,7 +12933,7 @@
           <p:cNvPr id="2" name="Title 1">
             <a:extLst>
               <a:ext uri="{FF2B5EF4-FFF2-40B4-BE49-F238E27FC236}">
-                <a16:creationId xmlns:a16="http://schemas.microsoft.com/office/drawing/2014/main" id="{B6F4E8C4-4DDD-4066-8681-4117BCA019EB}"/>
+                <a16:creationId xmlns:a16="http://schemas.microsoft.com/office/drawing/2014/main" xmlns="" id="{5F69643D-C1F6-4408-B6D4-BAE8A2104414}"/>
               </a:ext>
             </a:extLst>
           </p:cNvPr>
@@ -12929,7 +12951,7 @@
           <a:p>
             <a:r>
               <a:rPr lang="en-US" dirty="0"/>
-              <a:t>Main Application UI</a:t>
+              <a:t>Progress on barcode scanning </a:t>
             </a:r>
           </a:p>
         </p:txBody>
@@ -12939,7 +12961,7 @@
           <p:cNvPr id="3" name="Content Placeholder 2">
             <a:extLst>
               <a:ext uri="{FF2B5EF4-FFF2-40B4-BE49-F238E27FC236}">
-                <a16:creationId xmlns:a16="http://schemas.microsoft.com/office/drawing/2014/main" id="{A0AB6638-8278-4D58-A692-11A50A8BF280}"/>
+                <a16:creationId xmlns:a16="http://schemas.microsoft.com/office/drawing/2014/main" xmlns="" id="{A6A66C1B-6094-4905-8262-B2B744AC8427}"/>
               </a:ext>
             </a:extLst>
           </p:cNvPr>
@@ -12957,7 +12979,51 @@
           <a:p>
             <a:r>
               <a:rPr lang="en-US" dirty="0"/>
-              <a:t>Demo</a:t>
+              <a:t>The original plane was to use </a:t>
+            </a:r>
+            <a:r>
+              <a:rPr lang="en-US" dirty="0" smtClean="0"/>
+              <a:t>Google Vision </a:t>
+            </a:r>
+            <a:r>
+              <a:rPr lang="en-US" dirty="0"/>
+              <a:t>to scan our barcodes, this was a dead end</a:t>
+            </a:r>
+          </a:p>
+          <a:p>
+            <a:r>
+              <a:rPr lang="en-US" dirty="0"/>
+              <a:t>Plan B is the </a:t>
+            </a:r>
+            <a:r>
+              <a:rPr lang="en-US" dirty="0" err="1"/>
+              <a:t>XZing.Net.Moblie</a:t>
+            </a:r>
+            <a:r>
+              <a:rPr lang="en-US" dirty="0"/>
+              <a:t> (Zebra crossing) library </a:t>
+            </a:r>
+          </a:p>
+          <a:p>
+            <a:r>
+              <a:rPr lang="en-US" dirty="0" smtClean="0"/>
+              <a:t>Due </a:t>
+            </a:r>
+            <a:r>
+              <a:rPr lang="en-US" dirty="0"/>
+              <a:t>to an unfamiliarity with the library, C# and Visual Studio we are currently in the experimentation </a:t>
+            </a:r>
+            <a:r>
+              <a:rPr lang="en-US" dirty="0" smtClean="0"/>
+              <a:t>phas</a:t>
+            </a:r>
+            <a:r>
+              <a:rPr lang="en-US" dirty="0" smtClean="0"/>
+              <a:t>e </a:t>
+            </a:r>
+            <a:r>
+              <a:rPr lang="en-US" dirty="0"/>
+              <a:t>of getting this component working and integrated in to the main application UI.</a:t>
             </a:r>
           </a:p>
         </p:txBody>
@@ -12965,7 +13031,7 @@
     </p:spTree>
     <p:extLst>
       <p:ext uri="{BB962C8B-B14F-4D97-AF65-F5344CB8AC3E}">
-        <p14:creationId xmlns:p14="http://schemas.microsoft.com/office/powerpoint/2010/main" val="597027864"/>
+        <p14:creationId xmlns:p14="http://schemas.microsoft.com/office/powerpoint/2010/main" val="355725746"/>
       </p:ext>
     </p:extLst>
   </p:cSld>
@@ -12997,7 +13063,7 @@
           <p:cNvPr id="2" name="Title 1">
             <a:extLst>
               <a:ext uri="{FF2B5EF4-FFF2-40B4-BE49-F238E27FC236}">
-                <a16:creationId xmlns:a16="http://schemas.microsoft.com/office/drawing/2014/main" id="{EFC9301D-F3AF-42F5-A810-6B091DC3F6D1}"/>
+                <a16:creationId xmlns:a16="http://schemas.microsoft.com/office/drawing/2014/main" xmlns="" id="{B6F4E8C4-4DDD-4066-8681-4117BCA019EB}"/>
               </a:ext>
             </a:extLst>
           </p:cNvPr>
@@ -13015,14 +13081,7 @@
           <a:p>
             <a:r>
               <a:rPr lang="en-US" dirty="0"/>
-              <a:t>The immediate Road ahead:</a:t>
-            </a:r>
-            <a:br>
-              <a:rPr lang="en-US" dirty="0"/>
-            </a:br>
-            <a:r>
-              <a:rPr lang="en-US" dirty="0"/>
-              <a:t> (now – end of the break)</a:t>
+              <a:t>Main Application UI</a:t>
             </a:r>
           </a:p>
         </p:txBody>
@@ -13032,7 +13091,7 @@
           <p:cNvPr id="3" name="Content Placeholder 2">
             <a:extLst>
               <a:ext uri="{FF2B5EF4-FFF2-40B4-BE49-F238E27FC236}">
-                <a16:creationId xmlns:a16="http://schemas.microsoft.com/office/drawing/2014/main" id="{9858B64C-D1A2-4BD8-8F78-F2E1B41EC300}"/>
+                <a16:creationId xmlns:a16="http://schemas.microsoft.com/office/drawing/2014/main" xmlns="" id="{A0AB6638-8278-4D58-A692-11A50A8BF280}"/>
               </a:ext>
             </a:extLst>
           </p:cNvPr>
@@ -13050,19 +13109,7 @@
           <a:p>
             <a:r>
               <a:rPr lang="en-US" dirty="0"/>
-              <a:t>Develop a better understanding of Zebra Crossing</a:t>
-            </a:r>
-          </a:p>
-          <a:p>
-            <a:r>
-              <a:rPr lang="en-US" dirty="0"/>
-              <a:t>Continue to improve the UI prototype</a:t>
-            </a:r>
-          </a:p>
-          <a:p>
-            <a:r>
-              <a:rPr lang="en-US" dirty="0"/>
-              <a:t>Add more documentation to the project </a:t>
+              <a:t>Demo</a:t>
             </a:r>
           </a:p>
         </p:txBody>
@@ -13070,7 +13117,7 @@
     </p:spTree>
     <p:extLst>
       <p:ext uri="{BB962C8B-B14F-4D97-AF65-F5344CB8AC3E}">
-        <p14:creationId xmlns:p14="http://schemas.microsoft.com/office/powerpoint/2010/main" val="1248477851"/>
+        <p14:creationId xmlns:p14="http://schemas.microsoft.com/office/powerpoint/2010/main" val="597027864"/>
       </p:ext>
     </p:extLst>
   </p:cSld>
@@ -13102,7 +13149,7 @@
           <p:cNvPr id="2" name="Title 1">
             <a:extLst>
               <a:ext uri="{FF2B5EF4-FFF2-40B4-BE49-F238E27FC236}">
-                <a16:creationId xmlns:a16="http://schemas.microsoft.com/office/drawing/2014/main" id="{63EAD743-D0AB-49B2-AAD8-3805D62E9C86}"/>
+                <a16:creationId xmlns:a16="http://schemas.microsoft.com/office/drawing/2014/main" xmlns="" id="{EFC9301D-F3AF-42F5-A810-6B091DC3F6D1}"/>
               </a:ext>
             </a:extLst>
           </p:cNvPr>
@@ -13120,14 +13167,14 @@
           <a:p>
             <a:r>
               <a:rPr lang="en-US" dirty="0"/>
-              <a:t>Further down the road:</a:t>
+              <a:t>The immediate Road ahead:</a:t>
             </a:r>
             <a:br>
               <a:rPr lang="en-US" dirty="0"/>
             </a:br>
             <a:r>
               <a:rPr lang="en-US" dirty="0"/>
-              <a:t>(next Semester)</a:t>
+              <a:t> (now – end of the break)</a:t>
             </a:r>
           </a:p>
         </p:txBody>
@@ -13137,7 +13184,134 @@
           <p:cNvPr id="3" name="Content Placeholder 2">
             <a:extLst>
               <a:ext uri="{FF2B5EF4-FFF2-40B4-BE49-F238E27FC236}">
-                <a16:creationId xmlns:a16="http://schemas.microsoft.com/office/drawing/2014/main" id="{0FEE96A9-7F44-4A4B-8E09-FA21FB671C5C}"/>
+                <a16:creationId xmlns:a16="http://schemas.microsoft.com/office/drawing/2014/main" xmlns="" id="{9858B64C-D1A2-4BD8-8F78-F2E1B41EC300}"/>
+              </a:ext>
+            </a:extLst>
+          </p:cNvPr>
+          <p:cNvSpPr>
+            <a:spLocks noGrp="1"/>
+          </p:cNvSpPr>
+          <p:nvPr>
+            <p:ph idx="1"/>
+          </p:nvPr>
+        </p:nvSpPr>
+        <p:spPr/>
+        <p:txBody>
+          <a:bodyPr>
+            <a:normAutofit lnSpcReduction="10000"/>
+          </a:bodyPr>
+          <a:lstStyle/>
+          <a:p>
+            <a:r>
+              <a:rPr lang="en-US" dirty="0"/>
+              <a:t>Begin writing stored procedures or queries for inserting, updating, and deleting data</a:t>
+            </a:r>
+          </a:p>
+          <a:p>
+            <a:r>
+              <a:rPr lang="en-US" dirty="0" smtClean="0"/>
+              <a:t>Establish user roles on the database end to ensure only privileged users can manipulate data</a:t>
+            </a:r>
+          </a:p>
+          <a:p>
+            <a:r>
+              <a:rPr lang="en-US" dirty="0" smtClean="0"/>
+              <a:t>Develop </a:t>
+            </a:r>
+            <a:r>
+              <a:rPr lang="en-US" dirty="0"/>
+              <a:t>a better understanding of Zebra Crossing</a:t>
+            </a:r>
+          </a:p>
+          <a:p>
+            <a:r>
+              <a:rPr lang="en-US" dirty="0"/>
+              <a:t>Continue to improve the UI prototype</a:t>
+            </a:r>
+          </a:p>
+          <a:p>
+            <a:r>
+              <a:rPr lang="en-US" dirty="0"/>
+              <a:t>Add more documentation to the </a:t>
+            </a:r>
+            <a:r>
+              <a:rPr lang="en-US" dirty="0" smtClean="0"/>
+              <a:t>project</a:t>
+            </a:r>
+          </a:p>
+        </p:txBody>
+      </p:sp>
+    </p:spTree>
+    <p:extLst>
+      <p:ext uri="{BB962C8B-B14F-4D97-AF65-F5344CB8AC3E}">
+        <p14:creationId xmlns:p14="http://schemas.microsoft.com/office/powerpoint/2010/main" val="1248477851"/>
+      </p:ext>
+    </p:extLst>
+  </p:cSld>
+  <p:clrMapOvr>
+    <a:masterClrMapping/>
+  </p:clrMapOvr>
+</p:sld>
+</file>
+
+<file path=ppt/slides/slide9.xml><?xml version="1.0" encoding="utf-8"?>
+<p:sld xmlns:a="http://schemas.openxmlformats.org/drawingml/2006/main" xmlns:r="http://schemas.openxmlformats.org/officeDocument/2006/relationships" xmlns:p="http://schemas.openxmlformats.org/presentationml/2006/main">
+  <p:cSld>
+    <p:spTree>
+      <p:nvGrpSpPr>
+        <p:cNvPr id="1" name=""/>
+        <p:cNvGrpSpPr/>
+        <p:nvPr/>
+      </p:nvGrpSpPr>
+      <p:grpSpPr>
+        <a:xfrm>
+          <a:off x="0" y="0"/>
+          <a:ext cx="0" cy="0"/>
+          <a:chOff x="0" y="0"/>
+          <a:chExt cx="0" cy="0"/>
+        </a:xfrm>
+      </p:grpSpPr>
+      <p:sp>
+        <p:nvSpPr>
+          <p:cNvPr id="2" name="Title 1">
+            <a:extLst>
+              <a:ext uri="{FF2B5EF4-FFF2-40B4-BE49-F238E27FC236}">
+                <a16:creationId xmlns:a16="http://schemas.microsoft.com/office/drawing/2014/main" xmlns="" id="{63EAD743-D0AB-49B2-AAD8-3805D62E9C86}"/>
+              </a:ext>
+            </a:extLst>
+          </p:cNvPr>
+          <p:cNvSpPr>
+            <a:spLocks noGrp="1"/>
+          </p:cNvSpPr>
+          <p:nvPr>
+            <p:ph type="title"/>
+          </p:nvPr>
+        </p:nvSpPr>
+        <p:spPr/>
+        <p:txBody>
+          <a:bodyPr/>
+          <a:lstStyle/>
+          <a:p>
+            <a:r>
+              <a:rPr lang="en-US" dirty="0"/>
+              <a:t>Further down the road:</a:t>
+            </a:r>
+            <a:br>
+              <a:rPr lang="en-US" dirty="0"/>
+            </a:br>
+            <a:r>
+              <a:rPr lang="en-US" dirty="0"/>
+              <a:t>(next Semester)</a:t>
+            </a:r>
+          </a:p>
+        </p:txBody>
+      </p:sp>
+      <p:sp>
+        <p:nvSpPr>
+          <p:cNvPr id="3" name="Content Placeholder 2">
+            <a:extLst>
+              <a:ext uri="{FF2B5EF4-FFF2-40B4-BE49-F238E27FC236}">
+                <a16:creationId xmlns:a16="http://schemas.microsoft.com/office/drawing/2014/main" xmlns="" id="{0FEE96A9-7F44-4A4B-8E09-FA21FB671C5C}"/>
               </a:ext>
             </a:extLst>
           </p:cNvPr>
@@ -13157,6 +13331,11 @@
               <a:rPr lang="en-US" dirty="0"/>
               <a:t>Create and deploy our database </a:t>
             </a:r>
+            <a:r>
+              <a:rPr lang="en-US" dirty="0" smtClean="0"/>
+              <a:t>on campus servers</a:t>
+            </a:r>
+            <a:endParaRPr lang="en-US" dirty="0"/>
           </a:p>
           <a:p>
             <a:r>
@@ -13179,8 +13358,13 @@
           <a:p>
             <a:r>
               <a:rPr lang="en-US" dirty="0"/>
-              <a:t>Package our documentation and Application in a  </a:t>
-            </a:r>
+              <a:t>Package our documentation and Application in </a:t>
+            </a:r>
+            <a:r>
+              <a:rPr lang="en-US"/>
+              <a:t>a </a:t>
+            </a:r>
+            <a:endParaRPr lang="en-US" dirty="0"/>
           </a:p>
         </p:txBody>
       </p:sp>
@@ -13442,7 +13626,7 @@
   <a:extraClrSchemeLst/>
   <a:extLst>
     <a:ext uri="{05A4C25C-085E-4340-85A3-A5531E510DB2}">
-      <thm15:themeFamily xmlns:thm15="http://schemas.microsoft.com/office/thememl/2012/main" name="Circuit" id="{0AC2F7E7-15F5-431C-B2A2-456FE929F56C}" vid="{0911B802-464C-4241-8DD9-B60FF88E379F}"/>
+      <thm15:themeFamily xmlns:thm15="http://schemas.microsoft.com/office/thememl/2012/main" xmlns="" name="Circuit" id="{0AC2F7E7-15F5-431C-B2A2-456FE929F56C}" vid="{0911B802-464C-4241-8DD9-B60FF88E379F}"/>
     </a:ext>
   </a:extLst>
 </a:theme>

</xml_diff>

<commit_message>
added screenshots to the presentation
</commit_message>
<xml_diff>
--- a/Inventory Management System demo draft.pptx
+++ b/Inventory Management System demo draft.pptx
@@ -11,8 +11,11 @@
     <p:sldId id="259" r:id="rId5"/>
     <p:sldId id="260" r:id="rId6"/>
     <p:sldId id="261" r:id="rId7"/>
-    <p:sldId id="262" r:id="rId8"/>
-    <p:sldId id="263" r:id="rId9"/>
+    <p:sldId id="264" r:id="rId8"/>
+    <p:sldId id="265" r:id="rId9"/>
+    <p:sldId id="266" r:id="rId10"/>
+    <p:sldId id="262" r:id="rId11"/>
+    <p:sldId id="263" r:id="rId12"/>
   </p:sldIdLst>
   <p:sldSz cx="12192000" cy="6858000"/>
   <p:notesSz cx="6858000" cy="9144000"/>
@@ -173,7 +176,7 @@
           <a:noFill/>
           <a:extLst>
             <a:ext uri="{909E8E84-426E-40dd-AFC4-6F175D3DCCD1}">
-              <a14:hiddenFill xmlns="" xmlns:a14="http://schemas.microsoft.com/office/drawing/2010/main">
+              <a14:hiddenFill xmlns:a14="http://schemas.microsoft.com/office/drawing/2010/main" xmlns="">
                 <a:solidFill>
                   <a:srgbClr val="FFFFFF"/>
                 </a:solidFill>
@@ -233,7 +236,7 @@
             </a:ln>
             <a:extLst>
               <a:ext uri="{91240B29-F687-4f45-9708-019B960494DF}">
-                <a14:hiddenLine xmlns="" xmlns:a14="http://schemas.microsoft.com/office/drawing/2010/main" w="9525">
+                <a14:hiddenLine xmlns:a14="http://schemas.microsoft.com/office/drawing/2010/main" xmlns="" w="9525">
                   <a:solidFill>
                     <a:srgbClr val="000000"/>
                   </a:solidFill>
@@ -323,7 +326,7 @@
             </a:ln>
             <a:extLst>
               <a:ext uri="{91240B29-F687-4f45-9708-019B960494DF}">
-                <a14:hiddenLine xmlns="" xmlns:a14="http://schemas.microsoft.com/office/drawing/2010/main" w="9525">
+                <a14:hiddenLine xmlns:a14="http://schemas.microsoft.com/office/drawing/2010/main" xmlns="" w="9525">
                   <a:solidFill>
                     <a:srgbClr val="000000"/>
                   </a:solidFill>
@@ -413,7 +416,7 @@
             </a:ln>
             <a:extLst>
               <a:ext uri="{91240B29-F687-4f45-9708-019B960494DF}">
-                <a14:hiddenLine xmlns="" xmlns:a14="http://schemas.microsoft.com/office/drawing/2010/main" w="9525">
+                <a14:hiddenLine xmlns:a14="http://schemas.microsoft.com/office/drawing/2010/main" xmlns="" w="9525">
                   <a:solidFill>
                     <a:srgbClr val="000000"/>
                   </a:solidFill>
@@ -447,7 +450,7 @@
             </a:ln>
             <a:extLst>
               <a:ext uri="{91240B29-F687-4f45-9708-019B960494DF}">
-                <a14:hiddenLine xmlns="" xmlns:a14="http://schemas.microsoft.com/office/drawing/2010/main" w="9525">
+                <a14:hiddenLine xmlns:a14="http://schemas.microsoft.com/office/drawing/2010/main" xmlns="" w="9525">
                   <a:solidFill>
                     <a:srgbClr val="000000"/>
                   </a:solidFill>
@@ -537,7 +540,7 @@
             </a:ln>
             <a:extLst>
               <a:ext uri="{91240B29-F687-4f45-9708-019B960494DF}">
-                <a14:hiddenLine xmlns="" xmlns:a14="http://schemas.microsoft.com/office/drawing/2010/main" w="9525">
+                <a14:hiddenLine xmlns:a14="http://schemas.microsoft.com/office/drawing/2010/main" xmlns="" w="9525">
                   <a:solidFill>
                     <a:srgbClr val="000000"/>
                   </a:solidFill>
@@ -599,7 +602,7 @@
             </a:ln>
             <a:extLst>
               <a:ext uri="{91240B29-F687-4f45-9708-019B960494DF}">
-                <a14:hiddenLine xmlns="" xmlns:a14="http://schemas.microsoft.com/office/drawing/2010/main" w="9525">
+                <a14:hiddenLine xmlns:a14="http://schemas.microsoft.com/office/drawing/2010/main" xmlns="" w="9525">
                   <a:solidFill>
                     <a:srgbClr val="000000"/>
                   </a:solidFill>
@@ -661,7 +664,7 @@
             </a:ln>
             <a:extLst>
               <a:ext uri="{91240B29-F687-4f45-9708-019B960494DF}">
-                <a14:hiddenLine xmlns="" xmlns:a14="http://schemas.microsoft.com/office/drawing/2010/main" w="9525">
+                <a14:hiddenLine xmlns:a14="http://schemas.microsoft.com/office/drawing/2010/main" xmlns="" w="9525">
                   <a:solidFill>
                     <a:srgbClr val="000000"/>
                   </a:solidFill>
@@ -751,7 +754,7 @@
             </a:ln>
             <a:extLst>
               <a:ext uri="{91240B29-F687-4f45-9708-019B960494DF}">
-                <a14:hiddenLine xmlns="" xmlns:a14="http://schemas.microsoft.com/office/drawing/2010/main" w="9525">
+                <a14:hiddenLine xmlns:a14="http://schemas.microsoft.com/office/drawing/2010/main" xmlns="" w="9525">
                   <a:solidFill>
                     <a:srgbClr val="000000"/>
                   </a:solidFill>
@@ -813,7 +816,7 @@
             </a:ln>
             <a:extLst>
               <a:ext uri="{91240B29-F687-4f45-9708-019B960494DF}">
-                <a14:hiddenLine xmlns="" xmlns:a14="http://schemas.microsoft.com/office/drawing/2010/main" w="9525">
+                <a14:hiddenLine xmlns:a14="http://schemas.microsoft.com/office/drawing/2010/main" xmlns="" w="9525">
                   <a:solidFill>
                     <a:srgbClr val="000000"/>
                   </a:solidFill>
@@ -875,7 +878,7 @@
             </a:ln>
             <a:extLst>
               <a:ext uri="{91240B29-F687-4f45-9708-019B960494DF}">
-                <a14:hiddenLine xmlns="" xmlns:a14="http://schemas.microsoft.com/office/drawing/2010/main" w="9525">
+                <a14:hiddenLine xmlns:a14="http://schemas.microsoft.com/office/drawing/2010/main" xmlns="" w="9525">
                   <a:solidFill>
                     <a:srgbClr val="000000"/>
                   </a:solidFill>
@@ -965,7 +968,7 @@
             </a:ln>
             <a:extLst>
               <a:ext uri="{91240B29-F687-4f45-9708-019B960494DF}">
-                <a14:hiddenLine xmlns="" xmlns:a14="http://schemas.microsoft.com/office/drawing/2010/main" w="9525">
+                <a14:hiddenLine xmlns:a14="http://schemas.microsoft.com/office/drawing/2010/main" xmlns="" w="9525">
                   <a:solidFill>
                     <a:srgbClr val="000000"/>
                   </a:solidFill>
@@ -1055,7 +1058,7 @@
             </a:ln>
             <a:extLst>
               <a:ext uri="{91240B29-F687-4f45-9708-019B960494DF}">
-                <a14:hiddenLine xmlns="" xmlns:a14="http://schemas.microsoft.com/office/drawing/2010/main" w="9525">
+                <a14:hiddenLine xmlns:a14="http://schemas.microsoft.com/office/drawing/2010/main" xmlns="" w="9525">
                   <a:solidFill>
                     <a:srgbClr val="000000"/>
                   </a:solidFill>
@@ -1117,7 +1120,7 @@
             </a:ln>
             <a:extLst>
               <a:ext uri="{91240B29-F687-4f45-9708-019B960494DF}">
-                <a14:hiddenLine xmlns="" xmlns:a14="http://schemas.microsoft.com/office/drawing/2010/main" w="9525">
+                <a14:hiddenLine xmlns:a14="http://schemas.microsoft.com/office/drawing/2010/main" xmlns="" w="9525">
                   <a:solidFill>
                     <a:srgbClr val="000000"/>
                   </a:solidFill>
@@ -1227,7 +1230,7 @@
             </a:ln>
             <a:extLst>
               <a:ext uri="{91240B29-F687-4f45-9708-019B960494DF}">
-                <a14:hiddenLine xmlns="" xmlns:a14="http://schemas.microsoft.com/office/drawing/2010/main" w="9525">
+                <a14:hiddenLine xmlns:a14="http://schemas.microsoft.com/office/drawing/2010/main" xmlns="" w="9525">
                   <a:solidFill>
                     <a:srgbClr val="000000"/>
                   </a:solidFill>
@@ -1289,7 +1292,7 @@
             </a:ln>
             <a:extLst>
               <a:ext uri="{91240B29-F687-4f45-9708-019B960494DF}">
-                <a14:hiddenLine xmlns="" xmlns:a14="http://schemas.microsoft.com/office/drawing/2010/main" w="9525">
+                <a14:hiddenLine xmlns:a14="http://schemas.microsoft.com/office/drawing/2010/main" xmlns="" w="9525">
                   <a:solidFill>
                     <a:srgbClr val="000000"/>
                   </a:solidFill>
@@ -1379,7 +1382,7 @@
             </a:ln>
             <a:extLst>
               <a:ext uri="{91240B29-F687-4f45-9708-019B960494DF}">
-                <a14:hiddenLine xmlns="" xmlns:a14="http://schemas.microsoft.com/office/drawing/2010/main" w="9525">
+                <a14:hiddenLine xmlns:a14="http://schemas.microsoft.com/office/drawing/2010/main" xmlns="" w="9525">
                   <a:solidFill>
                     <a:srgbClr val="000000"/>
                   </a:solidFill>
@@ -1469,7 +1472,7 @@
             </a:ln>
             <a:extLst>
               <a:ext uri="{91240B29-F687-4f45-9708-019B960494DF}">
-                <a14:hiddenLine xmlns="" xmlns:a14="http://schemas.microsoft.com/office/drawing/2010/main" w="9525">
+                <a14:hiddenLine xmlns:a14="http://schemas.microsoft.com/office/drawing/2010/main" xmlns="" w="9525">
                   <a:solidFill>
                     <a:srgbClr val="000000"/>
                   </a:solidFill>
@@ -1531,7 +1534,7 @@
             </a:ln>
             <a:extLst>
               <a:ext uri="{91240B29-F687-4f45-9708-019B960494DF}">
-                <a14:hiddenLine xmlns="" xmlns:a14="http://schemas.microsoft.com/office/drawing/2010/main" w="9525">
+                <a14:hiddenLine xmlns:a14="http://schemas.microsoft.com/office/drawing/2010/main" xmlns="" w="9525">
                   <a:solidFill>
                     <a:srgbClr val="000000"/>
                   </a:solidFill>
@@ -1621,7 +1624,7 @@
             </a:ln>
             <a:extLst>
               <a:ext uri="{91240B29-F687-4f45-9708-019B960494DF}">
-                <a14:hiddenLine xmlns="" xmlns:a14="http://schemas.microsoft.com/office/drawing/2010/main" w="9525">
+                <a14:hiddenLine xmlns:a14="http://schemas.microsoft.com/office/drawing/2010/main" xmlns="" w="9525">
                   <a:solidFill>
                     <a:srgbClr val="000000"/>
                   </a:solidFill>
@@ -1711,7 +1714,7 @@
             </a:ln>
             <a:extLst>
               <a:ext uri="{91240B29-F687-4f45-9708-019B960494DF}">
-                <a14:hiddenLine xmlns="" xmlns:a14="http://schemas.microsoft.com/office/drawing/2010/main" w="9525">
+                <a14:hiddenLine xmlns:a14="http://schemas.microsoft.com/office/drawing/2010/main" xmlns="" w="9525">
                   <a:solidFill>
                     <a:srgbClr val="000000"/>
                   </a:solidFill>
@@ -1767,7 +1770,7 @@
             </a:ln>
             <a:extLst>
               <a:ext uri="{91240B29-F687-4f45-9708-019B960494DF}">
-                <a14:hiddenLine xmlns="" xmlns:a14="http://schemas.microsoft.com/office/drawing/2010/main" w="9525">
+                <a14:hiddenLine xmlns:a14="http://schemas.microsoft.com/office/drawing/2010/main" xmlns="" w="9525">
                   <a:solidFill>
                     <a:srgbClr val="000000"/>
                   </a:solidFill>
@@ -1857,7 +1860,7 @@
             </a:ln>
             <a:extLst>
               <a:ext uri="{91240B29-F687-4f45-9708-019B960494DF}">
-                <a14:hiddenLine xmlns="" xmlns:a14="http://schemas.microsoft.com/office/drawing/2010/main" w="9525">
+                <a14:hiddenLine xmlns:a14="http://schemas.microsoft.com/office/drawing/2010/main" xmlns="" w="9525">
                   <a:solidFill>
                     <a:srgbClr val="000000"/>
                   </a:solidFill>
@@ -1913,7 +1916,7 @@
             </a:ln>
             <a:extLst>
               <a:ext uri="{91240B29-F687-4f45-9708-019B960494DF}">
-                <a14:hiddenLine xmlns="" xmlns:a14="http://schemas.microsoft.com/office/drawing/2010/main" w="9525">
+                <a14:hiddenLine xmlns:a14="http://schemas.microsoft.com/office/drawing/2010/main" xmlns="" w="9525">
                   <a:solidFill>
                     <a:srgbClr val="000000"/>
                   </a:solidFill>
@@ -2003,7 +2006,7 @@
             </a:ln>
             <a:extLst>
               <a:ext uri="{91240B29-F687-4f45-9708-019B960494DF}">
-                <a14:hiddenLine xmlns="" xmlns:a14="http://schemas.microsoft.com/office/drawing/2010/main" w="9525">
+                <a14:hiddenLine xmlns:a14="http://schemas.microsoft.com/office/drawing/2010/main" xmlns="" w="9525">
                   <a:solidFill>
                     <a:srgbClr val="000000"/>
                   </a:solidFill>
@@ -2071,7 +2074,7 @@
             </a:ln>
             <a:extLst>
               <a:ext uri="{91240B29-F687-4f45-9708-019B960494DF}">
-                <a14:hiddenLine xmlns="" xmlns:a14="http://schemas.microsoft.com/office/drawing/2010/main" w="9525">
+                <a14:hiddenLine xmlns:a14="http://schemas.microsoft.com/office/drawing/2010/main" xmlns="" w="9525">
                   <a:solidFill>
                     <a:srgbClr val="000000"/>
                   </a:solidFill>
@@ -2161,7 +2164,7 @@
             </a:ln>
             <a:extLst>
               <a:ext uri="{91240B29-F687-4f45-9708-019B960494DF}">
-                <a14:hiddenLine xmlns="" xmlns:a14="http://schemas.microsoft.com/office/drawing/2010/main" w="9525">
+                <a14:hiddenLine xmlns:a14="http://schemas.microsoft.com/office/drawing/2010/main" xmlns="" w="9525">
                   <a:solidFill>
                     <a:srgbClr val="000000"/>
                   </a:solidFill>
@@ -2229,7 +2232,7 @@
             </a:ln>
             <a:extLst>
               <a:ext uri="{91240B29-F687-4f45-9708-019B960494DF}">
-                <a14:hiddenLine xmlns="" xmlns:a14="http://schemas.microsoft.com/office/drawing/2010/main" w="9525">
+                <a14:hiddenLine xmlns:a14="http://schemas.microsoft.com/office/drawing/2010/main" xmlns="" w="9525">
                   <a:solidFill>
                     <a:srgbClr val="000000"/>
                   </a:solidFill>
@@ -2319,7 +2322,7 @@
             </a:ln>
             <a:extLst>
               <a:ext uri="{91240B29-F687-4f45-9708-019B960494DF}">
-                <a14:hiddenLine xmlns="" xmlns:a14="http://schemas.microsoft.com/office/drawing/2010/main" w="9525">
+                <a14:hiddenLine xmlns:a14="http://schemas.microsoft.com/office/drawing/2010/main" xmlns="" w="9525">
                   <a:solidFill>
                     <a:srgbClr val="000000"/>
                   </a:solidFill>
@@ -2353,7 +2356,7 @@
             </a:ln>
             <a:extLst>
               <a:ext uri="{91240B29-F687-4f45-9708-019B960494DF}">
-                <a14:hiddenLine xmlns="" xmlns:a14="http://schemas.microsoft.com/office/drawing/2010/main" w="9525">
+                <a14:hiddenLine xmlns:a14="http://schemas.microsoft.com/office/drawing/2010/main" xmlns="" w="9525">
                   <a:solidFill>
                     <a:srgbClr val="000000"/>
                   </a:solidFill>
@@ -2443,7 +2446,7 @@
             </a:ln>
             <a:extLst>
               <a:ext uri="{91240B29-F687-4f45-9708-019B960494DF}">
-                <a14:hiddenLine xmlns="" xmlns:a14="http://schemas.microsoft.com/office/drawing/2010/main" w="9525">
+                <a14:hiddenLine xmlns:a14="http://schemas.microsoft.com/office/drawing/2010/main" xmlns="" w="9525">
                   <a:solidFill>
                     <a:srgbClr val="000000"/>
                   </a:solidFill>
@@ -2505,7 +2508,7 @@
             </a:ln>
             <a:extLst>
               <a:ext uri="{91240B29-F687-4f45-9708-019B960494DF}">
-                <a14:hiddenLine xmlns="" xmlns:a14="http://schemas.microsoft.com/office/drawing/2010/main" w="9525">
+                <a14:hiddenLine xmlns:a14="http://schemas.microsoft.com/office/drawing/2010/main" xmlns="" w="9525">
                   <a:solidFill>
                     <a:srgbClr val="000000"/>
                   </a:solidFill>
@@ -2567,7 +2570,7 @@
             </a:ln>
             <a:extLst>
               <a:ext uri="{91240B29-F687-4f45-9708-019B960494DF}">
-                <a14:hiddenLine xmlns="" xmlns:a14="http://schemas.microsoft.com/office/drawing/2010/main" w="9525">
+                <a14:hiddenLine xmlns:a14="http://schemas.microsoft.com/office/drawing/2010/main" xmlns="" w="9525">
                   <a:solidFill>
                     <a:srgbClr val="000000"/>
                   </a:solidFill>
@@ -2657,7 +2660,7 @@
             </a:ln>
             <a:extLst>
               <a:ext uri="{91240B29-F687-4f45-9708-019B960494DF}">
-                <a14:hiddenLine xmlns="" xmlns:a14="http://schemas.microsoft.com/office/drawing/2010/main" w="9525">
+                <a14:hiddenLine xmlns:a14="http://schemas.microsoft.com/office/drawing/2010/main" xmlns="" w="9525">
                   <a:solidFill>
                     <a:srgbClr val="000000"/>
                   </a:solidFill>
@@ -2725,7 +2728,7 @@
             </a:ln>
             <a:extLst>
               <a:ext uri="{91240B29-F687-4f45-9708-019B960494DF}">
-                <a14:hiddenLine xmlns="" xmlns:a14="http://schemas.microsoft.com/office/drawing/2010/main" w="9525">
+                <a14:hiddenLine xmlns:a14="http://schemas.microsoft.com/office/drawing/2010/main" xmlns="" w="9525">
                   <a:solidFill>
                     <a:srgbClr val="000000"/>
                   </a:solidFill>
@@ -2787,7 +2790,7 @@
             </a:ln>
             <a:extLst>
               <a:ext uri="{91240B29-F687-4f45-9708-019B960494DF}">
-                <a14:hiddenLine xmlns="" xmlns:a14="http://schemas.microsoft.com/office/drawing/2010/main" w="9525">
+                <a14:hiddenLine xmlns:a14="http://schemas.microsoft.com/office/drawing/2010/main" xmlns="" w="9525">
                   <a:solidFill>
                     <a:srgbClr val="000000"/>
                   </a:solidFill>
@@ -2877,7 +2880,7 @@
             </a:ln>
             <a:extLst>
               <a:ext uri="{91240B29-F687-4f45-9708-019B960494DF}">
-                <a14:hiddenLine xmlns="" xmlns:a14="http://schemas.microsoft.com/office/drawing/2010/main" w="9525">
+                <a14:hiddenLine xmlns:a14="http://schemas.microsoft.com/office/drawing/2010/main" xmlns="" w="9525">
                   <a:solidFill>
                     <a:srgbClr val="000000"/>
                   </a:solidFill>
@@ -2939,7 +2942,7 @@
             </a:ln>
             <a:extLst>
               <a:ext uri="{91240B29-F687-4f45-9708-019B960494DF}">
-                <a14:hiddenLine xmlns="" xmlns:a14="http://schemas.microsoft.com/office/drawing/2010/main" w="9525">
+                <a14:hiddenLine xmlns:a14="http://schemas.microsoft.com/office/drawing/2010/main" xmlns="" w="9525">
                   <a:solidFill>
                     <a:srgbClr val="000000"/>
                   </a:solidFill>
@@ -3029,7 +3032,7 @@
             </a:ln>
             <a:extLst>
               <a:ext uri="{91240B29-F687-4f45-9708-019B960494DF}">
-                <a14:hiddenLine xmlns="" xmlns:a14="http://schemas.microsoft.com/office/drawing/2010/main" w="9525">
+                <a14:hiddenLine xmlns:a14="http://schemas.microsoft.com/office/drawing/2010/main" xmlns="" w="9525">
                   <a:solidFill>
                     <a:srgbClr val="000000"/>
                   </a:solidFill>
@@ -3091,7 +3094,7 @@
             </a:ln>
             <a:extLst>
               <a:ext uri="{91240B29-F687-4f45-9708-019B960494DF}">
-                <a14:hiddenLine xmlns="" xmlns:a14="http://schemas.microsoft.com/office/drawing/2010/main" w="9525">
+                <a14:hiddenLine xmlns:a14="http://schemas.microsoft.com/office/drawing/2010/main" xmlns="" w="9525">
                   <a:solidFill>
                     <a:srgbClr val="000000"/>
                   </a:solidFill>
@@ -3181,7 +3184,7 @@
             </a:ln>
             <a:extLst>
               <a:ext uri="{91240B29-F687-4f45-9708-019B960494DF}">
-                <a14:hiddenLine xmlns="" xmlns:a14="http://schemas.microsoft.com/office/drawing/2010/main" w="9525">
+                <a14:hiddenLine xmlns:a14="http://schemas.microsoft.com/office/drawing/2010/main" xmlns="" w="9525">
                   <a:solidFill>
                     <a:srgbClr val="000000"/>
                   </a:solidFill>
@@ -3215,7 +3218,7 @@
             </a:ln>
             <a:extLst>
               <a:ext uri="{91240B29-F687-4f45-9708-019B960494DF}">
-                <a14:hiddenLine xmlns="" xmlns:a14="http://schemas.microsoft.com/office/drawing/2010/main" w="9525">
+                <a14:hiddenLine xmlns:a14="http://schemas.microsoft.com/office/drawing/2010/main" xmlns="" w="9525">
                   <a:solidFill>
                     <a:srgbClr val="000000"/>
                   </a:solidFill>
@@ -3280,7 +3283,7 @@
             </a:ln>
             <a:extLst>
               <a:ext uri="{91240B29-F687-4f45-9708-019B960494DF}">
-                <a14:hiddenLine xmlns="" xmlns:a14="http://schemas.microsoft.com/office/drawing/2010/main" w="9525">
+                <a14:hiddenLine xmlns:a14="http://schemas.microsoft.com/office/drawing/2010/main" xmlns="" w="9525">
                   <a:solidFill>
                     <a:srgbClr val="000000"/>
                   </a:solidFill>
@@ -3370,7 +3373,7 @@
             </a:ln>
             <a:extLst>
               <a:ext uri="{91240B29-F687-4f45-9708-019B960494DF}">
-                <a14:hiddenLine xmlns="" xmlns:a14="http://schemas.microsoft.com/office/drawing/2010/main" w="9525">
+                <a14:hiddenLine xmlns:a14="http://schemas.microsoft.com/office/drawing/2010/main" xmlns="" w="9525">
                   <a:solidFill>
                     <a:srgbClr val="000000"/>
                   </a:solidFill>
@@ -3432,7 +3435,7 @@
             </a:ln>
             <a:extLst>
               <a:ext uri="{91240B29-F687-4f45-9708-019B960494DF}">
-                <a14:hiddenLine xmlns="" xmlns:a14="http://schemas.microsoft.com/office/drawing/2010/main" w="9525">
+                <a14:hiddenLine xmlns:a14="http://schemas.microsoft.com/office/drawing/2010/main" xmlns="" w="9525">
                   <a:solidFill>
                     <a:srgbClr val="000000"/>
                   </a:solidFill>
@@ -3522,7 +3525,7 @@
             </a:ln>
             <a:extLst>
               <a:ext uri="{91240B29-F687-4f45-9708-019B960494DF}">
-                <a14:hiddenLine xmlns="" xmlns:a14="http://schemas.microsoft.com/office/drawing/2010/main" w="9525">
+                <a14:hiddenLine xmlns:a14="http://schemas.microsoft.com/office/drawing/2010/main" xmlns="" w="9525">
                   <a:solidFill>
                     <a:srgbClr val="000000"/>
                   </a:solidFill>
@@ -3612,7 +3615,7 @@
             </a:ln>
             <a:extLst>
               <a:ext uri="{91240B29-F687-4f45-9708-019B960494DF}">
-                <a14:hiddenLine xmlns="" xmlns:a14="http://schemas.microsoft.com/office/drawing/2010/main" w="9525">
+                <a14:hiddenLine xmlns:a14="http://schemas.microsoft.com/office/drawing/2010/main" xmlns="" w="9525">
                   <a:solidFill>
                     <a:srgbClr val="000000"/>
                   </a:solidFill>
@@ -3677,7 +3680,7 @@
             </a:ln>
             <a:extLst>
               <a:ext uri="{91240B29-F687-4f45-9708-019B960494DF}">
-                <a14:hiddenLine xmlns="" xmlns:a14="http://schemas.microsoft.com/office/drawing/2010/main" w="9525">
+                <a14:hiddenLine xmlns:a14="http://schemas.microsoft.com/office/drawing/2010/main" xmlns="" w="9525">
                   <a:solidFill>
                     <a:srgbClr val="000000"/>
                   </a:solidFill>
@@ -3739,7 +3742,7 @@
             </a:ln>
             <a:extLst>
               <a:ext uri="{91240B29-F687-4f45-9708-019B960494DF}">
-                <a14:hiddenLine xmlns="" xmlns:a14="http://schemas.microsoft.com/office/drawing/2010/main" w="9525">
+                <a14:hiddenLine xmlns:a14="http://schemas.microsoft.com/office/drawing/2010/main" xmlns="" w="9525">
                   <a:solidFill>
                     <a:srgbClr val="000000"/>
                   </a:solidFill>
@@ -3829,7 +3832,7 @@
             </a:ln>
             <a:extLst>
               <a:ext uri="{91240B29-F687-4f45-9708-019B960494DF}">
-                <a14:hiddenLine xmlns="" xmlns:a14="http://schemas.microsoft.com/office/drawing/2010/main" w="9525">
+                <a14:hiddenLine xmlns:a14="http://schemas.microsoft.com/office/drawing/2010/main" xmlns="" w="9525">
                   <a:solidFill>
                     <a:srgbClr val="000000"/>
                   </a:solidFill>
@@ -3919,7 +3922,7 @@
             </a:ln>
             <a:extLst>
               <a:ext uri="{91240B29-F687-4f45-9708-019B960494DF}">
-                <a14:hiddenLine xmlns="" xmlns:a14="http://schemas.microsoft.com/office/drawing/2010/main" w="9525">
+                <a14:hiddenLine xmlns:a14="http://schemas.microsoft.com/office/drawing/2010/main" xmlns="" w="9525">
                   <a:solidFill>
                     <a:srgbClr val="000000"/>
                   </a:solidFill>
@@ -3981,7 +3984,7 @@
             </a:ln>
             <a:extLst>
               <a:ext uri="{91240B29-F687-4f45-9708-019B960494DF}">
-                <a14:hiddenLine xmlns="" xmlns:a14="http://schemas.microsoft.com/office/drawing/2010/main" w="9525">
+                <a14:hiddenLine xmlns:a14="http://schemas.microsoft.com/office/drawing/2010/main" xmlns="" w="9525">
                   <a:solidFill>
                     <a:srgbClr val="000000"/>
                   </a:solidFill>
@@ -4101,7 +4104,7 @@
             </a:ln>
             <a:extLst>
               <a:ext uri="{91240B29-F687-4f45-9708-019B960494DF}">
-                <a14:hiddenLine xmlns="" xmlns:a14="http://schemas.microsoft.com/office/drawing/2010/main" w="9525">
+                <a14:hiddenLine xmlns:a14="http://schemas.microsoft.com/office/drawing/2010/main" xmlns="" w="9525">
                   <a:solidFill>
                     <a:srgbClr val="000000"/>
                   </a:solidFill>
@@ -4169,7 +4172,7 @@
             </a:ln>
             <a:extLst>
               <a:ext uri="{91240B29-F687-4f45-9708-019B960494DF}">
-                <a14:hiddenLine xmlns="" xmlns:a14="http://schemas.microsoft.com/office/drawing/2010/main" w="9525">
+                <a14:hiddenLine xmlns:a14="http://schemas.microsoft.com/office/drawing/2010/main" xmlns="" w="9525">
                   <a:solidFill>
                     <a:srgbClr val="000000"/>
                   </a:solidFill>
@@ -4259,7 +4262,7 @@
             </a:ln>
             <a:extLst>
               <a:ext uri="{91240B29-F687-4f45-9708-019B960494DF}">
-                <a14:hiddenLine xmlns="" xmlns:a14="http://schemas.microsoft.com/office/drawing/2010/main" w="9525">
+                <a14:hiddenLine xmlns:a14="http://schemas.microsoft.com/office/drawing/2010/main" xmlns="" w="9525">
                   <a:solidFill>
                     <a:srgbClr val="000000"/>
                   </a:solidFill>
@@ -4399,7 +4402,7 @@
           <a:p>
             <a:fld id="{48A87A34-81AB-432B-8DAE-1953F412C126}" type="datetimeFigureOut">
               <a:rPr lang="en-US" dirty="0"/>
-              <a:t>11/28/2017</a:t>
+              <a:t>11/29/2017</a:t>
             </a:fld>
             <a:endParaRPr lang="en-US" dirty="0"/>
           </a:p>
@@ -4661,7 +4664,7 @@
           <a:p>
             <a:fld id="{48A87A34-81AB-432B-8DAE-1953F412C126}" type="datetimeFigureOut">
               <a:rPr lang="en-US" dirty="0"/>
-              <a:t>11/28/2017</a:t>
+              <a:t>11/29/2017</a:t>
             </a:fld>
             <a:endParaRPr lang="en-US" dirty="0"/>
           </a:p>
@@ -4852,7 +4855,7 @@
           <a:p>
             <a:fld id="{48A87A34-81AB-432B-8DAE-1953F412C126}" type="datetimeFigureOut">
               <a:rPr lang="en-US" dirty="0"/>
-              <a:t>11/28/2017</a:t>
+              <a:t>11/29/2017</a:t>
             </a:fld>
             <a:endParaRPr lang="en-US" dirty="0"/>
           </a:p>
@@ -5110,7 +5113,7 @@
           <a:p>
             <a:fld id="{48A87A34-81AB-432B-8DAE-1953F412C126}" type="datetimeFigureOut">
               <a:rPr lang="en-US" dirty="0"/>
-              <a:t>11/28/2017</a:t>
+              <a:t>11/29/2017</a:t>
             </a:fld>
             <a:endParaRPr lang="en-US" dirty="0"/>
           </a:p>
@@ -5539,7 +5542,7 @@
           <a:p>
             <a:fld id="{48A87A34-81AB-432B-8DAE-1953F412C126}" type="datetimeFigureOut">
               <a:rPr lang="en-US" dirty="0"/>
-              <a:t>11/28/2017</a:t>
+              <a:t>11/29/2017</a:t>
             </a:fld>
             <a:endParaRPr lang="en-US" dirty="0"/>
           </a:p>
@@ -6080,7 +6083,7 @@
           <a:p>
             <a:fld id="{48A87A34-81AB-432B-8DAE-1953F412C126}" type="datetimeFigureOut">
               <a:rPr lang="en-US" dirty="0"/>
-              <a:t>11/28/2017</a:t>
+              <a:t>11/29/2017</a:t>
             </a:fld>
             <a:endParaRPr lang="en-US" dirty="0"/>
           </a:p>
@@ -6795,7 +6798,7 @@
           <a:p>
             <a:fld id="{48A87A34-81AB-432B-8DAE-1953F412C126}" type="datetimeFigureOut">
               <a:rPr lang="en-US" dirty="0"/>
-              <a:t>11/28/2017</a:t>
+              <a:t>11/29/2017</a:t>
             </a:fld>
             <a:endParaRPr lang="en-US" dirty="0"/>
           </a:p>
@@ -6960,7 +6963,7 @@
           <a:p>
             <a:fld id="{48A87A34-81AB-432B-8DAE-1953F412C126}" type="datetimeFigureOut">
               <a:rPr lang="en-US" dirty="0"/>
-              <a:t>11/28/2017</a:t>
+              <a:t>11/29/2017</a:t>
             </a:fld>
             <a:endParaRPr lang="en-US" dirty="0"/>
           </a:p>
@@ -7135,7 +7138,7 @@
           <a:p>
             <a:fld id="{48A87A34-81AB-432B-8DAE-1953F412C126}" type="datetimeFigureOut">
               <a:rPr lang="en-US" dirty="0"/>
-              <a:t>11/28/2017</a:t>
+              <a:t>11/29/2017</a:t>
             </a:fld>
             <a:endParaRPr lang="en-US" dirty="0"/>
           </a:p>
@@ -7300,7 +7303,7 @@
           <a:p>
             <a:fld id="{48A87A34-81AB-432B-8DAE-1953F412C126}" type="datetimeFigureOut">
               <a:rPr lang="en-US" dirty="0"/>
-              <a:t>11/28/2017</a:t>
+              <a:t>11/29/2017</a:t>
             </a:fld>
             <a:endParaRPr lang="en-US" dirty="0"/>
           </a:p>
@@ -7545,7 +7548,7 @@
           <a:p>
             <a:fld id="{48A87A34-81AB-432B-8DAE-1953F412C126}" type="datetimeFigureOut">
               <a:rPr lang="en-US" dirty="0"/>
-              <a:t>11/28/2017</a:t>
+              <a:t>11/29/2017</a:t>
             </a:fld>
             <a:endParaRPr lang="en-US" dirty="0"/>
           </a:p>
@@ -7772,7 +7775,7 @@
           <a:p>
             <a:fld id="{48A87A34-81AB-432B-8DAE-1953F412C126}" type="datetimeFigureOut">
               <a:rPr lang="en-US" dirty="0"/>
-              <a:t>11/28/2017</a:t>
+              <a:t>11/29/2017</a:t>
             </a:fld>
             <a:endParaRPr lang="en-US" dirty="0"/>
           </a:p>
@@ -8148,7 +8151,7 @@
           <a:p>
             <a:fld id="{48A87A34-81AB-432B-8DAE-1953F412C126}" type="datetimeFigureOut">
               <a:rPr lang="en-US" dirty="0"/>
-              <a:t>11/28/2017</a:t>
+              <a:t>11/29/2017</a:t>
             </a:fld>
             <a:endParaRPr lang="en-US" dirty="0"/>
           </a:p>
@@ -8261,7 +8264,7 @@
           <a:p>
             <a:fld id="{48A87A34-81AB-432B-8DAE-1953F412C126}" type="datetimeFigureOut">
               <a:rPr lang="en-US" dirty="0"/>
-              <a:t>11/28/2017</a:t>
+              <a:t>11/29/2017</a:t>
             </a:fld>
             <a:endParaRPr lang="en-US" dirty="0"/>
           </a:p>
@@ -8351,7 +8354,7 @@
           <a:p>
             <a:fld id="{48A87A34-81AB-432B-8DAE-1953F412C126}" type="datetimeFigureOut">
               <a:rPr lang="en-US" dirty="0"/>
-              <a:t>11/28/2017</a:t>
+              <a:t>11/29/2017</a:t>
             </a:fld>
             <a:endParaRPr lang="en-US" dirty="0"/>
           </a:p>
@@ -8595,7 +8598,7 @@
           <a:p>
             <a:fld id="{48A87A34-81AB-432B-8DAE-1953F412C126}" type="datetimeFigureOut">
               <a:rPr lang="en-US" dirty="0"/>
-              <a:t>11/28/2017</a:t>
+              <a:t>11/29/2017</a:t>
             </a:fld>
             <a:endParaRPr lang="en-US" dirty="0"/>
           </a:p>
@@ -8870,7 +8873,7 @@
           <a:p>
             <a:fld id="{48A87A34-81AB-432B-8DAE-1953F412C126}" type="datetimeFigureOut">
               <a:rPr lang="en-US" dirty="0"/>
-              <a:t>11/28/2017</a:t>
+              <a:t>11/29/2017</a:t>
             </a:fld>
             <a:endParaRPr lang="en-US" dirty="0"/>
           </a:p>
@@ -8981,7 +8984,7 @@
           <a:noFill/>
           <a:extLst>
             <a:ext uri="{909E8E84-426E-40dd-AFC4-6F175D3DCCD1}">
-              <a14:hiddenFill xmlns="" xmlns:a14="http://schemas.microsoft.com/office/drawing/2010/main">
+              <a14:hiddenFill xmlns:a14="http://schemas.microsoft.com/office/drawing/2010/main" xmlns="">
                 <a:solidFill>
                   <a:srgbClr val="FFFFFF"/>
                 </a:solidFill>
@@ -9055,7 +9058,7 @@
               </a:ln>
               <a:extLst>
                 <a:ext uri="{91240B29-F687-4f45-9708-019B960494DF}">
-                  <a14:hiddenLine xmlns="" xmlns:a14="http://schemas.microsoft.com/office/drawing/2010/main" w="9525">
+                  <a14:hiddenLine xmlns:a14="http://schemas.microsoft.com/office/drawing/2010/main" xmlns="" w="9525">
                     <a:solidFill>
                       <a:srgbClr val="000000"/>
                     </a:solidFill>
@@ -9145,7 +9148,7 @@
               </a:ln>
               <a:extLst>
                 <a:ext uri="{91240B29-F687-4f45-9708-019B960494DF}">
-                  <a14:hiddenLine xmlns="" xmlns:a14="http://schemas.microsoft.com/office/drawing/2010/main" w="9525">
+                  <a14:hiddenLine xmlns:a14="http://schemas.microsoft.com/office/drawing/2010/main" xmlns="" w="9525">
                     <a:solidFill>
                       <a:srgbClr val="000000"/>
                     </a:solidFill>
@@ -9235,7 +9238,7 @@
               </a:ln>
               <a:extLst>
                 <a:ext uri="{91240B29-F687-4f45-9708-019B960494DF}">
-                  <a14:hiddenLine xmlns="" xmlns:a14="http://schemas.microsoft.com/office/drawing/2010/main" w="9525">
+                  <a14:hiddenLine xmlns:a14="http://schemas.microsoft.com/office/drawing/2010/main" xmlns="" w="9525">
                     <a:solidFill>
                       <a:srgbClr val="000000"/>
                     </a:solidFill>
@@ -9297,7 +9300,7 @@
               </a:ln>
               <a:extLst>
                 <a:ext uri="{91240B29-F687-4f45-9708-019B960494DF}">
-                  <a14:hiddenLine xmlns="" xmlns:a14="http://schemas.microsoft.com/office/drawing/2010/main" w="9525">
+                  <a14:hiddenLine xmlns:a14="http://schemas.microsoft.com/office/drawing/2010/main" xmlns="" w="9525">
                     <a:solidFill>
                       <a:srgbClr val="000000"/>
                     </a:solidFill>
@@ -9387,7 +9390,7 @@
               </a:ln>
               <a:extLst>
                 <a:ext uri="{91240B29-F687-4f45-9708-019B960494DF}">
-                  <a14:hiddenLine xmlns="" xmlns:a14="http://schemas.microsoft.com/office/drawing/2010/main" w="9525">
+                  <a14:hiddenLine xmlns:a14="http://schemas.microsoft.com/office/drawing/2010/main" xmlns="" w="9525">
                     <a:solidFill>
                       <a:srgbClr val="000000"/>
                     </a:solidFill>
@@ -9449,7 +9452,7 @@
               </a:ln>
               <a:extLst>
                 <a:ext uri="{91240B29-F687-4f45-9708-019B960494DF}">
-                  <a14:hiddenLine xmlns="" xmlns:a14="http://schemas.microsoft.com/office/drawing/2010/main" w="9525">
+                  <a14:hiddenLine xmlns:a14="http://schemas.microsoft.com/office/drawing/2010/main" xmlns="" w="9525">
                     <a:solidFill>
                       <a:srgbClr val="000000"/>
                     </a:solidFill>
@@ -9511,7 +9514,7 @@
               </a:ln>
               <a:extLst>
                 <a:ext uri="{91240B29-F687-4f45-9708-019B960494DF}">
-                  <a14:hiddenLine xmlns="" xmlns:a14="http://schemas.microsoft.com/office/drawing/2010/main" w="9525">
+                  <a14:hiddenLine xmlns:a14="http://schemas.microsoft.com/office/drawing/2010/main" xmlns="" w="9525">
                     <a:solidFill>
                       <a:srgbClr val="000000"/>
                     </a:solidFill>
@@ -9601,7 +9604,7 @@
               </a:ln>
               <a:extLst>
                 <a:ext uri="{91240B29-F687-4f45-9708-019B960494DF}">
-                  <a14:hiddenLine xmlns="" xmlns:a14="http://schemas.microsoft.com/office/drawing/2010/main" w="9525">
+                  <a14:hiddenLine xmlns:a14="http://schemas.microsoft.com/office/drawing/2010/main" xmlns="" w="9525">
                     <a:solidFill>
                       <a:srgbClr val="000000"/>
                     </a:solidFill>
@@ -9691,7 +9694,7 @@
               </a:ln>
               <a:extLst>
                 <a:ext uri="{91240B29-F687-4f45-9708-019B960494DF}">
-                  <a14:hiddenLine xmlns="" xmlns:a14="http://schemas.microsoft.com/office/drawing/2010/main" w="9525">
+                  <a14:hiddenLine xmlns:a14="http://schemas.microsoft.com/office/drawing/2010/main" xmlns="" w="9525">
                     <a:solidFill>
                       <a:srgbClr val="000000"/>
                     </a:solidFill>
@@ -9753,7 +9756,7 @@
               </a:ln>
               <a:extLst>
                 <a:ext uri="{91240B29-F687-4f45-9708-019B960494DF}">
-                  <a14:hiddenLine xmlns="" xmlns:a14="http://schemas.microsoft.com/office/drawing/2010/main" w="9525">
+                  <a14:hiddenLine xmlns:a14="http://schemas.microsoft.com/office/drawing/2010/main" xmlns="" w="9525">
                     <a:solidFill>
                       <a:srgbClr val="000000"/>
                     </a:solidFill>
@@ -9863,7 +9866,7 @@
               </a:ln>
               <a:extLst>
                 <a:ext uri="{91240B29-F687-4f45-9708-019B960494DF}">
-                  <a14:hiddenLine xmlns="" xmlns:a14="http://schemas.microsoft.com/office/drawing/2010/main" w="9525">
+                  <a14:hiddenLine xmlns:a14="http://schemas.microsoft.com/office/drawing/2010/main" xmlns="" w="9525">
                     <a:solidFill>
                       <a:srgbClr val="000000"/>
                     </a:solidFill>
@@ -9947,7 +9950,7 @@
               </a:ln>
               <a:extLst>
                 <a:ext uri="{91240B29-F687-4f45-9708-019B960494DF}">
-                  <a14:hiddenLine xmlns="" xmlns:a14="http://schemas.microsoft.com/office/drawing/2010/main" w="9525">
+                  <a14:hiddenLine xmlns:a14="http://schemas.microsoft.com/office/drawing/2010/main" xmlns="" w="9525">
                     <a:solidFill>
                       <a:srgbClr val="000000"/>
                     </a:solidFill>
@@ -10009,7 +10012,7 @@
               </a:ln>
               <a:extLst>
                 <a:ext uri="{91240B29-F687-4f45-9708-019B960494DF}">
-                  <a14:hiddenLine xmlns="" xmlns:a14="http://schemas.microsoft.com/office/drawing/2010/main" w="9525">
+                  <a14:hiddenLine xmlns:a14="http://schemas.microsoft.com/office/drawing/2010/main" xmlns="" w="9525">
                     <a:solidFill>
                       <a:srgbClr val="000000"/>
                     </a:solidFill>
@@ -10071,7 +10074,7 @@
               </a:ln>
               <a:extLst>
                 <a:ext uri="{91240B29-F687-4f45-9708-019B960494DF}">
-                  <a14:hiddenLine xmlns="" xmlns:a14="http://schemas.microsoft.com/office/drawing/2010/main" w="9525">
+                  <a14:hiddenLine xmlns:a14="http://schemas.microsoft.com/office/drawing/2010/main" xmlns="" w="9525">
                     <a:solidFill>
                       <a:srgbClr val="000000"/>
                     </a:solidFill>
@@ -10161,7 +10164,7 @@
               </a:ln>
               <a:extLst>
                 <a:ext uri="{91240B29-F687-4f45-9708-019B960494DF}">
-                  <a14:hiddenLine xmlns="" xmlns:a14="http://schemas.microsoft.com/office/drawing/2010/main" w="9525">
+                  <a14:hiddenLine xmlns:a14="http://schemas.microsoft.com/office/drawing/2010/main" xmlns="" w="9525">
                     <a:solidFill>
                       <a:srgbClr val="000000"/>
                     </a:solidFill>
@@ -10195,7 +10198,7 @@
               </a:ln>
               <a:extLst>
                 <a:ext uri="{91240B29-F687-4f45-9708-019B960494DF}">
-                  <a14:hiddenLine xmlns="" xmlns:a14="http://schemas.microsoft.com/office/drawing/2010/main" w="9525">
+                  <a14:hiddenLine xmlns:a14="http://schemas.microsoft.com/office/drawing/2010/main" xmlns="" w="9525">
                     <a:solidFill>
                       <a:srgbClr val="000000"/>
                     </a:solidFill>
@@ -10260,7 +10263,7 @@
               </a:ln>
               <a:extLst>
                 <a:ext uri="{91240B29-F687-4f45-9708-019B960494DF}">
-                  <a14:hiddenLine xmlns="" xmlns:a14="http://schemas.microsoft.com/office/drawing/2010/main" w="9525">
+                  <a14:hiddenLine xmlns:a14="http://schemas.microsoft.com/office/drawing/2010/main" xmlns="" w="9525">
                     <a:solidFill>
                       <a:srgbClr val="000000"/>
                     </a:solidFill>
@@ -10350,7 +10353,7 @@
               </a:ln>
               <a:extLst>
                 <a:ext uri="{91240B29-F687-4f45-9708-019B960494DF}">
-                  <a14:hiddenLine xmlns="" xmlns:a14="http://schemas.microsoft.com/office/drawing/2010/main" w="9525">
+                  <a14:hiddenLine xmlns:a14="http://schemas.microsoft.com/office/drawing/2010/main" xmlns="" w="9525">
                     <a:solidFill>
                       <a:srgbClr val="000000"/>
                     </a:solidFill>
@@ -10412,7 +10415,7 @@
               </a:ln>
               <a:extLst>
                 <a:ext uri="{91240B29-F687-4f45-9708-019B960494DF}">
-                  <a14:hiddenLine xmlns="" xmlns:a14="http://schemas.microsoft.com/office/drawing/2010/main" w="9525">
+                  <a14:hiddenLine xmlns:a14="http://schemas.microsoft.com/office/drawing/2010/main" xmlns="" w="9525">
                     <a:solidFill>
                       <a:srgbClr val="000000"/>
                     </a:solidFill>
@@ -10502,7 +10505,7 @@
               </a:ln>
               <a:extLst>
                 <a:ext uri="{91240B29-F687-4f45-9708-019B960494DF}">
-                  <a14:hiddenLine xmlns="" xmlns:a14="http://schemas.microsoft.com/office/drawing/2010/main" w="9525">
+                  <a14:hiddenLine xmlns:a14="http://schemas.microsoft.com/office/drawing/2010/main" xmlns="" w="9525">
                     <a:solidFill>
                       <a:srgbClr val="000000"/>
                     </a:solidFill>
@@ -10567,7 +10570,7 @@
               </a:ln>
               <a:extLst>
                 <a:ext uri="{91240B29-F687-4f45-9708-019B960494DF}">
-                  <a14:hiddenLine xmlns="" xmlns:a14="http://schemas.microsoft.com/office/drawing/2010/main" w="9525">
+                  <a14:hiddenLine xmlns:a14="http://schemas.microsoft.com/office/drawing/2010/main" xmlns="" w="9525">
                     <a:solidFill>
                       <a:srgbClr val="000000"/>
                     </a:solidFill>
@@ -10629,7 +10632,7 @@
               </a:ln>
               <a:extLst>
                 <a:ext uri="{91240B29-F687-4f45-9708-019B960494DF}">
-                  <a14:hiddenLine xmlns="" xmlns:a14="http://schemas.microsoft.com/office/drawing/2010/main" w="9525">
+                  <a14:hiddenLine xmlns:a14="http://schemas.microsoft.com/office/drawing/2010/main" xmlns="" w="9525">
                     <a:solidFill>
                       <a:srgbClr val="000000"/>
                     </a:solidFill>
@@ -10719,7 +10722,7 @@
               </a:ln>
               <a:extLst>
                 <a:ext uri="{91240B29-F687-4f45-9708-019B960494DF}">
-                  <a14:hiddenLine xmlns="" xmlns:a14="http://schemas.microsoft.com/office/drawing/2010/main" w="9525">
+                  <a14:hiddenLine xmlns:a14="http://schemas.microsoft.com/office/drawing/2010/main" xmlns="" w="9525">
                     <a:solidFill>
                       <a:srgbClr val="000000"/>
                     </a:solidFill>
@@ -10809,7 +10812,7 @@
               </a:ln>
               <a:extLst>
                 <a:ext uri="{91240B29-F687-4f45-9708-019B960494DF}">
-                  <a14:hiddenLine xmlns="" xmlns:a14="http://schemas.microsoft.com/office/drawing/2010/main" w="9525">
+                  <a14:hiddenLine xmlns:a14="http://schemas.microsoft.com/office/drawing/2010/main" xmlns="" w="9525">
                     <a:solidFill>
                       <a:srgbClr val="000000"/>
                     </a:solidFill>
@@ -10874,7 +10877,7 @@
               </a:ln>
               <a:extLst>
                 <a:ext uri="{91240B29-F687-4f45-9708-019B960494DF}">
-                  <a14:hiddenLine xmlns="" xmlns:a14="http://schemas.microsoft.com/office/drawing/2010/main" w="9525">
+                  <a14:hiddenLine xmlns:a14="http://schemas.microsoft.com/office/drawing/2010/main" xmlns="" w="9525">
                     <a:solidFill>
                       <a:srgbClr val="000000"/>
                     </a:solidFill>
@@ -10994,7 +10997,7 @@
               </a:ln>
               <a:extLst>
                 <a:ext uri="{91240B29-F687-4f45-9708-019B960494DF}">
-                  <a14:hiddenLine xmlns="" xmlns:a14="http://schemas.microsoft.com/office/drawing/2010/main" w="9525">
+                  <a14:hiddenLine xmlns:a14="http://schemas.microsoft.com/office/drawing/2010/main" xmlns="" w="9525">
                     <a:solidFill>
                       <a:srgbClr val="000000"/>
                     </a:solidFill>
@@ -11092,7 +11095,7 @@
               </a:ln>
               <a:extLst>
                 <a:ext uri="{91240B29-F687-4f45-9708-019B960494DF}">
-                  <a14:hiddenLine xmlns="" xmlns:a14="http://schemas.microsoft.com/office/drawing/2010/main" w="9525">
+                  <a14:hiddenLine xmlns:a14="http://schemas.microsoft.com/office/drawing/2010/main" xmlns="" w="9525">
                     <a:solidFill>
                       <a:srgbClr val="000000"/>
                     </a:solidFill>
@@ -11207,7 +11210,7 @@
               </a:ln>
               <a:extLst>
                 <a:ext uri="{91240B29-F687-4f45-9708-019B960494DF}">
-                  <a14:hiddenLine xmlns="" xmlns:a14="http://schemas.microsoft.com/office/drawing/2010/main" w="9525">
+                  <a14:hiddenLine xmlns:a14="http://schemas.microsoft.com/office/drawing/2010/main" xmlns="" w="9525">
                     <a:solidFill>
                       <a:srgbClr val="000000"/>
                     </a:solidFill>
@@ -11297,7 +11300,7 @@
               </a:ln>
               <a:extLst>
                 <a:ext uri="{91240B29-F687-4f45-9708-019B960494DF}">
-                  <a14:hiddenLine xmlns="" xmlns:a14="http://schemas.microsoft.com/office/drawing/2010/main" w="9525">
+                  <a14:hiddenLine xmlns:a14="http://schemas.microsoft.com/office/drawing/2010/main" xmlns="" w="9525">
                     <a:solidFill>
                       <a:srgbClr val="000000"/>
                     </a:solidFill>
@@ -11362,7 +11365,7 @@
               </a:ln>
               <a:extLst>
                 <a:ext uri="{91240B29-F687-4f45-9708-019B960494DF}">
-                  <a14:hiddenLine xmlns="" xmlns:a14="http://schemas.microsoft.com/office/drawing/2010/main" w="9525">
+                  <a14:hiddenLine xmlns:a14="http://schemas.microsoft.com/office/drawing/2010/main" xmlns="" w="9525">
                     <a:solidFill>
                       <a:srgbClr val="000000"/>
                     </a:solidFill>
@@ -11452,7 +11455,7 @@
               </a:ln>
               <a:extLst>
                 <a:ext uri="{91240B29-F687-4f45-9708-019B960494DF}">
-                  <a14:hiddenLine xmlns="" xmlns:a14="http://schemas.microsoft.com/office/drawing/2010/main" w="9525">
+                  <a14:hiddenLine xmlns:a14="http://schemas.microsoft.com/office/drawing/2010/main" xmlns="" w="9525">
                     <a:solidFill>
                       <a:srgbClr val="000000"/>
                     </a:solidFill>
@@ -11520,7 +11523,7 @@
               </a:ln>
               <a:extLst>
                 <a:ext uri="{91240B29-F687-4f45-9708-019B960494DF}">
-                  <a14:hiddenLine xmlns="" xmlns:a14="http://schemas.microsoft.com/office/drawing/2010/main" w="9525">
+                  <a14:hiddenLine xmlns:a14="http://schemas.microsoft.com/office/drawing/2010/main" xmlns="" w="9525">
                     <a:solidFill>
                       <a:srgbClr val="000000"/>
                     </a:solidFill>
@@ -11610,7 +11613,7 @@
               </a:ln>
               <a:extLst>
                 <a:ext uri="{91240B29-F687-4f45-9708-019B960494DF}">
-                  <a14:hiddenLine xmlns="" xmlns:a14="http://schemas.microsoft.com/office/drawing/2010/main" w="9525">
+                  <a14:hiddenLine xmlns:a14="http://schemas.microsoft.com/office/drawing/2010/main" xmlns="" w="9525">
                     <a:solidFill>
                       <a:srgbClr val="000000"/>
                     </a:solidFill>
@@ -11678,7 +11681,7 @@
               </a:ln>
               <a:extLst>
                 <a:ext uri="{91240B29-F687-4f45-9708-019B960494DF}">
-                  <a14:hiddenLine xmlns="" xmlns:a14="http://schemas.microsoft.com/office/drawing/2010/main" w="9525">
+                  <a14:hiddenLine xmlns:a14="http://schemas.microsoft.com/office/drawing/2010/main" xmlns="" w="9525">
                     <a:solidFill>
                       <a:srgbClr val="000000"/>
                     </a:solidFill>
@@ -11768,7 +11771,7 @@
               </a:ln>
               <a:extLst>
                 <a:ext uri="{91240B29-F687-4f45-9708-019B960494DF}">
-                  <a14:hiddenLine xmlns="" xmlns:a14="http://schemas.microsoft.com/office/drawing/2010/main" w="9525">
+                  <a14:hiddenLine xmlns:a14="http://schemas.microsoft.com/office/drawing/2010/main" xmlns="" w="9525">
                     <a:solidFill>
                       <a:srgbClr val="000000"/>
                     </a:solidFill>
@@ -11802,7 +11805,7 @@
               </a:ln>
               <a:extLst>
                 <a:ext uri="{91240B29-F687-4f45-9708-019B960494DF}">
-                  <a14:hiddenLine xmlns="" xmlns:a14="http://schemas.microsoft.com/office/drawing/2010/main" w="9525">
+                  <a14:hiddenLine xmlns:a14="http://schemas.microsoft.com/office/drawing/2010/main" xmlns="" w="9525">
                     <a:solidFill>
                       <a:srgbClr val="000000"/>
                     </a:solidFill>
@@ -11943,7 +11946,7 @@
             <a:fld id="{48A87A34-81AB-432B-8DAE-1953F412C126}" type="datetimeFigureOut">
               <a:rPr lang="en-US" dirty="0"/>
               <a:pPr/>
-              <a:t>11/28/2017</a:t>
+              <a:t>11/29/2017</a:t>
             </a:fld>
             <a:endParaRPr lang="en-US" dirty="0"/>
           </a:p>
@@ -12458,6 +12461,230 @@
 </p:sld>
 </file>
 
+<file path=ppt/slides/slide10.xml><?xml version="1.0" encoding="utf-8"?>
+<p:sld xmlns:a="http://schemas.openxmlformats.org/drawingml/2006/main" xmlns:r="http://schemas.openxmlformats.org/officeDocument/2006/relationships" xmlns:p="http://schemas.openxmlformats.org/presentationml/2006/main">
+  <p:cSld>
+    <p:spTree>
+      <p:nvGrpSpPr>
+        <p:cNvPr id="1" name=""/>
+        <p:cNvGrpSpPr/>
+        <p:nvPr/>
+      </p:nvGrpSpPr>
+      <p:grpSpPr>
+        <a:xfrm>
+          <a:off x="0" y="0"/>
+          <a:ext cx="0" cy="0"/>
+          <a:chOff x="0" y="0"/>
+          <a:chExt cx="0" cy="0"/>
+        </a:xfrm>
+      </p:grpSpPr>
+      <p:sp>
+        <p:nvSpPr>
+          <p:cNvPr id="2" name="Title 1">
+            <a:extLst>
+              <a:ext uri="{FF2B5EF4-FFF2-40B4-BE49-F238E27FC236}">
+                <a16:creationId xmlns:a16="http://schemas.microsoft.com/office/drawing/2014/main" id="{EFC9301D-F3AF-42F5-A810-6B091DC3F6D1}"/>
+              </a:ext>
+            </a:extLst>
+          </p:cNvPr>
+          <p:cNvSpPr>
+            <a:spLocks noGrp="1"/>
+          </p:cNvSpPr>
+          <p:nvPr>
+            <p:ph type="title"/>
+          </p:nvPr>
+        </p:nvSpPr>
+        <p:spPr/>
+        <p:txBody>
+          <a:bodyPr/>
+          <a:lstStyle/>
+          <a:p>
+            <a:r>
+              <a:rPr lang="en-US" dirty="0"/>
+              <a:t>The immediate Road ahead:</a:t>
+            </a:r>
+            <a:br>
+              <a:rPr lang="en-US" dirty="0"/>
+            </a:br>
+            <a:r>
+              <a:rPr lang="en-US" dirty="0"/>
+              <a:t> (now – end of the break)</a:t>
+            </a:r>
+          </a:p>
+        </p:txBody>
+      </p:sp>
+      <p:sp>
+        <p:nvSpPr>
+          <p:cNvPr id="3" name="Content Placeholder 2">
+            <a:extLst>
+              <a:ext uri="{FF2B5EF4-FFF2-40B4-BE49-F238E27FC236}">
+                <a16:creationId xmlns:a16="http://schemas.microsoft.com/office/drawing/2014/main" id="{9858B64C-D1A2-4BD8-8F78-F2E1B41EC300}"/>
+              </a:ext>
+            </a:extLst>
+          </p:cNvPr>
+          <p:cNvSpPr>
+            <a:spLocks noGrp="1"/>
+          </p:cNvSpPr>
+          <p:nvPr>
+            <p:ph idx="1"/>
+          </p:nvPr>
+        </p:nvSpPr>
+        <p:spPr/>
+        <p:txBody>
+          <a:bodyPr/>
+          <a:lstStyle/>
+          <a:p>
+            <a:r>
+              <a:rPr lang="en-US" dirty="0"/>
+              <a:t>Develop a better understanding of Zebra Crossing</a:t>
+            </a:r>
+          </a:p>
+          <a:p>
+            <a:r>
+              <a:rPr lang="en-US" dirty="0"/>
+              <a:t>Continue to improve the UI prototype</a:t>
+            </a:r>
+          </a:p>
+          <a:p>
+            <a:r>
+              <a:rPr lang="en-US" dirty="0"/>
+              <a:t>Add more documentation to the project </a:t>
+            </a:r>
+          </a:p>
+        </p:txBody>
+      </p:sp>
+    </p:spTree>
+    <p:extLst>
+      <p:ext uri="{BB962C8B-B14F-4D97-AF65-F5344CB8AC3E}">
+        <p14:creationId xmlns:p14="http://schemas.microsoft.com/office/powerpoint/2010/main" val="1248477851"/>
+      </p:ext>
+    </p:extLst>
+  </p:cSld>
+  <p:clrMapOvr>
+    <a:masterClrMapping/>
+  </p:clrMapOvr>
+</p:sld>
+</file>
+
+<file path=ppt/slides/slide11.xml><?xml version="1.0" encoding="utf-8"?>
+<p:sld xmlns:a="http://schemas.openxmlformats.org/drawingml/2006/main" xmlns:r="http://schemas.openxmlformats.org/officeDocument/2006/relationships" xmlns:p="http://schemas.openxmlformats.org/presentationml/2006/main">
+  <p:cSld>
+    <p:spTree>
+      <p:nvGrpSpPr>
+        <p:cNvPr id="1" name=""/>
+        <p:cNvGrpSpPr/>
+        <p:nvPr/>
+      </p:nvGrpSpPr>
+      <p:grpSpPr>
+        <a:xfrm>
+          <a:off x="0" y="0"/>
+          <a:ext cx="0" cy="0"/>
+          <a:chOff x="0" y="0"/>
+          <a:chExt cx="0" cy="0"/>
+        </a:xfrm>
+      </p:grpSpPr>
+      <p:sp>
+        <p:nvSpPr>
+          <p:cNvPr id="2" name="Title 1">
+            <a:extLst>
+              <a:ext uri="{FF2B5EF4-FFF2-40B4-BE49-F238E27FC236}">
+                <a16:creationId xmlns:a16="http://schemas.microsoft.com/office/drawing/2014/main" id="{63EAD743-D0AB-49B2-AAD8-3805D62E9C86}"/>
+              </a:ext>
+            </a:extLst>
+          </p:cNvPr>
+          <p:cNvSpPr>
+            <a:spLocks noGrp="1"/>
+          </p:cNvSpPr>
+          <p:nvPr>
+            <p:ph type="title"/>
+          </p:nvPr>
+        </p:nvSpPr>
+        <p:spPr/>
+        <p:txBody>
+          <a:bodyPr/>
+          <a:lstStyle/>
+          <a:p>
+            <a:r>
+              <a:rPr lang="en-US" dirty="0"/>
+              <a:t>Further down the road:</a:t>
+            </a:r>
+            <a:br>
+              <a:rPr lang="en-US" dirty="0"/>
+            </a:br>
+            <a:r>
+              <a:rPr lang="en-US" dirty="0"/>
+              <a:t>(next Semester)</a:t>
+            </a:r>
+          </a:p>
+        </p:txBody>
+      </p:sp>
+      <p:sp>
+        <p:nvSpPr>
+          <p:cNvPr id="3" name="Content Placeholder 2">
+            <a:extLst>
+              <a:ext uri="{FF2B5EF4-FFF2-40B4-BE49-F238E27FC236}">
+                <a16:creationId xmlns:a16="http://schemas.microsoft.com/office/drawing/2014/main" id="{0FEE96A9-7F44-4A4B-8E09-FA21FB671C5C}"/>
+              </a:ext>
+            </a:extLst>
+          </p:cNvPr>
+          <p:cNvSpPr>
+            <a:spLocks noGrp="1"/>
+          </p:cNvSpPr>
+          <p:nvPr>
+            <p:ph idx="1"/>
+          </p:nvPr>
+        </p:nvSpPr>
+        <p:spPr/>
+        <p:txBody>
+          <a:bodyPr>
+            <a:normAutofit lnSpcReduction="10000"/>
+          </a:bodyPr>
+          <a:lstStyle/>
+          <a:p>
+            <a:r>
+              <a:rPr lang="en-US" dirty="0"/>
+              <a:t>Create and deploy our database </a:t>
+            </a:r>
+          </a:p>
+          <a:p>
+            <a:r>
+              <a:rPr lang="en-US" dirty="0"/>
+              <a:t>Write web hooks to connect UI to our database adding the appropriate security measures </a:t>
+            </a:r>
+          </a:p>
+          <a:p>
+            <a:r>
+              <a:rPr lang="en-US" dirty="0"/>
+              <a:t>Integrate Zebra crossing into our application </a:t>
+            </a:r>
+          </a:p>
+          <a:p>
+            <a:r>
+              <a:rPr lang="en-US" dirty="0"/>
+              <a:t>Finalize our UI</a:t>
+            </a:r>
+          </a:p>
+          <a:p>
+            <a:r>
+              <a:rPr lang="en-US" dirty="0"/>
+              <a:t>Package our documentation and Application in a way that makes its use easy for future users. </a:t>
+            </a:r>
+          </a:p>
+        </p:txBody>
+      </p:sp>
+    </p:spTree>
+    <p:extLst>
+      <p:ext uri="{BB962C8B-B14F-4D97-AF65-F5344CB8AC3E}">
+        <p14:creationId xmlns:p14="http://schemas.microsoft.com/office/powerpoint/2010/main" val="1164465918"/>
+      </p:ext>
+    </p:extLst>
+  </p:cSld>
+  <p:clrMapOvr>
+    <a:masterClrMapping/>
+  </p:clrMapOvr>
+</p:sld>
+</file>
+
 <file path=ppt/slides/slide2.xml><?xml version="1.0" encoding="utf-8"?>
 <p:sld xmlns:a="http://schemas.openxmlformats.org/drawingml/2006/main" xmlns:r="http://schemas.openxmlformats.org/officeDocument/2006/relationships" xmlns:p="http://schemas.openxmlformats.org/presentationml/2006/main">
   <p:cSld>
@@ -12554,7 +12781,7 @@
             <a:pPr lvl="1"/>
             <a:r>
               <a:rPr lang="en-US" dirty="0"/>
-              <a:t>Runs on android </a:t>
+              <a:t>Runs on Android </a:t>
             </a:r>
           </a:p>
           <a:p>
@@ -12762,12 +12989,6 @@
               <a:t>We have all of our data fields mapped out</a:t>
             </a:r>
           </a:p>
-          <a:p>
-            <a:r>
-              <a:rPr lang="en-US" dirty="0"/>
-              <a:t> </a:t>
-            </a:r>
-          </a:p>
         </p:txBody>
       </p:sp>
     </p:spTree>
@@ -12851,7 +13072,7 @@
           <a:p>
             <a:r>
               <a:rPr lang="en-US" dirty="0"/>
-              <a:t>The original plane was to use google vision to scan our barcodes, this was a dead end</a:t>
+              <a:t>The original plan was to use google vision to scan our barcodes, this was a dead end</a:t>
             </a:r>
           </a:p>
           <a:p>
@@ -12992,85 +13213,99 @@
           <a:chExt cx="0" cy="0"/>
         </a:xfrm>
       </p:grpSpPr>
-      <p:sp>
-        <p:nvSpPr>
-          <p:cNvPr id="2" name="Title 1">
+      <p:pic>
+        <p:nvPicPr>
+          <p:cNvPr id="5" name="Content Placeholder 4">
             <a:extLst>
               <a:ext uri="{FF2B5EF4-FFF2-40B4-BE49-F238E27FC236}">
-                <a16:creationId xmlns:a16="http://schemas.microsoft.com/office/drawing/2014/main" id="{EFC9301D-F3AF-42F5-A810-6B091DC3F6D1}"/>
+                <a16:creationId xmlns:a16="http://schemas.microsoft.com/office/drawing/2014/main" id="{5C1DFC9F-5294-4761-B2BA-2BA12C26277F}"/>
               </a:ext>
             </a:extLst>
           </p:cNvPr>
-          <p:cNvSpPr>
-            <a:spLocks noGrp="1"/>
-          </p:cNvSpPr>
+          <p:cNvPicPr>
+            <a:picLocks noGrp="1" noChangeAspect="1"/>
+          </p:cNvPicPr>
           <p:nvPr>
-            <p:ph type="title"/>
+            <p:ph idx="1"/>
           </p:nvPr>
-        </p:nvSpPr>
-        <p:spPr/>
-        <p:txBody>
-          <a:bodyPr/>
-          <a:lstStyle/>
-          <a:p>
-            <a:r>
-              <a:rPr lang="en-US" dirty="0"/>
-              <a:t>The immediate Road ahead:</a:t>
-            </a:r>
-            <a:br>
-              <a:rPr lang="en-US" dirty="0"/>
-            </a:br>
-            <a:r>
-              <a:rPr lang="en-US" dirty="0"/>
-              <a:t> (now – end of the break)</a:t>
-            </a:r>
-          </a:p>
-        </p:txBody>
-      </p:sp>
-      <p:sp>
-        <p:nvSpPr>
-          <p:cNvPr id="3" name="Content Placeholder 2">
+        </p:nvPicPr>
+        <p:blipFill>
+          <a:blip r:embed="rId2"/>
+          <a:stretch>
+            <a:fillRect/>
+          </a:stretch>
+        </p:blipFill>
+        <p:spPr>
+          <a:xfrm>
+            <a:off x="497150" y="598472"/>
+            <a:ext cx="3184344" cy="5661056"/>
+          </a:xfrm>
+        </p:spPr>
+      </p:pic>
+      <p:pic>
+        <p:nvPicPr>
+          <p:cNvPr id="7" name="Picture 6">
             <a:extLst>
               <a:ext uri="{FF2B5EF4-FFF2-40B4-BE49-F238E27FC236}">
-                <a16:creationId xmlns:a16="http://schemas.microsoft.com/office/drawing/2014/main" id="{9858B64C-D1A2-4BD8-8F78-F2E1B41EC300}"/>
+                <a16:creationId xmlns:a16="http://schemas.microsoft.com/office/drawing/2014/main" id="{B3BB96AD-B595-461A-9B44-A75D37B623B0}"/>
               </a:ext>
             </a:extLst>
           </p:cNvPr>
-          <p:cNvSpPr>
-            <a:spLocks noGrp="1"/>
-          </p:cNvSpPr>
-          <p:nvPr>
-            <p:ph idx="1"/>
-          </p:nvPr>
-        </p:nvSpPr>
-        <p:spPr/>
-        <p:txBody>
-          <a:bodyPr/>
-          <a:lstStyle/>
-          <a:p>
-            <a:r>
-              <a:rPr lang="en-US" dirty="0"/>
-              <a:t>Develop a better understanding of Zebra Crossing</a:t>
-            </a:r>
-          </a:p>
-          <a:p>
-            <a:r>
-              <a:rPr lang="en-US" dirty="0"/>
-              <a:t>Continue to improve the UI prototype</a:t>
-            </a:r>
-          </a:p>
-          <a:p>
-            <a:r>
-              <a:rPr lang="en-US" dirty="0"/>
-              <a:t>Add more documentation to the project </a:t>
-            </a:r>
-          </a:p>
-        </p:txBody>
-      </p:sp>
+          <p:cNvPicPr>
+            <a:picLocks noChangeAspect="1"/>
+          </p:cNvPicPr>
+          <p:nvPr/>
+        </p:nvPicPr>
+        <p:blipFill>
+          <a:blip r:embed="rId3"/>
+          <a:stretch>
+            <a:fillRect/>
+          </a:stretch>
+        </p:blipFill>
+        <p:spPr>
+          <a:xfrm>
+            <a:off x="4226092" y="598472"/>
+            <a:ext cx="3184344" cy="5661056"/>
+          </a:xfrm>
+          <a:prstGeom prst="rect">
+            <a:avLst/>
+          </a:prstGeom>
+        </p:spPr>
+      </p:pic>
+      <p:pic>
+        <p:nvPicPr>
+          <p:cNvPr id="9" name="Picture 8">
+            <a:extLst>
+              <a:ext uri="{FF2B5EF4-FFF2-40B4-BE49-F238E27FC236}">
+                <a16:creationId xmlns:a16="http://schemas.microsoft.com/office/drawing/2014/main" id="{396776EC-0137-40C2-A931-1E47B6D6C468}"/>
+              </a:ext>
+            </a:extLst>
+          </p:cNvPr>
+          <p:cNvPicPr>
+            <a:picLocks noChangeAspect="1"/>
+          </p:cNvPicPr>
+          <p:nvPr/>
+        </p:nvPicPr>
+        <p:blipFill>
+          <a:blip r:embed="rId4"/>
+          <a:stretch>
+            <a:fillRect/>
+          </a:stretch>
+        </p:blipFill>
+        <p:spPr>
+          <a:xfrm>
+            <a:off x="8090198" y="598472"/>
+            <a:ext cx="3184344" cy="5661056"/>
+          </a:xfrm>
+          <a:prstGeom prst="rect">
+            <a:avLst/>
+          </a:prstGeom>
+        </p:spPr>
+      </p:pic>
     </p:spTree>
     <p:extLst>
       <p:ext uri="{BB962C8B-B14F-4D97-AF65-F5344CB8AC3E}">
-        <p14:creationId xmlns:p14="http://schemas.microsoft.com/office/powerpoint/2010/main" val="1248477851"/>
+        <p14:creationId xmlns:p14="http://schemas.microsoft.com/office/powerpoint/2010/main" val="2834730487"/>
       </p:ext>
     </p:extLst>
   </p:cSld>
@@ -13097,97 +13332,160 @@
           <a:chExt cx="0" cy="0"/>
         </a:xfrm>
       </p:grpSpPr>
-      <p:sp>
-        <p:nvSpPr>
-          <p:cNvPr id="2" name="Title 1">
+      <p:pic>
+        <p:nvPicPr>
+          <p:cNvPr id="3" name="Picture 2">
             <a:extLst>
               <a:ext uri="{FF2B5EF4-FFF2-40B4-BE49-F238E27FC236}">
-                <a16:creationId xmlns:a16="http://schemas.microsoft.com/office/drawing/2014/main" id="{63EAD743-D0AB-49B2-AAD8-3805D62E9C86}"/>
+                <a16:creationId xmlns:a16="http://schemas.microsoft.com/office/drawing/2014/main" id="{9D24BE40-F79F-47CA-B653-47C7E959A81E}"/>
               </a:ext>
             </a:extLst>
           </p:cNvPr>
-          <p:cNvSpPr>
-            <a:spLocks noGrp="1"/>
-          </p:cNvSpPr>
-          <p:nvPr>
-            <p:ph type="title"/>
-          </p:nvPr>
-        </p:nvSpPr>
-        <p:spPr/>
-        <p:txBody>
-          <a:bodyPr/>
-          <a:lstStyle/>
-          <a:p>
-            <a:r>
-              <a:rPr lang="en-US" dirty="0"/>
-              <a:t>Further down the road:</a:t>
-            </a:r>
-            <a:br>
-              <a:rPr lang="en-US" dirty="0"/>
-            </a:br>
-            <a:r>
-              <a:rPr lang="en-US" dirty="0"/>
-              <a:t>(next Semester)</a:t>
-            </a:r>
-          </a:p>
-        </p:txBody>
-      </p:sp>
-      <p:sp>
-        <p:nvSpPr>
-          <p:cNvPr id="3" name="Content Placeholder 2">
+          <p:cNvPicPr>
+            <a:picLocks noChangeAspect="1"/>
+          </p:cNvPicPr>
+          <p:nvPr/>
+        </p:nvPicPr>
+        <p:blipFill>
+          <a:blip r:embed="rId2"/>
+          <a:stretch>
+            <a:fillRect/>
+          </a:stretch>
+        </p:blipFill>
+        <p:spPr>
+          <a:xfrm>
+            <a:off x="8176333" y="452180"/>
+            <a:ext cx="3354557" cy="5963657"/>
+          </a:xfrm>
+          <a:prstGeom prst="rect">
+            <a:avLst/>
+          </a:prstGeom>
+        </p:spPr>
+      </p:pic>
+      <p:pic>
+        <p:nvPicPr>
+          <p:cNvPr id="5" name="Picture 4">
             <a:extLst>
               <a:ext uri="{FF2B5EF4-FFF2-40B4-BE49-F238E27FC236}">
-                <a16:creationId xmlns:a16="http://schemas.microsoft.com/office/drawing/2014/main" id="{0FEE96A9-7F44-4A4B-8E09-FA21FB671C5C}"/>
+                <a16:creationId xmlns:a16="http://schemas.microsoft.com/office/drawing/2014/main" id="{8366C95E-2648-4093-98F6-E7E5FA8B6615}"/>
               </a:ext>
             </a:extLst>
           </p:cNvPr>
-          <p:cNvSpPr>
-            <a:spLocks noGrp="1"/>
-          </p:cNvSpPr>
-          <p:nvPr>
-            <p:ph idx="1"/>
-          </p:nvPr>
-        </p:nvSpPr>
-        <p:spPr/>
-        <p:txBody>
-          <a:bodyPr/>
-          <a:lstStyle/>
-          <a:p>
-            <a:r>
-              <a:rPr lang="en-US" dirty="0"/>
-              <a:t>Create and deploy our database </a:t>
-            </a:r>
-          </a:p>
-          <a:p>
-            <a:r>
-              <a:rPr lang="en-US" dirty="0"/>
-              <a:t>Write web hooks to connect UI to our database adding the appropriate security measures </a:t>
-            </a:r>
-          </a:p>
-          <a:p>
-            <a:r>
-              <a:rPr lang="en-US" dirty="0"/>
-              <a:t>Integrate Zebra crossing into our application </a:t>
-            </a:r>
-          </a:p>
-          <a:p>
-            <a:r>
-              <a:rPr lang="en-US" dirty="0"/>
-              <a:t>Finalize our UI</a:t>
-            </a:r>
-          </a:p>
-          <a:p>
-            <a:r>
-              <a:rPr lang="en-US" dirty="0"/>
-              <a:t>Package our documentation and Application in a  </a:t>
-            </a:r>
-          </a:p>
-        </p:txBody>
-      </p:sp>
+          <p:cNvPicPr>
+            <a:picLocks noChangeAspect="1"/>
+          </p:cNvPicPr>
+          <p:nvPr/>
+        </p:nvPicPr>
+        <p:blipFill>
+          <a:blip r:embed="rId3"/>
+          <a:stretch>
+            <a:fillRect/>
+          </a:stretch>
+        </p:blipFill>
+        <p:spPr>
+          <a:xfrm>
+            <a:off x="4343820" y="447170"/>
+            <a:ext cx="3354557" cy="5963657"/>
+          </a:xfrm>
+          <a:prstGeom prst="rect">
+            <a:avLst/>
+          </a:prstGeom>
+        </p:spPr>
+      </p:pic>
+      <p:pic>
+        <p:nvPicPr>
+          <p:cNvPr id="7" name="Picture 6">
+            <a:extLst>
+              <a:ext uri="{FF2B5EF4-FFF2-40B4-BE49-F238E27FC236}">
+                <a16:creationId xmlns:a16="http://schemas.microsoft.com/office/drawing/2014/main" id="{DB698139-C6E6-40C2-9A3D-89011B7381D4}"/>
+              </a:ext>
+            </a:extLst>
+          </p:cNvPr>
+          <p:cNvPicPr>
+            <a:picLocks noChangeAspect="1"/>
+          </p:cNvPicPr>
+          <p:nvPr/>
+        </p:nvPicPr>
+        <p:blipFill>
+          <a:blip r:embed="rId4"/>
+          <a:stretch>
+            <a:fillRect/>
+          </a:stretch>
+        </p:blipFill>
+        <p:spPr>
+          <a:xfrm>
+            <a:off x="507229" y="447171"/>
+            <a:ext cx="3354557" cy="5963657"/>
+          </a:xfrm>
+          <a:prstGeom prst="rect">
+            <a:avLst/>
+          </a:prstGeom>
+        </p:spPr>
+      </p:pic>
     </p:spTree>
     <p:extLst>
       <p:ext uri="{BB962C8B-B14F-4D97-AF65-F5344CB8AC3E}">
-        <p14:creationId xmlns:p14="http://schemas.microsoft.com/office/powerpoint/2010/main" val="1164465918"/>
+        <p14:creationId xmlns:p14="http://schemas.microsoft.com/office/powerpoint/2010/main" val="672264682"/>
+      </p:ext>
+    </p:extLst>
+  </p:cSld>
+  <p:clrMapOvr>
+    <a:masterClrMapping/>
+  </p:clrMapOvr>
+</p:sld>
+</file>
+
+<file path=ppt/slides/slide9.xml><?xml version="1.0" encoding="utf-8"?>
+<p:sld xmlns:a="http://schemas.openxmlformats.org/drawingml/2006/main" xmlns:r="http://schemas.openxmlformats.org/officeDocument/2006/relationships" xmlns:p="http://schemas.openxmlformats.org/presentationml/2006/main">
+  <p:cSld>
+    <p:spTree>
+      <p:nvGrpSpPr>
+        <p:cNvPr id="1" name=""/>
+        <p:cNvGrpSpPr/>
+        <p:nvPr/>
+      </p:nvGrpSpPr>
+      <p:grpSpPr>
+        <a:xfrm>
+          <a:off x="0" y="0"/>
+          <a:ext cx="0" cy="0"/>
+          <a:chOff x="0" y="0"/>
+          <a:chExt cx="0" cy="0"/>
+        </a:xfrm>
+      </p:grpSpPr>
+      <p:pic>
+        <p:nvPicPr>
+          <p:cNvPr id="3" name="Picture 2">
+            <a:extLst>
+              <a:ext uri="{FF2B5EF4-FFF2-40B4-BE49-F238E27FC236}">
+                <a16:creationId xmlns:a16="http://schemas.microsoft.com/office/drawing/2014/main" id="{26E28F1F-AAF4-40F4-B37C-2B9F902FBE51}"/>
+              </a:ext>
+            </a:extLst>
+          </p:cNvPr>
+          <p:cNvPicPr>
+            <a:picLocks noChangeAspect="1"/>
+          </p:cNvPicPr>
+          <p:nvPr/>
+        </p:nvPicPr>
+        <p:blipFill>
+          <a:blip r:embed="rId2"/>
+          <a:stretch>
+            <a:fillRect/>
+          </a:stretch>
+        </p:blipFill>
+        <p:spPr>
+          <a:xfrm>
+            <a:off x="4176065" y="275207"/>
+            <a:ext cx="3475608" cy="6178858"/>
+          </a:xfrm>
+          <a:prstGeom prst="rect">
+            <a:avLst/>
+          </a:prstGeom>
+        </p:spPr>
+      </p:pic>
+    </p:spTree>
+    <p:extLst>
+      <p:ext uri="{BB962C8B-B14F-4D97-AF65-F5344CB8AC3E}">
+        <p14:creationId xmlns:p14="http://schemas.microsoft.com/office/powerpoint/2010/main" val="2888717568"/>
       </p:ext>
     </p:extLst>
   </p:cSld>

</xml_diff>

<commit_message>
Please look at this and add where your at
</commit_message>
<xml_diff>
--- a/Inventory Management System demo draft.pptx
+++ b/Inventory Management System demo draft.pptx
@@ -173,7 +173,7 @@
           <a:noFill/>
           <a:extLst>
             <a:ext uri="{909E8E84-426E-40dd-AFC4-6F175D3DCCD1}">
-              <a14:hiddenFill xmlns="" xmlns:a14="http://schemas.microsoft.com/office/drawing/2010/main">
+              <a14:hiddenFill xmlns:a14="http://schemas.microsoft.com/office/drawing/2010/main" xmlns="">
                 <a:solidFill>
                   <a:srgbClr val="FFFFFF"/>
                 </a:solidFill>
@@ -233,7 +233,7 @@
             </a:ln>
             <a:extLst>
               <a:ext uri="{91240B29-F687-4f45-9708-019B960494DF}">
-                <a14:hiddenLine xmlns="" xmlns:a14="http://schemas.microsoft.com/office/drawing/2010/main" w="9525">
+                <a14:hiddenLine xmlns:a14="http://schemas.microsoft.com/office/drawing/2010/main" xmlns="" w="9525">
                   <a:solidFill>
                     <a:srgbClr val="000000"/>
                   </a:solidFill>
@@ -323,7 +323,7 @@
             </a:ln>
             <a:extLst>
               <a:ext uri="{91240B29-F687-4f45-9708-019B960494DF}">
-                <a14:hiddenLine xmlns="" xmlns:a14="http://schemas.microsoft.com/office/drawing/2010/main" w="9525">
+                <a14:hiddenLine xmlns:a14="http://schemas.microsoft.com/office/drawing/2010/main" xmlns="" w="9525">
                   <a:solidFill>
                     <a:srgbClr val="000000"/>
                   </a:solidFill>
@@ -413,7 +413,7 @@
             </a:ln>
             <a:extLst>
               <a:ext uri="{91240B29-F687-4f45-9708-019B960494DF}">
-                <a14:hiddenLine xmlns="" xmlns:a14="http://schemas.microsoft.com/office/drawing/2010/main" w="9525">
+                <a14:hiddenLine xmlns:a14="http://schemas.microsoft.com/office/drawing/2010/main" xmlns="" w="9525">
                   <a:solidFill>
                     <a:srgbClr val="000000"/>
                   </a:solidFill>
@@ -447,7 +447,7 @@
             </a:ln>
             <a:extLst>
               <a:ext uri="{91240B29-F687-4f45-9708-019B960494DF}">
-                <a14:hiddenLine xmlns="" xmlns:a14="http://schemas.microsoft.com/office/drawing/2010/main" w="9525">
+                <a14:hiddenLine xmlns:a14="http://schemas.microsoft.com/office/drawing/2010/main" xmlns="" w="9525">
                   <a:solidFill>
                     <a:srgbClr val="000000"/>
                   </a:solidFill>
@@ -537,7 +537,7 @@
             </a:ln>
             <a:extLst>
               <a:ext uri="{91240B29-F687-4f45-9708-019B960494DF}">
-                <a14:hiddenLine xmlns="" xmlns:a14="http://schemas.microsoft.com/office/drawing/2010/main" w="9525">
+                <a14:hiddenLine xmlns:a14="http://schemas.microsoft.com/office/drawing/2010/main" xmlns="" w="9525">
                   <a:solidFill>
                     <a:srgbClr val="000000"/>
                   </a:solidFill>
@@ -599,7 +599,7 @@
             </a:ln>
             <a:extLst>
               <a:ext uri="{91240B29-F687-4f45-9708-019B960494DF}">
-                <a14:hiddenLine xmlns="" xmlns:a14="http://schemas.microsoft.com/office/drawing/2010/main" w="9525">
+                <a14:hiddenLine xmlns:a14="http://schemas.microsoft.com/office/drawing/2010/main" xmlns="" w="9525">
                   <a:solidFill>
                     <a:srgbClr val="000000"/>
                   </a:solidFill>
@@ -661,7 +661,7 @@
             </a:ln>
             <a:extLst>
               <a:ext uri="{91240B29-F687-4f45-9708-019B960494DF}">
-                <a14:hiddenLine xmlns="" xmlns:a14="http://schemas.microsoft.com/office/drawing/2010/main" w="9525">
+                <a14:hiddenLine xmlns:a14="http://schemas.microsoft.com/office/drawing/2010/main" xmlns="" w="9525">
                   <a:solidFill>
                     <a:srgbClr val="000000"/>
                   </a:solidFill>
@@ -751,7 +751,7 @@
             </a:ln>
             <a:extLst>
               <a:ext uri="{91240B29-F687-4f45-9708-019B960494DF}">
-                <a14:hiddenLine xmlns="" xmlns:a14="http://schemas.microsoft.com/office/drawing/2010/main" w="9525">
+                <a14:hiddenLine xmlns:a14="http://schemas.microsoft.com/office/drawing/2010/main" xmlns="" w="9525">
                   <a:solidFill>
                     <a:srgbClr val="000000"/>
                   </a:solidFill>
@@ -813,7 +813,7 @@
             </a:ln>
             <a:extLst>
               <a:ext uri="{91240B29-F687-4f45-9708-019B960494DF}">
-                <a14:hiddenLine xmlns="" xmlns:a14="http://schemas.microsoft.com/office/drawing/2010/main" w="9525">
+                <a14:hiddenLine xmlns:a14="http://schemas.microsoft.com/office/drawing/2010/main" xmlns="" w="9525">
                   <a:solidFill>
                     <a:srgbClr val="000000"/>
                   </a:solidFill>
@@ -875,7 +875,7 @@
             </a:ln>
             <a:extLst>
               <a:ext uri="{91240B29-F687-4f45-9708-019B960494DF}">
-                <a14:hiddenLine xmlns="" xmlns:a14="http://schemas.microsoft.com/office/drawing/2010/main" w="9525">
+                <a14:hiddenLine xmlns:a14="http://schemas.microsoft.com/office/drawing/2010/main" xmlns="" w="9525">
                   <a:solidFill>
                     <a:srgbClr val="000000"/>
                   </a:solidFill>
@@ -965,7 +965,7 @@
             </a:ln>
             <a:extLst>
               <a:ext uri="{91240B29-F687-4f45-9708-019B960494DF}">
-                <a14:hiddenLine xmlns="" xmlns:a14="http://schemas.microsoft.com/office/drawing/2010/main" w="9525">
+                <a14:hiddenLine xmlns:a14="http://schemas.microsoft.com/office/drawing/2010/main" xmlns="" w="9525">
                   <a:solidFill>
                     <a:srgbClr val="000000"/>
                   </a:solidFill>
@@ -1055,7 +1055,7 @@
             </a:ln>
             <a:extLst>
               <a:ext uri="{91240B29-F687-4f45-9708-019B960494DF}">
-                <a14:hiddenLine xmlns="" xmlns:a14="http://schemas.microsoft.com/office/drawing/2010/main" w="9525">
+                <a14:hiddenLine xmlns:a14="http://schemas.microsoft.com/office/drawing/2010/main" xmlns="" w="9525">
                   <a:solidFill>
                     <a:srgbClr val="000000"/>
                   </a:solidFill>
@@ -1117,7 +1117,7 @@
             </a:ln>
             <a:extLst>
               <a:ext uri="{91240B29-F687-4f45-9708-019B960494DF}">
-                <a14:hiddenLine xmlns="" xmlns:a14="http://schemas.microsoft.com/office/drawing/2010/main" w="9525">
+                <a14:hiddenLine xmlns:a14="http://schemas.microsoft.com/office/drawing/2010/main" xmlns="" w="9525">
                   <a:solidFill>
                     <a:srgbClr val="000000"/>
                   </a:solidFill>
@@ -1227,7 +1227,7 @@
             </a:ln>
             <a:extLst>
               <a:ext uri="{91240B29-F687-4f45-9708-019B960494DF}">
-                <a14:hiddenLine xmlns="" xmlns:a14="http://schemas.microsoft.com/office/drawing/2010/main" w="9525">
+                <a14:hiddenLine xmlns:a14="http://schemas.microsoft.com/office/drawing/2010/main" xmlns="" w="9525">
                   <a:solidFill>
                     <a:srgbClr val="000000"/>
                   </a:solidFill>
@@ -1289,7 +1289,7 @@
             </a:ln>
             <a:extLst>
               <a:ext uri="{91240B29-F687-4f45-9708-019B960494DF}">
-                <a14:hiddenLine xmlns="" xmlns:a14="http://schemas.microsoft.com/office/drawing/2010/main" w="9525">
+                <a14:hiddenLine xmlns:a14="http://schemas.microsoft.com/office/drawing/2010/main" xmlns="" w="9525">
                   <a:solidFill>
                     <a:srgbClr val="000000"/>
                   </a:solidFill>
@@ -1379,7 +1379,7 @@
             </a:ln>
             <a:extLst>
               <a:ext uri="{91240B29-F687-4f45-9708-019B960494DF}">
-                <a14:hiddenLine xmlns="" xmlns:a14="http://schemas.microsoft.com/office/drawing/2010/main" w="9525">
+                <a14:hiddenLine xmlns:a14="http://schemas.microsoft.com/office/drawing/2010/main" xmlns="" w="9525">
                   <a:solidFill>
                     <a:srgbClr val="000000"/>
                   </a:solidFill>
@@ -1469,7 +1469,7 @@
             </a:ln>
             <a:extLst>
               <a:ext uri="{91240B29-F687-4f45-9708-019B960494DF}">
-                <a14:hiddenLine xmlns="" xmlns:a14="http://schemas.microsoft.com/office/drawing/2010/main" w="9525">
+                <a14:hiddenLine xmlns:a14="http://schemas.microsoft.com/office/drawing/2010/main" xmlns="" w="9525">
                   <a:solidFill>
                     <a:srgbClr val="000000"/>
                   </a:solidFill>
@@ -1531,7 +1531,7 @@
             </a:ln>
             <a:extLst>
               <a:ext uri="{91240B29-F687-4f45-9708-019B960494DF}">
-                <a14:hiddenLine xmlns="" xmlns:a14="http://schemas.microsoft.com/office/drawing/2010/main" w="9525">
+                <a14:hiddenLine xmlns:a14="http://schemas.microsoft.com/office/drawing/2010/main" xmlns="" w="9525">
                   <a:solidFill>
                     <a:srgbClr val="000000"/>
                   </a:solidFill>
@@ -1621,7 +1621,7 @@
             </a:ln>
             <a:extLst>
               <a:ext uri="{91240B29-F687-4f45-9708-019B960494DF}">
-                <a14:hiddenLine xmlns="" xmlns:a14="http://schemas.microsoft.com/office/drawing/2010/main" w="9525">
+                <a14:hiddenLine xmlns:a14="http://schemas.microsoft.com/office/drawing/2010/main" xmlns="" w="9525">
                   <a:solidFill>
                     <a:srgbClr val="000000"/>
                   </a:solidFill>
@@ -1711,7 +1711,7 @@
             </a:ln>
             <a:extLst>
               <a:ext uri="{91240B29-F687-4f45-9708-019B960494DF}">
-                <a14:hiddenLine xmlns="" xmlns:a14="http://schemas.microsoft.com/office/drawing/2010/main" w="9525">
+                <a14:hiddenLine xmlns:a14="http://schemas.microsoft.com/office/drawing/2010/main" xmlns="" w="9525">
                   <a:solidFill>
                     <a:srgbClr val="000000"/>
                   </a:solidFill>
@@ -1767,7 +1767,7 @@
             </a:ln>
             <a:extLst>
               <a:ext uri="{91240B29-F687-4f45-9708-019B960494DF}">
-                <a14:hiddenLine xmlns="" xmlns:a14="http://schemas.microsoft.com/office/drawing/2010/main" w="9525">
+                <a14:hiddenLine xmlns:a14="http://schemas.microsoft.com/office/drawing/2010/main" xmlns="" w="9525">
                   <a:solidFill>
                     <a:srgbClr val="000000"/>
                   </a:solidFill>
@@ -1857,7 +1857,7 @@
             </a:ln>
             <a:extLst>
               <a:ext uri="{91240B29-F687-4f45-9708-019B960494DF}">
-                <a14:hiddenLine xmlns="" xmlns:a14="http://schemas.microsoft.com/office/drawing/2010/main" w="9525">
+                <a14:hiddenLine xmlns:a14="http://schemas.microsoft.com/office/drawing/2010/main" xmlns="" w="9525">
                   <a:solidFill>
                     <a:srgbClr val="000000"/>
                   </a:solidFill>
@@ -1913,7 +1913,7 @@
             </a:ln>
             <a:extLst>
               <a:ext uri="{91240B29-F687-4f45-9708-019B960494DF}">
-                <a14:hiddenLine xmlns="" xmlns:a14="http://schemas.microsoft.com/office/drawing/2010/main" w="9525">
+                <a14:hiddenLine xmlns:a14="http://schemas.microsoft.com/office/drawing/2010/main" xmlns="" w="9525">
                   <a:solidFill>
                     <a:srgbClr val="000000"/>
                   </a:solidFill>
@@ -2003,7 +2003,7 @@
             </a:ln>
             <a:extLst>
               <a:ext uri="{91240B29-F687-4f45-9708-019B960494DF}">
-                <a14:hiddenLine xmlns="" xmlns:a14="http://schemas.microsoft.com/office/drawing/2010/main" w="9525">
+                <a14:hiddenLine xmlns:a14="http://schemas.microsoft.com/office/drawing/2010/main" xmlns="" w="9525">
                   <a:solidFill>
                     <a:srgbClr val="000000"/>
                   </a:solidFill>
@@ -2071,7 +2071,7 @@
             </a:ln>
             <a:extLst>
               <a:ext uri="{91240B29-F687-4f45-9708-019B960494DF}">
-                <a14:hiddenLine xmlns="" xmlns:a14="http://schemas.microsoft.com/office/drawing/2010/main" w="9525">
+                <a14:hiddenLine xmlns:a14="http://schemas.microsoft.com/office/drawing/2010/main" xmlns="" w="9525">
                   <a:solidFill>
                     <a:srgbClr val="000000"/>
                   </a:solidFill>
@@ -2161,7 +2161,7 @@
             </a:ln>
             <a:extLst>
               <a:ext uri="{91240B29-F687-4f45-9708-019B960494DF}">
-                <a14:hiddenLine xmlns="" xmlns:a14="http://schemas.microsoft.com/office/drawing/2010/main" w="9525">
+                <a14:hiddenLine xmlns:a14="http://schemas.microsoft.com/office/drawing/2010/main" xmlns="" w="9525">
                   <a:solidFill>
                     <a:srgbClr val="000000"/>
                   </a:solidFill>
@@ -2229,7 +2229,7 @@
             </a:ln>
             <a:extLst>
               <a:ext uri="{91240B29-F687-4f45-9708-019B960494DF}">
-                <a14:hiddenLine xmlns="" xmlns:a14="http://schemas.microsoft.com/office/drawing/2010/main" w="9525">
+                <a14:hiddenLine xmlns:a14="http://schemas.microsoft.com/office/drawing/2010/main" xmlns="" w="9525">
                   <a:solidFill>
                     <a:srgbClr val="000000"/>
                   </a:solidFill>
@@ -2319,7 +2319,7 @@
             </a:ln>
             <a:extLst>
               <a:ext uri="{91240B29-F687-4f45-9708-019B960494DF}">
-                <a14:hiddenLine xmlns="" xmlns:a14="http://schemas.microsoft.com/office/drawing/2010/main" w="9525">
+                <a14:hiddenLine xmlns:a14="http://schemas.microsoft.com/office/drawing/2010/main" xmlns="" w="9525">
                   <a:solidFill>
                     <a:srgbClr val="000000"/>
                   </a:solidFill>
@@ -2353,7 +2353,7 @@
             </a:ln>
             <a:extLst>
               <a:ext uri="{91240B29-F687-4f45-9708-019B960494DF}">
-                <a14:hiddenLine xmlns="" xmlns:a14="http://schemas.microsoft.com/office/drawing/2010/main" w="9525">
+                <a14:hiddenLine xmlns:a14="http://schemas.microsoft.com/office/drawing/2010/main" xmlns="" w="9525">
                   <a:solidFill>
                     <a:srgbClr val="000000"/>
                   </a:solidFill>
@@ -2443,7 +2443,7 @@
             </a:ln>
             <a:extLst>
               <a:ext uri="{91240B29-F687-4f45-9708-019B960494DF}">
-                <a14:hiddenLine xmlns="" xmlns:a14="http://schemas.microsoft.com/office/drawing/2010/main" w="9525">
+                <a14:hiddenLine xmlns:a14="http://schemas.microsoft.com/office/drawing/2010/main" xmlns="" w="9525">
                   <a:solidFill>
                     <a:srgbClr val="000000"/>
                   </a:solidFill>
@@ -2505,7 +2505,7 @@
             </a:ln>
             <a:extLst>
               <a:ext uri="{91240B29-F687-4f45-9708-019B960494DF}">
-                <a14:hiddenLine xmlns="" xmlns:a14="http://schemas.microsoft.com/office/drawing/2010/main" w="9525">
+                <a14:hiddenLine xmlns:a14="http://schemas.microsoft.com/office/drawing/2010/main" xmlns="" w="9525">
                   <a:solidFill>
                     <a:srgbClr val="000000"/>
                   </a:solidFill>
@@ -2567,7 +2567,7 @@
             </a:ln>
             <a:extLst>
               <a:ext uri="{91240B29-F687-4f45-9708-019B960494DF}">
-                <a14:hiddenLine xmlns="" xmlns:a14="http://schemas.microsoft.com/office/drawing/2010/main" w="9525">
+                <a14:hiddenLine xmlns:a14="http://schemas.microsoft.com/office/drawing/2010/main" xmlns="" w="9525">
                   <a:solidFill>
                     <a:srgbClr val="000000"/>
                   </a:solidFill>
@@ -2657,7 +2657,7 @@
             </a:ln>
             <a:extLst>
               <a:ext uri="{91240B29-F687-4f45-9708-019B960494DF}">
-                <a14:hiddenLine xmlns="" xmlns:a14="http://schemas.microsoft.com/office/drawing/2010/main" w="9525">
+                <a14:hiddenLine xmlns:a14="http://schemas.microsoft.com/office/drawing/2010/main" xmlns="" w="9525">
                   <a:solidFill>
                     <a:srgbClr val="000000"/>
                   </a:solidFill>
@@ -2725,7 +2725,7 @@
             </a:ln>
             <a:extLst>
               <a:ext uri="{91240B29-F687-4f45-9708-019B960494DF}">
-                <a14:hiddenLine xmlns="" xmlns:a14="http://schemas.microsoft.com/office/drawing/2010/main" w="9525">
+                <a14:hiddenLine xmlns:a14="http://schemas.microsoft.com/office/drawing/2010/main" xmlns="" w="9525">
                   <a:solidFill>
                     <a:srgbClr val="000000"/>
                   </a:solidFill>
@@ -2787,7 +2787,7 @@
             </a:ln>
             <a:extLst>
               <a:ext uri="{91240B29-F687-4f45-9708-019B960494DF}">
-                <a14:hiddenLine xmlns="" xmlns:a14="http://schemas.microsoft.com/office/drawing/2010/main" w="9525">
+                <a14:hiddenLine xmlns:a14="http://schemas.microsoft.com/office/drawing/2010/main" xmlns="" w="9525">
                   <a:solidFill>
                     <a:srgbClr val="000000"/>
                   </a:solidFill>
@@ -2877,7 +2877,7 @@
             </a:ln>
             <a:extLst>
               <a:ext uri="{91240B29-F687-4f45-9708-019B960494DF}">
-                <a14:hiddenLine xmlns="" xmlns:a14="http://schemas.microsoft.com/office/drawing/2010/main" w="9525">
+                <a14:hiddenLine xmlns:a14="http://schemas.microsoft.com/office/drawing/2010/main" xmlns="" w="9525">
                   <a:solidFill>
                     <a:srgbClr val="000000"/>
                   </a:solidFill>
@@ -2939,7 +2939,7 @@
             </a:ln>
             <a:extLst>
               <a:ext uri="{91240B29-F687-4f45-9708-019B960494DF}">
-                <a14:hiddenLine xmlns="" xmlns:a14="http://schemas.microsoft.com/office/drawing/2010/main" w="9525">
+                <a14:hiddenLine xmlns:a14="http://schemas.microsoft.com/office/drawing/2010/main" xmlns="" w="9525">
                   <a:solidFill>
                     <a:srgbClr val="000000"/>
                   </a:solidFill>
@@ -3029,7 +3029,7 @@
             </a:ln>
             <a:extLst>
               <a:ext uri="{91240B29-F687-4f45-9708-019B960494DF}">
-                <a14:hiddenLine xmlns="" xmlns:a14="http://schemas.microsoft.com/office/drawing/2010/main" w="9525">
+                <a14:hiddenLine xmlns:a14="http://schemas.microsoft.com/office/drawing/2010/main" xmlns="" w="9525">
                   <a:solidFill>
                     <a:srgbClr val="000000"/>
                   </a:solidFill>
@@ -3091,7 +3091,7 @@
             </a:ln>
             <a:extLst>
               <a:ext uri="{91240B29-F687-4f45-9708-019B960494DF}">
-                <a14:hiddenLine xmlns="" xmlns:a14="http://schemas.microsoft.com/office/drawing/2010/main" w="9525">
+                <a14:hiddenLine xmlns:a14="http://schemas.microsoft.com/office/drawing/2010/main" xmlns="" w="9525">
                   <a:solidFill>
                     <a:srgbClr val="000000"/>
                   </a:solidFill>
@@ -3181,7 +3181,7 @@
             </a:ln>
             <a:extLst>
               <a:ext uri="{91240B29-F687-4f45-9708-019B960494DF}">
-                <a14:hiddenLine xmlns="" xmlns:a14="http://schemas.microsoft.com/office/drawing/2010/main" w="9525">
+                <a14:hiddenLine xmlns:a14="http://schemas.microsoft.com/office/drawing/2010/main" xmlns="" w="9525">
                   <a:solidFill>
                     <a:srgbClr val="000000"/>
                   </a:solidFill>
@@ -3215,7 +3215,7 @@
             </a:ln>
             <a:extLst>
               <a:ext uri="{91240B29-F687-4f45-9708-019B960494DF}">
-                <a14:hiddenLine xmlns="" xmlns:a14="http://schemas.microsoft.com/office/drawing/2010/main" w="9525">
+                <a14:hiddenLine xmlns:a14="http://schemas.microsoft.com/office/drawing/2010/main" xmlns="" w="9525">
                   <a:solidFill>
                     <a:srgbClr val="000000"/>
                   </a:solidFill>
@@ -3280,7 +3280,7 @@
             </a:ln>
             <a:extLst>
               <a:ext uri="{91240B29-F687-4f45-9708-019B960494DF}">
-                <a14:hiddenLine xmlns="" xmlns:a14="http://schemas.microsoft.com/office/drawing/2010/main" w="9525">
+                <a14:hiddenLine xmlns:a14="http://schemas.microsoft.com/office/drawing/2010/main" xmlns="" w="9525">
                   <a:solidFill>
                     <a:srgbClr val="000000"/>
                   </a:solidFill>
@@ -3370,7 +3370,7 @@
             </a:ln>
             <a:extLst>
               <a:ext uri="{91240B29-F687-4f45-9708-019B960494DF}">
-                <a14:hiddenLine xmlns="" xmlns:a14="http://schemas.microsoft.com/office/drawing/2010/main" w="9525">
+                <a14:hiddenLine xmlns:a14="http://schemas.microsoft.com/office/drawing/2010/main" xmlns="" w="9525">
                   <a:solidFill>
                     <a:srgbClr val="000000"/>
                   </a:solidFill>
@@ -3432,7 +3432,7 @@
             </a:ln>
             <a:extLst>
               <a:ext uri="{91240B29-F687-4f45-9708-019B960494DF}">
-                <a14:hiddenLine xmlns="" xmlns:a14="http://schemas.microsoft.com/office/drawing/2010/main" w="9525">
+                <a14:hiddenLine xmlns:a14="http://schemas.microsoft.com/office/drawing/2010/main" xmlns="" w="9525">
                   <a:solidFill>
                     <a:srgbClr val="000000"/>
                   </a:solidFill>
@@ -3522,7 +3522,7 @@
             </a:ln>
             <a:extLst>
               <a:ext uri="{91240B29-F687-4f45-9708-019B960494DF}">
-                <a14:hiddenLine xmlns="" xmlns:a14="http://schemas.microsoft.com/office/drawing/2010/main" w="9525">
+                <a14:hiddenLine xmlns:a14="http://schemas.microsoft.com/office/drawing/2010/main" xmlns="" w="9525">
                   <a:solidFill>
                     <a:srgbClr val="000000"/>
                   </a:solidFill>
@@ -3612,7 +3612,7 @@
             </a:ln>
             <a:extLst>
               <a:ext uri="{91240B29-F687-4f45-9708-019B960494DF}">
-                <a14:hiddenLine xmlns="" xmlns:a14="http://schemas.microsoft.com/office/drawing/2010/main" w="9525">
+                <a14:hiddenLine xmlns:a14="http://schemas.microsoft.com/office/drawing/2010/main" xmlns="" w="9525">
                   <a:solidFill>
                     <a:srgbClr val="000000"/>
                   </a:solidFill>
@@ -3677,7 +3677,7 @@
             </a:ln>
             <a:extLst>
               <a:ext uri="{91240B29-F687-4f45-9708-019B960494DF}">
-                <a14:hiddenLine xmlns="" xmlns:a14="http://schemas.microsoft.com/office/drawing/2010/main" w="9525">
+                <a14:hiddenLine xmlns:a14="http://schemas.microsoft.com/office/drawing/2010/main" xmlns="" w="9525">
                   <a:solidFill>
                     <a:srgbClr val="000000"/>
                   </a:solidFill>
@@ -3739,7 +3739,7 @@
             </a:ln>
             <a:extLst>
               <a:ext uri="{91240B29-F687-4f45-9708-019B960494DF}">
-                <a14:hiddenLine xmlns="" xmlns:a14="http://schemas.microsoft.com/office/drawing/2010/main" w="9525">
+                <a14:hiddenLine xmlns:a14="http://schemas.microsoft.com/office/drawing/2010/main" xmlns="" w="9525">
                   <a:solidFill>
                     <a:srgbClr val="000000"/>
                   </a:solidFill>
@@ -3829,7 +3829,7 @@
             </a:ln>
             <a:extLst>
               <a:ext uri="{91240B29-F687-4f45-9708-019B960494DF}">
-                <a14:hiddenLine xmlns="" xmlns:a14="http://schemas.microsoft.com/office/drawing/2010/main" w="9525">
+                <a14:hiddenLine xmlns:a14="http://schemas.microsoft.com/office/drawing/2010/main" xmlns="" w="9525">
                   <a:solidFill>
                     <a:srgbClr val="000000"/>
                   </a:solidFill>
@@ -3919,7 +3919,7 @@
             </a:ln>
             <a:extLst>
               <a:ext uri="{91240B29-F687-4f45-9708-019B960494DF}">
-                <a14:hiddenLine xmlns="" xmlns:a14="http://schemas.microsoft.com/office/drawing/2010/main" w="9525">
+                <a14:hiddenLine xmlns:a14="http://schemas.microsoft.com/office/drawing/2010/main" xmlns="" w="9525">
                   <a:solidFill>
                     <a:srgbClr val="000000"/>
                   </a:solidFill>
@@ -3981,7 +3981,7 @@
             </a:ln>
             <a:extLst>
               <a:ext uri="{91240B29-F687-4f45-9708-019B960494DF}">
-                <a14:hiddenLine xmlns="" xmlns:a14="http://schemas.microsoft.com/office/drawing/2010/main" w="9525">
+                <a14:hiddenLine xmlns:a14="http://schemas.microsoft.com/office/drawing/2010/main" xmlns="" w="9525">
                   <a:solidFill>
                     <a:srgbClr val="000000"/>
                   </a:solidFill>
@@ -4101,7 +4101,7 @@
             </a:ln>
             <a:extLst>
               <a:ext uri="{91240B29-F687-4f45-9708-019B960494DF}">
-                <a14:hiddenLine xmlns="" xmlns:a14="http://schemas.microsoft.com/office/drawing/2010/main" w="9525">
+                <a14:hiddenLine xmlns:a14="http://schemas.microsoft.com/office/drawing/2010/main" xmlns="" w="9525">
                   <a:solidFill>
                     <a:srgbClr val="000000"/>
                   </a:solidFill>
@@ -4169,7 +4169,7 @@
             </a:ln>
             <a:extLst>
               <a:ext uri="{91240B29-F687-4f45-9708-019B960494DF}">
-                <a14:hiddenLine xmlns="" xmlns:a14="http://schemas.microsoft.com/office/drawing/2010/main" w="9525">
+                <a14:hiddenLine xmlns:a14="http://schemas.microsoft.com/office/drawing/2010/main" xmlns="" w="9525">
                   <a:solidFill>
                     <a:srgbClr val="000000"/>
                   </a:solidFill>
@@ -4259,7 +4259,7 @@
             </a:ln>
             <a:extLst>
               <a:ext uri="{91240B29-F687-4f45-9708-019B960494DF}">
-                <a14:hiddenLine xmlns="" xmlns:a14="http://schemas.microsoft.com/office/drawing/2010/main" w="9525">
+                <a14:hiddenLine xmlns:a14="http://schemas.microsoft.com/office/drawing/2010/main" xmlns="" w="9525">
                   <a:solidFill>
                     <a:srgbClr val="000000"/>
                   </a:solidFill>
@@ -4399,7 +4399,7 @@
           <a:p>
             <a:fld id="{48A87A34-81AB-432B-8DAE-1953F412C126}" type="datetimeFigureOut">
               <a:rPr lang="en-US" dirty="0"/>
-              <a:t>11/28/2017</a:t>
+              <a:t>11/29/2017</a:t>
             </a:fld>
             <a:endParaRPr lang="en-US" dirty="0"/>
           </a:p>
@@ -4661,7 +4661,7 @@
           <a:p>
             <a:fld id="{48A87A34-81AB-432B-8DAE-1953F412C126}" type="datetimeFigureOut">
               <a:rPr lang="en-US" dirty="0"/>
-              <a:t>11/28/2017</a:t>
+              <a:t>11/29/2017</a:t>
             </a:fld>
             <a:endParaRPr lang="en-US" dirty="0"/>
           </a:p>
@@ -4852,7 +4852,7 @@
           <a:p>
             <a:fld id="{48A87A34-81AB-432B-8DAE-1953F412C126}" type="datetimeFigureOut">
               <a:rPr lang="en-US" dirty="0"/>
-              <a:t>11/28/2017</a:t>
+              <a:t>11/29/2017</a:t>
             </a:fld>
             <a:endParaRPr lang="en-US" dirty="0"/>
           </a:p>
@@ -5110,7 +5110,7 @@
           <a:p>
             <a:fld id="{48A87A34-81AB-432B-8DAE-1953F412C126}" type="datetimeFigureOut">
               <a:rPr lang="en-US" dirty="0"/>
-              <a:t>11/28/2017</a:t>
+              <a:t>11/29/2017</a:t>
             </a:fld>
             <a:endParaRPr lang="en-US" dirty="0"/>
           </a:p>
@@ -5539,7 +5539,7 @@
           <a:p>
             <a:fld id="{48A87A34-81AB-432B-8DAE-1953F412C126}" type="datetimeFigureOut">
               <a:rPr lang="en-US" dirty="0"/>
-              <a:t>11/28/2017</a:t>
+              <a:t>11/29/2017</a:t>
             </a:fld>
             <a:endParaRPr lang="en-US" dirty="0"/>
           </a:p>
@@ -6080,7 +6080,7 @@
           <a:p>
             <a:fld id="{48A87A34-81AB-432B-8DAE-1953F412C126}" type="datetimeFigureOut">
               <a:rPr lang="en-US" dirty="0"/>
-              <a:t>11/28/2017</a:t>
+              <a:t>11/29/2017</a:t>
             </a:fld>
             <a:endParaRPr lang="en-US" dirty="0"/>
           </a:p>
@@ -6795,7 +6795,7 @@
           <a:p>
             <a:fld id="{48A87A34-81AB-432B-8DAE-1953F412C126}" type="datetimeFigureOut">
               <a:rPr lang="en-US" dirty="0"/>
-              <a:t>11/28/2017</a:t>
+              <a:t>11/29/2017</a:t>
             </a:fld>
             <a:endParaRPr lang="en-US" dirty="0"/>
           </a:p>
@@ -6960,7 +6960,7 @@
           <a:p>
             <a:fld id="{48A87A34-81AB-432B-8DAE-1953F412C126}" type="datetimeFigureOut">
               <a:rPr lang="en-US" dirty="0"/>
-              <a:t>11/28/2017</a:t>
+              <a:t>11/29/2017</a:t>
             </a:fld>
             <a:endParaRPr lang="en-US" dirty="0"/>
           </a:p>
@@ -7135,7 +7135,7 @@
           <a:p>
             <a:fld id="{48A87A34-81AB-432B-8DAE-1953F412C126}" type="datetimeFigureOut">
               <a:rPr lang="en-US" dirty="0"/>
-              <a:t>11/28/2017</a:t>
+              <a:t>11/29/2017</a:t>
             </a:fld>
             <a:endParaRPr lang="en-US" dirty="0"/>
           </a:p>
@@ -7300,7 +7300,7 @@
           <a:p>
             <a:fld id="{48A87A34-81AB-432B-8DAE-1953F412C126}" type="datetimeFigureOut">
               <a:rPr lang="en-US" dirty="0"/>
-              <a:t>11/28/2017</a:t>
+              <a:t>11/29/2017</a:t>
             </a:fld>
             <a:endParaRPr lang="en-US" dirty="0"/>
           </a:p>
@@ -7545,7 +7545,7 @@
           <a:p>
             <a:fld id="{48A87A34-81AB-432B-8DAE-1953F412C126}" type="datetimeFigureOut">
               <a:rPr lang="en-US" dirty="0"/>
-              <a:t>11/28/2017</a:t>
+              <a:t>11/29/2017</a:t>
             </a:fld>
             <a:endParaRPr lang="en-US" dirty="0"/>
           </a:p>
@@ -7772,7 +7772,7 @@
           <a:p>
             <a:fld id="{48A87A34-81AB-432B-8DAE-1953F412C126}" type="datetimeFigureOut">
               <a:rPr lang="en-US" dirty="0"/>
-              <a:t>11/28/2017</a:t>
+              <a:t>11/29/2017</a:t>
             </a:fld>
             <a:endParaRPr lang="en-US" dirty="0"/>
           </a:p>
@@ -8148,7 +8148,7 @@
           <a:p>
             <a:fld id="{48A87A34-81AB-432B-8DAE-1953F412C126}" type="datetimeFigureOut">
               <a:rPr lang="en-US" dirty="0"/>
-              <a:t>11/28/2017</a:t>
+              <a:t>11/29/2017</a:t>
             </a:fld>
             <a:endParaRPr lang="en-US" dirty="0"/>
           </a:p>
@@ -8261,7 +8261,7 @@
           <a:p>
             <a:fld id="{48A87A34-81AB-432B-8DAE-1953F412C126}" type="datetimeFigureOut">
               <a:rPr lang="en-US" dirty="0"/>
-              <a:t>11/28/2017</a:t>
+              <a:t>11/29/2017</a:t>
             </a:fld>
             <a:endParaRPr lang="en-US" dirty="0"/>
           </a:p>
@@ -8351,7 +8351,7 @@
           <a:p>
             <a:fld id="{48A87A34-81AB-432B-8DAE-1953F412C126}" type="datetimeFigureOut">
               <a:rPr lang="en-US" dirty="0"/>
-              <a:t>11/28/2017</a:t>
+              <a:t>11/29/2017</a:t>
             </a:fld>
             <a:endParaRPr lang="en-US" dirty="0"/>
           </a:p>
@@ -8595,7 +8595,7 @@
           <a:p>
             <a:fld id="{48A87A34-81AB-432B-8DAE-1953F412C126}" type="datetimeFigureOut">
               <a:rPr lang="en-US" dirty="0"/>
-              <a:t>11/28/2017</a:t>
+              <a:t>11/29/2017</a:t>
             </a:fld>
             <a:endParaRPr lang="en-US" dirty="0"/>
           </a:p>
@@ -8870,7 +8870,7 @@
           <a:p>
             <a:fld id="{48A87A34-81AB-432B-8DAE-1953F412C126}" type="datetimeFigureOut">
               <a:rPr lang="en-US" dirty="0"/>
-              <a:t>11/28/2017</a:t>
+              <a:t>11/29/2017</a:t>
             </a:fld>
             <a:endParaRPr lang="en-US" dirty="0"/>
           </a:p>
@@ -8981,7 +8981,7 @@
           <a:noFill/>
           <a:extLst>
             <a:ext uri="{909E8E84-426E-40dd-AFC4-6F175D3DCCD1}">
-              <a14:hiddenFill xmlns="" xmlns:a14="http://schemas.microsoft.com/office/drawing/2010/main">
+              <a14:hiddenFill xmlns:a14="http://schemas.microsoft.com/office/drawing/2010/main" xmlns="">
                 <a:solidFill>
                   <a:srgbClr val="FFFFFF"/>
                 </a:solidFill>
@@ -9055,7 +9055,7 @@
               </a:ln>
               <a:extLst>
                 <a:ext uri="{91240B29-F687-4f45-9708-019B960494DF}">
-                  <a14:hiddenLine xmlns="" xmlns:a14="http://schemas.microsoft.com/office/drawing/2010/main" w="9525">
+                  <a14:hiddenLine xmlns:a14="http://schemas.microsoft.com/office/drawing/2010/main" xmlns="" w="9525">
                     <a:solidFill>
                       <a:srgbClr val="000000"/>
                     </a:solidFill>
@@ -9145,7 +9145,7 @@
               </a:ln>
               <a:extLst>
                 <a:ext uri="{91240B29-F687-4f45-9708-019B960494DF}">
-                  <a14:hiddenLine xmlns="" xmlns:a14="http://schemas.microsoft.com/office/drawing/2010/main" w="9525">
+                  <a14:hiddenLine xmlns:a14="http://schemas.microsoft.com/office/drawing/2010/main" xmlns="" w="9525">
                     <a:solidFill>
                       <a:srgbClr val="000000"/>
                     </a:solidFill>
@@ -9235,7 +9235,7 @@
               </a:ln>
               <a:extLst>
                 <a:ext uri="{91240B29-F687-4f45-9708-019B960494DF}">
-                  <a14:hiddenLine xmlns="" xmlns:a14="http://schemas.microsoft.com/office/drawing/2010/main" w="9525">
+                  <a14:hiddenLine xmlns:a14="http://schemas.microsoft.com/office/drawing/2010/main" xmlns="" w="9525">
                     <a:solidFill>
                       <a:srgbClr val="000000"/>
                     </a:solidFill>
@@ -9297,7 +9297,7 @@
               </a:ln>
               <a:extLst>
                 <a:ext uri="{91240B29-F687-4f45-9708-019B960494DF}">
-                  <a14:hiddenLine xmlns="" xmlns:a14="http://schemas.microsoft.com/office/drawing/2010/main" w="9525">
+                  <a14:hiddenLine xmlns:a14="http://schemas.microsoft.com/office/drawing/2010/main" xmlns="" w="9525">
                     <a:solidFill>
                       <a:srgbClr val="000000"/>
                     </a:solidFill>
@@ -9387,7 +9387,7 @@
               </a:ln>
               <a:extLst>
                 <a:ext uri="{91240B29-F687-4f45-9708-019B960494DF}">
-                  <a14:hiddenLine xmlns="" xmlns:a14="http://schemas.microsoft.com/office/drawing/2010/main" w="9525">
+                  <a14:hiddenLine xmlns:a14="http://schemas.microsoft.com/office/drawing/2010/main" xmlns="" w="9525">
                     <a:solidFill>
                       <a:srgbClr val="000000"/>
                     </a:solidFill>
@@ -9449,7 +9449,7 @@
               </a:ln>
               <a:extLst>
                 <a:ext uri="{91240B29-F687-4f45-9708-019B960494DF}">
-                  <a14:hiddenLine xmlns="" xmlns:a14="http://schemas.microsoft.com/office/drawing/2010/main" w="9525">
+                  <a14:hiddenLine xmlns:a14="http://schemas.microsoft.com/office/drawing/2010/main" xmlns="" w="9525">
                     <a:solidFill>
                       <a:srgbClr val="000000"/>
                     </a:solidFill>
@@ -9511,7 +9511,7 @@
               </a:ln>
               <a:extLst>
                 <a:ext uri="{91240B29-F687-4f45-9708-019B960494DF}">
-                  <a14:hiddenLine xmlns="" xmlns:a14="http://schemas.microsoft.com/office/drawing/2010/main" w="9525">
+                  <a14:hiddenLine xmlns:a14="http://schemas.microsoft.com/office/drawing/2010/main" xmlns="" w="9525">
                     <a:solidFill>
                       <a:srgbClr val="000000"/>
                     </a:solidFill>
@@ -9601,7 +9601,7 @@
               </a:ln>
               <a:extLst>
                 <a:ext uri="{91240B29-F687-4f45-9708-019B960494DF}">
-                  <a14:hiddenLine xmlns="" xmlns:a14="http://schemas.microsoft.com/office/drawing/2010/main" w="9525">
+                  <a14:hiddenLine xmlns:a14="http://schemas.microsoft.com/office/drawing/2010/main" xmlns="" w="9525">
                     <a:solidFill>
                       <a:srgbClr val="000000"/>
                     </a:solidFill>
@@ -9691,7 +9691,7 @@
               </a:ln>
               <a:extLst>
                 <a:ext uri="{91240B29-F687-4f45-9708-019B960494DF}">
-                  <a14:hiddenLine xmlns="" xmlns:a14="http://schemas.microsoft.com/office/drawing/2010/main" w="9525">
+                  <a14:hiddenLine xmlns:a14="http://schemas.microsoft.com/office/drawing/2010/main" xmlns="" w="9525">
                     <a:solidFill>
                       <a:srgbClr val="000000"/>
                     </a:solidFill>
@@ -9753,7 +9753,7 @@
               </a:ln>
               <a:extLst>
                 <a:ext uri="{91240B29-F687-4f45-9708-019B960494DF}">
-                  <a14:hiddenLine xmlns="" xmlns:a14="http://schemas.microsoft.com/office/drawing/2010/main" w="9525">
+                  <a14:hiddenLine xmlns:a14="http://schemas.microsoft.com/office/drawing/2010/main" xmlns="" w="9525">
                     <a:solidFill>
                       <a:srgbClr val="000000"/>
                     </a:solidFill>
@@ -9863,7 +9863,7 @@
               </a:ln>
               <a:extLst>
                 <a:ext uri="{91240B29-F687-4f45-9708-019B960494DF}">
-                  <a14:hiddenLine xmlns="" xmlns:a14="http://schemas.microsoft.com/office/drawing/2010/main" w="9525">
+                  <a14:hiddenLine xmlns:a14="http://schemas.microsoft.com/office/drawing/2010/main" xmlns="" w="9525">
                     <a:solidFill>
                       <a:srgbClr val="000000"/>
                     </a:solidFill>
@@ -9947,7 +9947,7 @@
               </a:ln>
               <a:extLst>
                 <a:ext uri="{91240B29-F687-4f45-9708-019B960494DF}">
-                  <a14:hiddenLine xmlns="" xmlns:a14="http://schemas.microsoft.com/office/drawing/2010/main" w="9525">
+                  <a14:hiddenLine xmlns:a14="http://schemas.microsoft.com/office/drawing/2010/main" xmlns="" w="9525">
                     <a:solidFill>
                       <a:srgbClr val="000000"/>
                     </a:solidFill>
@@ -10009,7 +10009,7 @@
               </a:ln>
               <a:extLst>
                 <a:ext uri="{91240B29-F687-4f45-9708-019B960494DF}">
-                  <a14:hiddenLine xmlns="" xmlns:a14="http://schemas.microsoft.com/office/drawing/2010/main" w="9525">
+                  <a14:hiddenLine xmlns:a14="http://schemas.microsoft.com/office/drawing/2010/main" xmlns="" w="9525">
                     <a:solidFill>
                       <a:srgbClr val="000000"/>
                     </a:solidFill>
@@ -10071,7 +10071,7 @@
               </a:ln>
               <a:extLst>
                 <a:ext uri="{91240B29-F687-4f45-9708-019B960494DF}">
-                  <a14:hiddenLine xmlns="" xmlns:a14="http://schemas.microsoft.com/office/drawing/2010/main" w="9525">
+                  <a14:hiddenLine xmlns:a14="http://schemas.microsoft.com/office/drawing/2010/main" xmlns="" w="9525">
                     <a:solidFill>
                       <a:srgbClr val="000000"/>
                     </a:solidFill>
@@ -10161,7 +10161,7 @@
               </a:ln>
               <a:extLst>
                 <a:ext uri="{91240B29-F687-4f45-9708-019B960494DF}">
-                  <a14:hiddenLine xmlns="" xmlns:a14="http://schemas.microsoft.com/office/drawing/2010/main" w="9525">
+                  <a14:hiddenLine xmlns:a14="http://schemas.microsoft.com/office/drawing/2010/main" xmlns="" w="9525">
                     <a:solidFill>
                       <a:srgbClr val="000000"/>
                     </a:solidFill>
@@ -10195,7 +10195,7 @@
               </a:ln>
               <a:extLst>
                 <a:ext uri="{91240B29-F687-4f45-9708-019B960494DF}">
-                  <a14:hiddenLine xmlns="" xmlns:a14="http://schemas.microsoft.com/office/drawing/2010/main" w="9525">
+                  <a14:hiddenLine xmlns:a14="http://schemas.microsoft.com/office/drawing/2010/main" xmlns="" w="9525">
                     <a:solidFill>
                       <a:srgbClr val="000000"/>
                     </a:solidFill>
@@ -10260,7 +10260,7 @@
               </a:ln>
               <a:extLst>
                 <a:ext uri="{91240B29-F687-4f45-9708-019B960494DF}">
-                  <a14:hiddenLine xmlns="" xmlns:a14="http://schemas.microsoft.com/office/drawing/2010/main" w="9525">
+                  <a14:hiddenLine xmlns:a14="http://schemas.microsoft.com/office/drawing/2010/main" xmlns="" w="9525">
                     <a:solidFill>
                       <a:srgbClr val="000000"/>
                     </a:solidFill>
@@ -10350,7 +10350,7 @@
               </a:ln>
               <a:extLst>
                 <a:ext uri="{91240B29-F687-4f45-9708-019B960494DF}">
-                  <a14:hiddenLine xmlns="" xmlns:a14="http://schemas.microsoft.com/office/drawing/2010/main" w="9525">
+                  <a14:hiddenLine xmlns:a14="http://schemas.microsoft.com/office/drawing/2010/main" xmlns="" w="9525">
                     <a:solidFill>
                       <a:srgbClr val="000000"/>
                     </a:solidFill>
@@ -10412,7 +10412,7 @@
               </a:ln>
               <a:extLst>
                 <a:ext uri="{91240B29-F687-4f45-9708-019B960494DF}">
-                  <a14:hiddenLine xmlns="" xmlns:a14="http://schemas.microsoft.com/office/drawing/2010/main" w="9525">
+                  <a14:hiddenLine xmlns:a14="http://schemas.microsoft.com/office/drawing/2010/main" xmlns="" w="9525">
                     <a:solidFill>
                       <a:srgbClr val="000000"/>
                     </a:solidFill>
@@ -10502,7 +10502,7 @@
               </a:ln>
               <a:extLst>
                 <a:ext uri="{91240B29-F687-4f45-9708-019B960494DF}">
-                  <a14:hiddenLine xmlns="" xmlns:a14="http://schemas.microsoft.com/office/drawing/2010/main" w="9525">
+                  <a14:hiddenLine xmlns:a14="http://schemas.microsoft.com/office/drawing/2010/main" xmlns="" w="9525">
                     <a:solidFill>
                       <a:srgbClr val="000000"/>
                     </a:solidFill>
@@ -10567,7 +10567,7 @@
               </a:ln>
               <a:extLst>
                 <a:ext uri="{91240B29-F687-4f45-9708-019B960494DF}">
-                  <a14:hiddenLine xmlns="" xmlns:a14="http://schemas.microsoft.com/office/drawing/2010/main" w="9525">
+                  <a14:hiddenLine xmlns:a14="http://schemas.microsoft.com/office/drawing/2010/main" xmlns="" w="9525">
                     <a:solidFill>
                       <a:srgbClr val="000000"/>
                     </a:solidFill>
@@ -10629,7 +10629,7 @@
               </a:ln>
               <a:extLst>
                 <a:ext uri="{91240B29-F687-4f45-9708-019B960494DF}">
-                  <a14:hiddenLine xmlns="" xmlns:a14="http://schemas.microsoft.com/office/drawing/2010/main" w="9525">
+                  <a14:hiddenLine xmlns:a14="http://schemas.microsoft.com/office/drawing/2010/main" xmlns="" w="9525">
                     <a:solidFill>
                       <a:srgbClr val="000000"/>
                     </a:solidFill>
@@ -10719,7 +10719,7 @@
               </a:ln>
               <a:extLst>
                 <a:ext uri="{91240B29-F687-4f45-9708-019B960494DF}">
-                  <a14:hiddenLine xmlns="" xmlns:a14="http://schemas.microsoft.com/office/drawing/2010/main" w="9525">
+                  <a14:hiddenLine xmlns:a14="http://schemas.microsoft.com/office/drawing/2010/main" xmlns="" w="9525">
                     <a:solidFill>
                       <a:srgbClr val="000000"/>
                     </a:solidFill>
@@ -10809,7 +10809,7 @@
               </a:ln>
               <a:extLst>
                 <a:ext uri="{91240B29-F687-4f45-9708-019B960494DF}">
-                  <a14:hiddenLine xmlns="" xmlns:a14="http://schemas.microsoft.com/office/drawing/2010/main" w="9525">
+                  <a14:hiddenLine xmlns:a14="http://schemas.microsoft.com/office/drawing/2010/main" xmlns="" w="9525">
                     <a:solidFill>
                       <a:srgbClr val="000000"/>
                     </a:solidFill>
@@ -10874,7 +10874,7 @@
               </a:ln>
               <a:extLst>
                 <a:ext uri="{91240B29-F687-4f45-9708-019B960494DF}">
-                  <a14:hiddenLine xmlns="" xmlns:a14="http://schemas.microsoft.com/office/drawing/2010/main" w="9525">
+                  <a14:hiddenLine xmlns:a14="http://schemas.microsoft.com/office/drawing/2010/main" xmlns="" w="9525">
                     <a:solidFill>
                       <a:srgbClr val="000000"/>
                     </a:solidFill>
@@ -10994,7 +10994,7 @@
               </a:ln>
               <a:extLst>
                 <a:ext uri="{91240B29-F687-4f45-9708-019B960494DF}">
-                  <a14:hiddenLine xmlns="" xmlns:a14="http://schemas.microsoft.com/office/drawing/2010/main" w="9525">
+                  <a14:hiddenLine xmlns:a14="http://schemas.microsoft.com/office/drawing/2010/main" xmlns="" w="9525">
                     <a:solidFill>
                       <a:srgbClr val="000000"/>
                     </a:solidFill>
@@ -11092,7 +11092,7 @@
               </a:ln>
               <a:extLst>
                 <a:ext uri="{91240B29-F687-4f45-9708-019B960494DF}">
-                  <a14:hiddenLine xmlns="" xmlns:a14="http://schemas.microsoft.com/office/drawing/2010/main" w="9525">
+                  <a14:hiddenLine xmlns:a14="http://schemas.microsoft.com/office/drawing/2010/main" xmlns="" w="9525">
                     <a:solidFill>
                       <a:srgbClr val="000000"/>
                     </a:solidFill>
@@ -11207,7 +11207,7 @@
               </a:ln>
               <a:extLst>
                 <a:ext uri="{91240B29-F687-4f45-9708-019B960494DF}">
-                  <a14:hiddenLine xmlns="" xmlns:a14="http://schemas.microsoft.com/office/drawing/2010/main" w="9525">
+                  <a14:hiddenLine xmlns:a14="http://schemas.microsoft.com/office/drawing/2010/main" xmlns="" w="9525">
                     <a:solidFill>
                       <a:srgbClr val="000000"/>
                     </a:solidFill>
@@ -11297,7 +11297,7 @@
               </a:ln>
               <a:extLst>
                 <a:ext uri="{91240B29-F687-4f45-9708-019B960494DF}">
-                  <a14:hiddenLine xmlns="" xmlns:a14="http://schemas.microsoft.com/office/drawing/2010/main" w="9525">
+                  <a14:hiddenLine xmlns:a14="http://schemas.microsoft.com/office/drawing/2010/main" xmlns="" w="9525">
                     <a:solidFill>
                       <a:srgbClr val="000000"/>
                     </a:solidFill>
@@ -11362,7 +11362,7 @@
               </a:ln>
               <a:extLst>
                 <a:ext uri="{91240B29-F687-4f45-9708-019B960494DF}">
-                  <a14:hiddenLine xmlns="" xmlns:a14="http://schemas.microsoft.com/office/drawing/2010/main" w="9525">
+                  <a14:hiddenLine xmlns:a14="http://schemas.microsoft.com/office/drawing/2010/main" xmlns="" w="9525">
                     <a:solidFill>
                       <a:srgbClr val="000000"/>
                     </a:solidFill>
@@ -11452,7 +11452,7 @@
               </a:ln>
               <a:extLst>
                 <a:ext uri="{91240B29-F687-4f45-9708-019B960494DF}">
-                  <a14:hiddenLine xmlns="" xmlns:a14="http://schemas.microsoft.com/office/drawing/2010/main" w="9525">
+                  <a14:hiddenLine xmlns:a14="http://schemas.microsoft.com/office/drawing/2010/main" xmlns="" w="9525">
                     <a:solidFill>
                       <a:srgbClr val="000000"/>
                     </a:solidFill>
@@ -11520,7 +11520,7 @@
               </a:ln>
               <a:extLst>
                 <a:ext uri="{91240B29-F687-4f45-9708-019B960494DF}">
-                  <a14:hiddenLine xmlns="" xmlns:a14="http://schemas.microsoft.com/office/drawing/2010/main" w="9525">
+                  <a14:hiddenLine xmlns:a14="http://schemas.microsoft.com/office/drawing/2010/main" xmlns="" w="9525">
                     <a:solidFill>
                       <a:srgbClr val="000000"/>
                     </a:solidFill>
@@ -11610,7 +11610,7 @@
               </a:ln>
               <a:extLst>
                 <a:ext uri="{91240B29-F687-4f45-9708-019B960494DF}">
-                  <a14:hiddenLine xmlns="" xmlns:a14="http://schemas.microsoft.com/office/drawing/2010/main" w="9525">
+                  <a14:hiddenLine xmlns:a14="http://schemas.microsoft.com/office/drawing/2010/main" xmlns="" w="9525">
                     <a:solidFill>
                       <a:srgbClr val="000000"/>
                     </a:solidFill>
@@ -11678,7 +11678,7 @@
               </a:ln>
               <a:extLst>
                 <a:ext uri="{91240B29-F687-4f45-9708-019B960494DF}">
-                  <a14:hiddenLine xmlns="" xmlns:a14="http://schemas.microsoft.com/office/drawing/2010/main" w="9525">
+                  <a14:hiddenLine xmlns:a14="http://schemas.microsoft.com/office/drawing/2010/main" xmlns="" w="9525">
                     <a:solidFill>
                       <a:srgbClr val="000000"/>
                     </a:solidFill>
@@ -11768,7 +11768,7 @@
               </a:ln>
               <a:extLst>
                 <a:ext uri="{91240B29-F687-4f45-9708-019B960494DF}">
-                  <a14:hiddenLine xmlns="" xmlns:a14="http://schemas.microsoft.com/office/drawing/2010/main" w="9525">
+                  <a14:hiddenLine xmlns:a14="http://schemas.microsoft.com/office/drawing/2010/main" xmlns="" w="9525">
                     <a:solidFill>
                       <a:srgbClr val="000000"/>
                     </a:solidFill>
@@ -11802,7 +11802,7 @@
               </a:ln>
               <a:extLst>
                 <a:ext uri="{91240B29-F687-4f45-9708-019B960494DF}">
-                  <a14:hiddenLine xmlns="" xmlns:a14="http://schemas.microsoft.com/office/drawing/2010/main" w="9525">
+                  <a14:hiddenLine xmlns:a14="http://schemas.microsoft.com/office/drawing/2010/main" xmlns="" w="9525">
                     <a:solidFill>
                       <a:srgbClr val="000000"/>
                     </a:solidFill>
@@ -11943,7 +11943,7 @@
             <a:fld id="{48A87A34-81AB-432B-8DAE-1953F412C126}" type="datetimeFigureOut">
               <a:rPr lang="en-US" dirty="0"/>
               <a:pPr/>
-              <a:t>11/28/2017</a:t>
+              <a:t>11/29/2017</a:t>
             </a:fld>
             <a:endParaRPr lang="en-US" dirty="0"/>
           </a:p>
@@ -12857,7 +12857,7 @@
           <a:p>
             <a:r>
               <a:rPr lang="en-US" dirty="0"/>
-              <a:t>Plan B is the </a:t>
+              <a:t>Plan B is the Zebra crossing app or a library version of it via </a:t>
             </a:r>
             <a:r>
               <a:rPr lang="en-US" dirty="0" err="1"/>
@@ -12865,7 +12865,7 @@
             </a:r>
             <a:r>
               <a:rPr lang="en-US" dirty="0"/>
-              <a:t> (Zebra crossing) library </a:t>
+              <a:t> </a:t>
             </a:r>
           </a:p>
           <a:p>
@@ -13050,7 +13050,7 @@
           <a:p>
             <a:r>
               <a:rPr lang="en-US" dirty="0"/>
-              <a:t>Develop a better understanding of Zebra Crossing</a:t>
+              <a:t>Develop a better understanding of Zebra Crossing </a:t>
             </a:r>
           </a:p>
           <a:p>
@@ -13062,7 +13062,13 @@
           <a:p>
             <a:r>
               <a:rPr lang="en-US" dirty="0"/>
-              <a:t>Add more documentation to the project </a:t>
+              <a:t>Set up a database prototype to begin writing web hooks</a:t>
+            </a:r>
+          </a:p>
+          <a:p>
+            <a:r>
+              <a:rPr lang="en-US" dirty="0"/>
+              <a:t>Document what we have more thoroughly </a:t>
             </a:r>
           </a:p>
         </p:txBody>
@@ -13150,7 +13156,9 @@
         </p:nvSpPr>
         <p:spPr/>
         <p:txBody>
-          <a:bodyPr/>
+          <a:bodyPr>
+            <a:normAutofit fontScale="92500" lnSpcReduction="20000"/>
+          </a:bodyPr>
           <a:lstStyle/>
           <a:p>
             <a:r>
@@ -13179,8 +13187,19 @@
           <a:p>
             <a:r>
               <a:rPr lang="en-US" dirty="0"/>
-              <a:t>Package our documentation and Application in a  </a:t>
-            </a:r>
+              <a:t>Integrate NDUS accounts if posable else add our own password/account system</a:t>
+            </a:r>
+          </a:p>
+          <a:p>
+            <a:r>
+              <a:rPr lang="en-US" dirty="0"/>
+              <a:t>Package our documentation and Application in a easy to understand way for </a:t>
+            </a:r>
+            <a:r>
+              <a:rPr lang="en-US"/>
+              <a:t>future developers </a:t>
+            </a:r>
+            <a:endParaRPr lang="en-US" dirty="0"/>
           </a:p>
         </p:txBody>
       </p:sp>

</xml_diff>